<commit_message>
Commit fix: a. RTC: change header place to be first 2 byte in each packets at current values. b. RT viewer: Fix some issues and stability bugs.
</commit_message>
<xml_diff>
--- a/DR/Ver_1_002/ALPstar_TLM_DR_1_002.pptx
+++ b/DR/Ver_1_002/ALPstar_TLM_DR_1_002.pptx
@@ -5,22 +5,25 @@
     <p:sldMasterId id="2147483660" r:id="rId4"/>
   </p:sldMasterIdLst>
   <p:notesMasterIdLst>
-    <p:notesMasterId r:id="rId15"/>
+    <p:notesMasterId r:id="rId18"/>
   </p:notesMasterIdLst>
   <p:handoutMasterIdLst>
-    <p:handoutMasterId r:id="rId16"/>
+    <p:handoutMasterId r:id="rId19"/>
   </p:handoutMasterIdLst>
   <p:sldIdLst>
     <p:sldId id="340" r:id="rId5"/>
     <p:sldId id="344" r:id="rId6"/>
-    <p:sldId id="355" r:id="rId7"/>
-    <p:sldId id="361" r:id="rId8"/>
-    <p:sldId id="357" r:id="rId9"/>
-    <p:sldId id="358" r:id="rId10"/>
-    <p:sldId id="359" r:id="rId11"/>
-    <p:sldId id="356" r:id="rId12"/>
-    <p:sldId id="360" r:id="rId13"/>
-    <p:sldId id="353" r:id="rId14"/>
+    <p:sldId id="359" r:id="rId7"/>
+    <p:sldId id="362" r:id="rId8"/>
+    <p:sldId id="363" r:id="rId9"/>
+    <p:sldId id="365" r:id="rId10"/>
+    <p:sldId id="366" r:id="rId11"/>
+    <p:sldId id="361" r:id="rId12"/>
+    <p:sldId id="357" r:id="rId13"/>
+    <p:sldId id="358" r:id="rId14"/>
+    <p:sldId id="356" r:id="rId15"/>
+    <p:sldId id="364" r:id="rId16"/>
+    <p:sldId id="353" r:id="rId17"/>
   </p:sldIdLst>
   <p:sldSz cx="9144000" cy="6858000" type="screen4x3"/>
   <p:notesSz cx="6858000" cy="9296400"/>
@@ -143,13 +146,16 @@
           <p14:sldIdLst>
             <p14:sldId id="340"/>
             <p14:sldId id="344"/>
-            <p14:sldId id="355"/>
+            <p14:sldId id="359"/>
+            <p14:sldId id="362"/>
+            <p14:sldId id="363"/>
+            <p14:sldId id="365"/>
+            <p14:sldId id="366"/>
             <p14:sldId id="361"/>
             <p14:sldId id="357"/>
             <p14:sldId id="358"/>
-            <p14:sldId id="359"/>
             <p14:sldId id="356"/>
-            <p14:sldId id="360"/>
+            <p14:sldId id="364"/>
             <p14:sldId id="353"/>
           </p14:sldIdLst>
         </p14:section>
@@ -241,7 +247,7 @@
           <a:p>
             <a:fld id="{3094E33D-6E1D-4268-A0C7-E7AE08740D1A}" type="datetimeFigureOut">
               <a:rPr lang="en-US" smtClean="0"/>
-              <a:t>9/5/2018</a:t>
+              <a:t>10/28/2018</a:t>
             </a:fld>
             <a:endParaRPr lang="en-US"/>
           </a:p>
@@ -407,7 +413,7 @@
             <a:fld id="{95651016-69E9-464F-AF89-5684AEF24FEC}" type="datetimeFigureOut">
               <a:rPr lang="he-IL" smtClean="0"/>
               <a:pPr/>
-              <a:t>כ"ה/אלול/תשע"ח</a:t>
+              <a:t>י"ט/חשון/תשע"ט</a:t>
             </a:fld>
             <a:endParaRPr lang="he-IL"/>
           </a:p>
@@ -4184,9 +4190,29 @@
           <a:bodyPr/>
           <a:lstStyle/>
           <a:p>
+            <a:pPr rtl="0"/>
             <a:r>
               <a:rPr lang="en-US" sz="5400" dirty="0" smtClean="0"/>
-              <a:t>RT Telemetric (TLM) SW DR</a:t>
+              <a:t>RT </a:t>
+            </a:r>
+            <a:r>
+              <a:rPr lang="en-US" sz="5400" dirty="0" smtClean="0"/>
+              <a:t>Telemetric (TLM) SW </a:t>
+            </a:r>
+            <a:r>
+              <a:rPr lang="en-US" sz="5400" dirty="0" smtClean="0"/>
+              <a:t>DR</a:t>
+            </a:r>
+            <a:br>
+              <a:rPr lang="en-US" sz="5400" dirty="0" smtClean="0"/>
+            </a:br>
+            <a:r>
+              <a:rPr lang="en-US" sz="5400" dirty="0" err="1" smtClean="0"/>
+              <a:t>DR</a:t>
+            </a:r>
+            <a:r>
+              <a:rPr lang="en-US" sz="5400" dirty="0" smtClean="0"/>
+              <a:t>: 1.02</a:t>
             </a:r>
             <a:endParaRPr lang="en-US" sz="5400" dirty="0"/>
           </a:p>
@@ -4237,1440 +4263,6 @@
 </file>
 
 <file path=ppt/slides/slide10.xml><?xml version="1.0" encoding="utf-8"?>
-<p:sld xmlns:a="http://schemas.openxmlformats.org/drawingml/2006/main" xmlns:r="http://schemas.openxmlformats.org/officeDocument/2006/relationships" xmlns:p="http://schemas.openxmlformats.org/presentationml/2006/main">
-  <p:cSld>
-    <p:spTree>
-      <p:nvGrpSpPr>
-        <p:cNvPr id="1" name=""/>
-        <p:cNvGrpSpPr/>
-        <p:nvPr/>
-      </p:nvGrpSpPr>
-      <p:grpSpPr>
-        <a:xfrm>
-          <a:off x="0" y="0"/>
-          <a:ext cx="0" cy="0"/>
-          <a:chOff x="0" y="0"/>
-          <a:chExt cx="0" cy="0"/>
-        </a:xfrm>
-      </p:grpSpPr>
-      <p:sp>
-        <p:nvSpPr>
-          <p:cNvPr id="3" name="Content Placeholder 2"/>
-          <p:cNvSpPr>
-            <a:spLocks noGrp="1"/>
-          </p:cNvSpPr>
-          <p:nvPr>
-            <p:ph idx="1"/>
-          </p:nvPr>
-        </p:nvSpPr>
-        <p:spPr>
-          <a:xfrm>
-            <a:off x="179388" y="908556"/>
-            <a:ext cx="8713787" cy="5616575"/>
-          </a:xfrm>
-        </p:spPr>
-        <p:txBody>
-          <a:bodyPr anchor="ctr"/>
-          <a:lstStyle/>
-          <a:p>
-            <a:pPr marL="0" indent="0" algn="ctr">
-              <a:buNone/>
-              <a:defRPr/>
-            </a:pPr>
-            <a:r>
-              <a:rPr lang="en-US" sz="6600" dirty="0" smtClean="0"/>
-              <a:t>The End.</a:t>
-            </a:r>
-            <a:endParaRPr lang="en-US" sz="6600" dirty="0"/>
-          </a:p>
-          <a:p>
-            <a:pPr marL="360000" lvl="1" indent="0">
-              <a:buFontTx/>
-              <a:buNone/>
-              <a:defRPr/>
-            </a:pPr>
-            <a:endParaRPr lang="he-IL" dirty="0"/>
-          </a:p>
-        </p:txBody>
-      </p:sp>
-      <p:sp>
-        <p:nvSpPr>
-          <p:cNvPr id="18436" name="Slide Number Placeholder 3"/>
-          <p:cNvSpPr>
-            <a:spLocks noGrp="1"/>
-          </p:cNvSpPr>
-          <p:nvPr>
-            <p:ph type="sldNum" sz="quarter" idx="11"/>
-          </p:nvPr>
-        </p:nvSpPr>
-        <p:spPr bwMode="auto">
-          <a:noFill/>
-          <a:extLst>
-            <a:ext uri="{909E8E84-426E-40DD-AFC4-6F175D3DCCD1}">
-              <a14:hiddenFill xmlns:a14="http://schemas.microsoft.com/office/drawing/2010/main">
-                <a:solidFill>
-                  <a:srgbClr val="FFFFFF"/>
-                </a:solidFill>
-              </a14:hiddenFill>
-            </a:ext>
-            <a:ext uri="{91240B29-F687-4F45-9708-019B960494DF}">
-              <a14:hiddenLine xmlns:a14="http://schemas.microsoft.com/office/drawing/2010/main" w="9525">
-                <a:solidFill>
-                  <a:srgbClr val="000000"/>
-                </a:solidFill>
-                <a:miter lim="800000"/>
-                <a:headEnd/>
-                <a:tailEnd/>
-              </a14:hiddenLine>
-            </a:ext>
-          </a:extLst>
-        </p:spPr>
-        <p:txBody>
-          <a:bodyPr vert="horz" wrap="square" lIns="91440" tIns="45720" rIns="91440" bIns="45720" numCol="1" anchor="t" anchorCtr="0" compatLnSpc="1">
-            <a:prstTxWarp prst="textNoShape">
-              <a:avLst/>
-            </a:prstTxWarp>
-          </a:bodyPr>
-          <a:lstStyle>
-            <a:lvl1pPr eaLnBrk="0" hangingPunct="0">
-              <a:defRPr>
-                <a:solidFill>
-                  <a:schemeClr val="tx1"/>
-                </a:solidFill>
-                <a:latin typeface="Arial" charset="0"/>
-                <a:cs typeface="Arial" charset="0"/>
-              </a:defRPr>
-            </a:lvl1pPr>
-            <a:lvl2pPr marL="742950" indent="-285750" eaLnBrk="0" hangingPunct="0">
-              <a:defRPr>
-                <a:solidFill>
-                  <a:schemeClr val="tx1"/>
-                </a:solidFill>
-                <a:latin typeface="Arial" charset="0"/>
-                <a:cs typeface="Arial" charset="0"/>
-              </a:defRPr>
-            </a:lvl2pPr>
-            <a:lvl3pPr marL="1143000" indent="-228600" eaLnBrk="0" hangingPunct="0">
-              <a:defRPr>
-                <a:solidFill>
-                  <a:schemeClr val="tx1"/>
-                </a:solidFill>
-                <a:latin typeface="Arial" charset="0"/>
-                <a:cs typeface="Arial" charset="0"/>
-              </a:defRPr>
-            </a:lvl3pPr>
-            <a:lvl4pPr marL="1600200" indent="-228600" eaLnBrk="0" hangingPunct="0">
-              <a:defRPr>
-                <a:solidFill>
-                  <a:schemeClr val="tx1"/>
-                </a:solidFill>
-                <a:latin typeface="Arial" charset="0"/>
-                <a:cs typeface="Arial" charset="0"/>
-              </a:defRPr>
-            </a:lvl4pPr>
-            <a:lvl5pPr marL="2057400" indent="-228600" eaLnBrk="0" hangingPunct="0">
-              <a:defRPr>
-                <a:solidFill>
-                  <a:schemeClr val="tx1"/>
-                </a:solidFill>
-                <a:latin typeface="Arial" charset="0"/>
-                <a:cs typeface="Arial" charset="0"/>
-              </a:defRPr>
-            </a:lvl5pPr>
-            <a:lvl6pPr marL="2514600" indent="-228600" algn="r" rtl="1" eaLnBrk="0" fontAlgn="base" hangingPunct="0">
-              <a:spcBef>
-                <a:spcPct val="0"/>
-              </a:spcBef>
-              <a:spcAft>
-                <a:spcPct val="0"/>
-              </a:spcAft>
-              <a:defRPr>
-                <a:solidFill>
-                  <a:schemeClr val="tx1"/>
-                </a:solidFill>
-                <a:latin typeface="Arial" charset="0"/>
-                <a:cs typeface="Arial" charset="0"/>
-              </a:defRPr>
-            </a:lvl6pPr>
-            <a:lvl7pPr marL="2971800" indent="-228600" algn="r" rtl="1" eaLnBrk="0" fontAlgn="base" hangingPunct="0">
-              <a:spcBef>
-                <a:spcPct val="0"/>
-              </a:spcBef>
-              <a:spcAft>
-                <a:spcPct val="0"/>
-              </a:spcAft>
-              <a:defRPr>
-                <a:solidFill>
-                  <a:schemeClr val="tx1"/>
-                </a:solidFill>
-                <a:latin typeface="Arial" charset="0"/>
-                <a:cs typeface="Arial" charset="0"/>
-              </a:defRPr>
-            </a:lvl7pPr>
-            <a:lvl8pPr marL="3429000" indent="-228600" algn="r" rtl="1" eaLnBrk="0" fontAlgn="base" hangingPunct="0">
-              <a:spcBef>
-                <a:spcPct val="0"/>
-              </a:spcBef>
-              <a:spcAft>
-                <a:spcPct val="0"/>
-              </a:spcAft>
-              <a:defRPr>
-                <a:solidFill>
-                  <a:schemeClr val="tx1"/>
-                </a:solidFill>
-                <a:latin typeface="Arial" charset="0"/>
-                <a:cs typeface="Arial" charset="0"/>
-              </a:defRPr>
-            </a:lvl8pPr>
-            <a:lvl9pPr marL="3886200" indent="-228600" algn="r" rtl="1" eaLnBrk="0" fontAlgn="base" hangingPunct="0">
-              <a:spcBef>
-                <a:spcPct val="0"/>
-              </a:spcBef>
-              <a:spcAft>
-                <a:spcPct val="0"/>
-              </a:spcAft>
-              <a:defRPr>
-                <a:solidFill>
-                  <a:schemeClr val="tx1"/>
-                </a:solidFill>
-                <a:latin typeface="Arial" charset="0"/>
-                <a:cs typeface="Arial" charset="0"/>
-              </a:defRPr>
-            </a:lvl9pPr>
-          </a:lstStyle>
-          <a:p>
-            <a:pPr eaLnBrk="1" hangingPunct="1"/>
-            <a:fld id="{11F1AA19-9141-472E-89E4-8C389C88C0EC}" type="slidenum">
-              <a:rPr lang="he-IL" smtClean="0">
-                <a:solidFill>
-                  <a:schemeClr val="bg1"/>
-                </a:solidFill>
-              </a:rPr>
-              <a:pPr eaLnBrk="1" hangingPunct="1"/>
-              <a:t>10</a:t>
-            </a:fld>
-            <a:endParaRPr lang="en-US" smtClean="0">
-              <a:solidFill>
-                <a:schemeClr val="bg1"/>
-              </a:solidFill>
-            </a:endParaRPr>
-          </a:p>
-        </p:txBody>
-      </p:sp>
-      <p:sp>
-        <p:nvSpPr>
-          <p:cNvPr id="18463" name="Rectangle 1"/>
-          <p:cNvSpPr>
-            <a:spLocks noChangeArrowheads="1"/>
-          </p:cNvSpPr>
-          <p:nvPr/>
-        </p:nvSpPr>
-        <p:spPr bwMode="auto">
-          <a:xfrm>
-            <a:off x="1116013" y="5084763"/>
-            <a:ext cx="9144000" cy="457200"/>
-          </a:xfrm>
-          <a:prstGeom prst="rect">
-            <a:avLst/>
-          </a:prstGeom>
-          <a:noFill/>
-          <a:ln>
-            <a:noFill/>
-          </a:ln>
-          <a:effectLst/>
-          <a:extLst>
-            <a:ext uri="{909E8E84-426E-40DD-AFC4-6F175D3DCCD1}">
-              <a14:hiddenFill xmlns:a14="http://schemas.microsoft.com/office/drawing/2010/main">
-                <a:solidFill>
-                  <a:schemeClr val="accent1"/>
-                </a:solidFill>
-              </a14:hiddenFill>
-            </a:ext>
-            <a:ext uri="{91240B29-F687-4F45-9708-019B960494DF}">
-              <a14:hiddenLine xmlns:a14="http://schemas.microsoft.com/office/drawing/2010/main" w="9525">
-                <a:solidFill>
-                  <a:schemeClr val="tx1"/>
-                </a:solidFill>
-                <a:miter lim="800000"/>
-                <a:headEnd/>
-                <a:tailEnd/>
-              </a14:hiddenLine>
-            </a:ext>
-            <a:ext uri="{AF507438-7753-43E0-B8FC-AC1667EBCBE1}">
-              <a14:hiddenEffects xmlns:a14="http://schemas.microsoft.com/office/drawing/2010/main">
-                <a:effectLst>
-                  <a:outerShdw dist="35921" dir="2700000" algn="ctr" rotWithShape="0">
-                    <a:schemeClr val="bg2"/>
-                  </a:outerShdw>
-                </a:effectLst>
-              </a14:hiddenEffects>
-            </a:ext>
-          </a:extLst>
-        </p:spPr>
-        <p:txBody>
-          <a:bodyPr wrap="none" anchor="ctr">
-            <a:spAutoFit/>
-          </a:bodyPr>
-          <a:lstStyle/>
-          <a:p>
-            <a:pPr eaLnBrk="0" hangingPunct="0"/>
-            <a:endParaRPr lang="he-IL"/>
-          </a:p>
-        </p:txBody>
-      </p:sp>
-    </p:spTree>
-    <p:extLst>
-      <p:ext uri="{BB962C8B-B14F-4D97-AF65-F5344CB8AC3E}">
-        <p14:creationId xmlns:p14="http://schemas.microsoft.com/office/powerpoint/2010/main" val="897997203"/>
-      </p:ext>
-    </p:extLst>
-  </p:cSld>
-  <p:clrMapOvr>
-    <a:masterClrMapping/>
-  </p:clrMapOvr>
-  <p:transition/>
-  <p:timing>
-    <p:tnLst>
-      <p:par>
-        <p:cTn id="1" dur="indefinite" restart="never" nodeType="tmRoot"/>
-      </p:par>
-    </p:tnLst>
-  </p:timing>
-</p:sld>
-</file>
-
-<file path=ppt/slides/slide2.xml><?xml version="1.0" encoding="utf-8"?>
-<p:sld xmlns:a="http://schemas.openxmlformats.org/drawingml/2006/main" xmlns:r="http://schemas.openxmlformats.org/officeDocument/2006/relationships" xmlns:p="http://schemas.openxmlformats.org/presentationml/2006/main">
-  <p:cSld>
-    <p:spTree>
-      <p:nvGrpSpPr>
-        <p:cNvPr id="1" name=""/>
-        <p:cNvGrpSpPr/>
-        <p:nvPr/>
-      </p:nvGrpSpPr>
-      <p:grpSpPr>
-        <a:xfrm>
-          <a:off x="0" y="0"/>
-          <a:ext cx="0" cy="0"/>
-          <a:chOff x="0" y="0"/>
-          <a:chExt cx="0" cy="0"/>
-        </a:xfrm>
-      </p:grpSpPr>
-      <p:sp>
-        <p:nvSpPr>
-          <p:cNvPr id="6" name="Content Placeholder 5"/>
-          <p:cNvSpPr>
-            <a:spLocks noGrp="1"/>
-          </p:cNvSpPr>
-          <p:nvPr>
-            <p:ph idx="1"/>
-          </p:nvPr>
-        </p:nvSpPr>
-        <p:spPr/>
-        <p:txBody>
-          <a:bodyPr/>
-          <a:lstStyle/>
-          <a:p>
-            <a:r>
-              <a:rPr lang="en-US" sz="1100" dirty="0" smtClean="0"/>
-              <a:t>RTC shall record system status and events using read / write to internal FLASH memory in the following conditions:</a:t>
-            </a:r>
-          </a:p>
-          <a:p>
-            <a:pPr lvl="1"/>
-            <a:r>
-              <a:rPr lang="en-US" sz="1100" dirty="0" smtClean="0"/>
-              <a:t>Write rate = The telemetric data base will be saved at the flash memory once in a 100 </a:t>
-            </a:r>
-            <a:r>
-              <a:rPr lang="en-US" sz="1100" dirty="0" err="1" smtClean="0"/>
-              <a:t>msec</a:t>
-            </a:r>
-            <a:r>
-              <a:rPr lang="en-US" sz="1100" dirty="0" smtClean="0"/>
-              <a:t> (100 </a:t>
-            </a:r>
-            <a:r>
-              <a:rPr lang="en-US" sz="1100" dirty="0" err="1" smtClean="0"/>
-              <a:t>msec</a:t>
-            </a:r>
-            <a:r>
-              <a:rPr lang="en-US" sz="1100" dirty="0" smtClean="0"/>
-              <a:t> equal to the fastest rate level). The write to flash operation will use HBS method:</a:t>
-            </a:r>
-            <a:r>
-              <a:rPr lang="en-US" sz="1100" dirty="0"/>
-              <a:t> </a:t>
-            </a:r>
-            <a:r>
-              <a:rPr lang="en-US" sz="1100" dirty="0" err="1" smtClean="0"/>
-              <a:t>p_CDS_write</a:t>
-            </a:r>
-            <a:r>
-              <a:rPr lang="en-US" sz="1100" dirty="0" smtClean="0"/>
-              <a:t>.</a:t>
-            </a:r>
-          </a:p>
-          <a:p>
-            <a:pPr lvl="1"/>
-            <a:r>
-              <a:rPr lang="en-US" sz="1100" dirty="0" smtClean="0"/>
-              <a:t>Read rate = The RTC VTU module will read the telemetric data in cyclic loop once in a 1 second (using TLM module SW API), this data will be parsing and present in the RT viewer application. </a:t>
-            </a:r>
-            <a:r>
-              <a:rPr lang="en-US" sz="1100" dirty="0"/>
-              <a:t>The </a:t>
-            </a:r>
-            <a:r>
-              <a:rPr lang="en-US" sz="1100" dirty="0" smtClean="0"/>
-              <a:t>read from flash operation will use </a:t>
-            </a:r>
-            <a:r>
-              <a:rPr lang="en-US" sz="1100" dirty="0"/>
-              <a:t>HBS method: </a:t>
-            </a:r>
-            <a:r>
-              <a:rPr lang="en-US" sz="1100" dirty="0" err="1" smtClean="0"/>
-              <a:t>p_CDS_read</a:t>
-            </a:r>
-            <a:r>
-              <a:rPr lang="en-US" sz="1100" dirty="0" smtClean="0"/>
-              <a:t>.</a:t>
-            </a:r>
-          </a:p>
-          <a:p>
-            <a:pPr lvl="1"/>
-            <a:r>
-              <a:rPr lang="en-US" sz="1100" dirty="0" smtClean="0"/>
-              <a:t>Read upon request – The telemetric module will consist an SW API to export the telemetric data at any request time.</a:t>
-            </a:r>
-          </a:p>
-          <a:p>
-            <a:pPr lvl="1"/>
-            <a:r>
-              <a:rPr lang="en-US" sz="1100" dirty="0" smtClean="0"/>
-              <a:t>The </a:t>
-            </a:r>
-            <a:r>
-              <a:rPr lang="en-US" sz="1100" dirty="0"/>
-              <a:t>write </a:t>
-            </a:r>
-            <a:r>
-              <a:rPr lang="en-US" sz="1100" dirty="0" smtClean="0"/>
-              <a:t> to flash operations </a:t>
-            </a:r>
-            <a:r>
-              <a:rPr lang="en-US" sz="1100" dirty="0"/>
-              <a:t>will </a:t>
-            </a:r>
-            <a:r>
-              <a:rPr lang="en-US" sz="1100" dirty="0" smtClean="0"/>
-              <a:t>be protected in thread safe (this protection will be a part of the HBS API).</a:t>
-            </a:r>
-          </a:p>
-          <a:p>
-            <a:pPr marL="0" indent="0">
-              <a:buNone/>
-            </a:pPr>
-            <a:endParaRPr lang="en-US" sz="1100" dirty="0" smtClean="0"/>
-          </a:p>
-          <a:p>
-            <a:r>
-              <a:rPr lang="en-US" sz="1100" dirty="0" smtClean="0"/>
-              <a:t>The RTC telemetric operation shall be:</a:t>
-            </a:r>
-          </a:p>
-          <a:p>
-            <a:pPr lvl="1"/>
-            <a:r>
-              <a:rPr lang="en-US" sz="1100" dirty="0" smtClean="0"/>
-              <a:t>Cyclic – replace old stored data with new values when cycle time elapsed.</a:t>
-            </a:r>
-          </a:p>
-          <a:p>
-            <a:pPr lvl="1"/>
-            <a:r>
-              <a:rPr lang="en-US" sz="1100" dirty="0" smtClean="0"/>
-              <a:t>Deterministic – Each cycle is defined by time (each parameter has its own sample time interval) and record same data structure on each cycle iteration.</a:t>
-            </a:r>
-          </a:p>
-          <a:p>
-            <a:r>
-              <a:rPr lang="en-US" sz="1100" dirty="0" smtClean="0"/>
-              <a:t>  Each RTC software module has its own telemetric data structure. This structure consist all the internal data members that need to be recorded in the telemetric cycle.  </a:t>
-            </a:r>
-          </a:p>
-          <a:p>
-            <a:r>
-              <a:rPr lang="en-US" sz="1100" dirty="0" smtClean="0"/>
-              <a:t>Each RTC module has its own data base files (*.c, *,h)  that defined the module telemetric data fields that need to be sampled during telemetric record process. Using windows software application tool the system user can edit the telemetric data base parameters.</a:t>
-            </a:r>
-          </a:p>
-          <a:p>
-            <a:r>
-              <a:rPr lang="en-US" sz="1100" dirty="0" smtClean="0"/>
-              <a:t>Each data member that is part of the telemetric data base has its own: rate level (sampled time: fast, normal, slow), data type, Current data value, visually </a:t>
-            </a:r>
-            <a:r>
-              <a:rPr lang="en-US" sz="1100" dirty="0"/>
-              <a:t>and </a:t>
-            </a:r>
-            <a:r>
-              <a:rPr lang="en-US" sz="1100" dirty="0" smtClean="0"/>
-              <a:t>rate level.</a:t>
-            </a:r>
-          </a:p>
-          <a:p>
-            <a:r>
-              <a:rPr lang="en-US" sz="1100" dirty="0" smtClean="0"/>
-              <a:t>At future step the telemetric data should be export via VTU module in order to analyze the exported data in the RT viewer application. This data will be represent in textual or graphic way. (RT viewer will need to be update in order to support this issue)</a:t>
-            </a:r>
-            <a:endParaRPr lang="en-US" sz="1400" dirty="0" smtClean="0"/>
-          </a:p>
-          <a:p>
-            <a:pPr marL="0" indent="0">
-              <a:buNone/>
-            </a:pPr>
-            <a:r>
-              <a:rPr lang="en-US" dirty="0" smtClean="0"/>
-              <a:t>  </a:t>
-            </a:r>
-          </a:p>
-        </p:txBody>
-      </p:sp>
-      <p:sp>
-        <p:nvSpPr>
-          <p:cNvPr id="5" name="Title 4"/>
-          <p:cNvSpPr>
-            <a:spLocks noGrp="1"/>
-          </p:cNvSpPr>
-          <p:nvPr>
-            <p:ph type="title"/>
-          </p:nvPr>
-        </p:nvSpPr>
-        <p:spPr/>
-        <p:txBody>
-          <a:bodyPr/>
-          <a:lstStyle/>
-          <a:p>
-            <a:r>
-              <a:rPr lang="en-US" dirty="0" smtClean="0"/>
-              <a:t>RT TLM Requirements</a:t>
-            </a:r>
-            <a:endParaRPr lang="en-US" dirty="0"/>
-          </a:p>
-        </p:txBody>
-      </p:sp>
-    </p:spTree>
-    <p:extLst>
-      <p:ext uri="{BB962C8B-B14F-4D97-AF65-F5344CB8AC3E}">
-        <p14:creationId xmlns:p14="http://schemas.microsoft.com/office/powerpoint/2010/main" val="4166834640"/>
-      </p:ext>
-    </p:extLst>
-  </p:cSld>
-  <p:clrMapOvr>
-    <a:masterClrMapping/>
-  </p:clrMapOvr>
-  <p:transition/>
-  <p:timing>
-    <p:tnLst>
-      <p:par>
-        <p:cTn id="1" dur="indefinite" restart="never" nodeType="tmRoot"/>
-      </p:par>
-    </p:tnLst>
-  </p:timing>
-</p:sld>
-</file>
-
-<file path=ppt/slides/slide3.xml><?xml version="1.0" encoding="utf-8"?>
-<p:sld xmlns:a="http://schemas.openxmlformats.org/drawingml/2006/main" xmlns:r="http://schemas.openxmlformats.org/officeDocument/2006/relationships" xmlns:p="http://schemas.openxmlformats.org/presentationml/2006/main">
-  <p:cSld>
-    <p:spTree>
-      <p:nvGrpSpPr>
-        <p:cNvPr id="1" name=""/>
-        <p:cNvGrpSpPr/>
-        <p:nvPr/>
-      </p:nvGrpSpPr>
-      <p:grpSpPr>
-        <a:xfrm>
-          <a:off x="0" y="0"/>
-          <a:ext cx="0" cy="0"/>
-          <a:chOff x="0" y="0"/>
-          <a:chExt cx="0" cy="0"/>
-        </a:xfrm>
-      </p:grpSpPr>
-      <p:sp>
-        <p:nvSpPr>
-          <p:cNvPr id="6" name="Content Placeholder 5"/>
-          <p:cNvSpPr>
-            <a:spLocks noGrp="1"/>
-          </p:cNvSpPr>
-          <p:nvPr>
-            <p:ph idx="1"/>
-          </p:nvPr>
-        </p:nvSpPr>
-        <p:spPr/>
-        <p:txBody>
-          <a:bodyPr/>
-          <a:lstStyle/>
-          <a:p>
-            <a:r>
-              <a:rPr lang="en-US" dirty="0" smtClean="0"/>
-              <a:t>Data member structure:</a:t>
-            </a:r>
-          </a:p>
-          <a:p>
-            <a:pPr lvl="1"/>
-            <a:r>
-              <a:rPr lang="en-US" sz="1400" dirty="0" smtClean="0"/>
-              <a:t>Offset [void*]: pointer to address of the real location of the module data member.</a:t>
-            </a:r>
-          </a:p>
-          <a:p>
-            <a:pPr lvl="1"/>
-            <a:r>
-              <a:rPr lang="en-US" sz="1400" dirty="0" smtClean="0"/>
-              <a:t>Data type [One of the list below]: Data type for specific data member.</a:t>
-            </a:r>
-          </a:p>
-          <a:p>
-            <a:pPr lvl="1"/>
-            <a:r>
-              <a:rPr lang="en-US" sz="1400" dirty="0" smtClean="0"/>
-              <a:t>Data value [Data type]: Current data value of the parameter.</a:t>
-            </a:r>
-          </a:p>
-          <a:p>
-            <a:pPr lvl="1"/>
-            <a:r>
-              <a:rPr lang="en-US" sz="1400" dirty="0" smtClean="0"/>
-              <a:t>Visually [Boolean]: If the data will be show in RT viewer application.</a:t>
-            </a:r>
-            <a:endParaRPr lang="he-IL" sz="1400" dirty="0" smtClean="0"/>
-          </a:p>
-          <a:p>
-            <a:pPr lvl="1"/>
-            <a:r>
-              <a:rPr lang="en-US" sz="1400" dirty="0" smtClean="0"/>
-              <a:t>Flash (Boolean): Store parameter in flash (flag = true), otherwise the parameter will not be save in the flash.</a:t>
-            </a:r>
-          </a:p>
-          <a:p>
-            <a:pPr lvl="1"/>
-            <a:r>
-              <a:rPr lang="en-US" sz="1400" dirty="0" smtClean="0"/>
-              <a:t>Rate level [</a:t>
-            </a:r>
-            <a:r>
-              <a:rPr lang="en-US" sz="1400" dirty="0" err="1" smtClean="0"/>
-              <a:t>Enum</a:t>
-            </a:r>
-            <a:r>
-              <a:rPr lang="en-US" sz="1400" dirty="0" smtClean="0"/>
-              <a:t> RATE_LEVEL]: sample time interval (fast, normal, slow).</a:t>
-            </a:r>
-            <a:endParaRPr lang="en-US" sz="1400" dirty="0"/>
-          </a:p>
-          <a:p>
-            <a:r>
-              <a:rPr lang="en-US" dirty="0" smtClean="0"/>
-              <a:t>When </a:t>
-            </a:r>
-            <a:endParaRPr lang="en-US" dirty="0"/>
-          </a:p>
-          <a:p>
-            <a:pPr lvl="1"/>
-            <a:r>
-              <a:rPr lang="en-US" sz="1400" dirty="0" smtClean="0"/>
-              <a:t>Data member type range: </a:t>
-            </a:r>
-            <a:r>
-              <a:rPr lang="en-US" sz="1400" dirty="0" err="1"/>
-              <a:t>int</a:t>
-            </a:r>
-            <a:r>
-              <a:rPr lang="en-US" sz="1400" dirty="0"/>
-              <a:t> (</a:t>
-            </a:r>
-            <a:r>
-              <a:rPr lang="en-US" sz="1400" dirty="0" err="1"/>
-              <a:t>interger</a:t>
-            </a:r>
-            <a:r>
-              <a:rPr lang="en-US" sz="1400" dirty="0"/>
-              <a:t>), </a:t>
-            </a:r>
-            <a:r>
-              <a:rPr lang="en-US" sz="1400" dirty="0" err="1"/>
-              <a:t>uint</a:t>
-            </a:r>
-            <a:r>
-              <a:rPr lang="en-US" sz="1400" dirty="0"/>
-              <a:t>,  real (double), char, </a:t>
-            </a:r>
-            <a:r>
-              <a:rPr lang="en-US" sz="1400" dirty="0" err="1"/>
-              <a:t>uchar</a:t>
-            </a:r>
-            <a:r>
-              <a:rPr lang="en-US" sz="1400" dirty="0"/>
-              <a:t>, </a:t>
-            </a:r>
-            <a:r>
-              <a:rPr lang="en-US" sz="1400" dirty="0" err="1"/>
-              <a:t>ushort</a:t>
-            </a:r>
-            <a:r>
-              <a:rPr lang="en-US" sz="1400" dirty="0"/>
-              <a:t>, short</a:t>
-            </a:r>
-            <a:r>
-              <a:rPr lang="en-US" sz="1400" dirty="0" smtClean="0"/>
-              <a:t>.</a:t>
-            </a:r>
-          </a:p>
-          <a:p>
-            <a:pPr lvl="1"/>
-            <a:r>
-              <a:rPr lang="en-US" sz="1400" dirty="0" smtClean="0"/>
-              <a:t>Rate level (sample time interval [</a:t>
-            </a:r>
-            <a:r>
-              <a:rPr lang="en-US" sz="1400" dirty="0" err="1" smtClean="0"/>
-              <a:t>msec</a:t>
-            </a:r>
-            <a:r>
-              <a:rPr lang="en-US" sz="1400" dirty="0" smtClean="0"/>
-              <a:t>]): fast – 100, normal – 300, slow – 500.</a:t>
-            </a:r>
-          </a:p>
-          <a:p>
-            <a:pPr marL="457200" lvl="1" indent="0">
-              <a:buNone/>
-            </a:pPr>
-            <a:r>
-              <a:rPr lang="en-US" sz="1400" dirty="0" smtClean="0"/>
-              <a:t>  </a:t>
-            </a:r>
-          </a:p>
-          <a:p>
-            <a:pPr marL="0" indent="0">
-              <a:buNone/>
-            </a:pPr>
-            <a:endParaRPr lang="en-US" dirty="0" smtClean="0"/>
-          </a:p>
-          <a:p>
-            <a:pPr marL="0" indent="0">
-              <a:buNone/>
-            </a:pPr>
-            <a:r>
-              <a:rPr lang="en-US" dirty="0" smtClean="0"/>
-              <a:t>  </a:t>
-            </a:r>
-          </a:p>
-        </p:txBody>
-      </p:sp>
-      <p:sp>
-        <p:nvSpPr>
-          <p:cNvPr id="5" name="Title 4"/>
-          <p:cNvSpPr>
-            <a:spLocks noGrp="1"/>
-          </p:cNvSpPr>
-          <p:nvPr>
-            <p:ph type="title"/>
-          </p:nvPr>
-        </p:nvSpPr>
-        <p:spPr/>
-        <p:txBody>
-          <a:bodyPr/>
-          <a:lstStyle/>
-          <a:p>
-            <a:r>
-              <a:rPr lang="en-US" dirty="0" smtClean="0"/>
-              <a:t>RT TLM Requirements</a:t>
-            </a:r>
-            <a:endParaRPr lang="en-US" dirty="0"/>
-          </a:p>
-        </p:txBody>
-      </p:sp>
-    </p:spTree>
-    <p:extLst>
-      <p:ext uri="{BB962C8B-B14F-4D97-AF65-F5344CB8AC3E}">
-        <p14:creationId xmlns:p14="http://schemas.microsoft.com/office/powerpoint/2010/main" val="4121369026"/>
-      </p:ext>
-    </p:extLst>
-  </p:cSld>
-  <p:clrMapOvr>
-    <a:masterClrMapping/>
-  </p:clrMapOvr>
-  <p:transition/>
-  <p:timing>
-    <p:tnLst>
-      <p:par>
-        <p:cTn id="1" dur="indefinite" restart="never" nodeType="tmRoot"/>
-      </p:par>
-    </p:tnLst>
-  </p:timing>
-</p:sld>
-</file>
-
-<file path=ppt/slides/slide4.xml><?xml version="1.0" encoding="utf-8"?>
-<p:sld xmlns:a="http://schemas.openxmlformats.org/drawingml/2006/main" xmlns:r="http://schemas.openxmlformats.org/officeDocument/2006/relationships" xmlns:p="http://schemas.openxmlformats.org/presentationml/2006/main">
-  <p:cSld>
-    <p:spTree>
-      <p:nvGrpSpPr>
-        <p:cNvPr id="1" name=""/>
-        <p:cNvGrpSpPr/>
-        <p:nvPr/>
-      </p:nvGrpSpPr>
-      <p:grpSpPr>
-        <a:xfrm>
-          <a:off x="0" y="0"/>
-          <a:ext cx="0" cy="0"/>
-          <a:chOff x="0" y="0"/>
-          <a:chExt cx="0" cy="0"/>
-        </a:xfrm>
-      </p:grpSpPr>
-      <p:sp>
-        <p:nvSpPr>
-          <p:cNvPr id="6" name="Content Placeholder 5"/>
-          <p:cNvSpPr>
-            <a:spLocks noGrp="1"/>
-          </p:cNvSpPr>
-          <p:nvPr>
-            <p:ph idx="1"/>
-          </p:nvPr>
-        </p:nvSpPr>
-        <p:spPr>
-          <a:xfrm>
-            <a:off x="179388" y="1080000"/>
-            <a:ext cx="8713787" cy="2448060"/>
-          </a:xfrm>
-        </p:spPr>
-        <p:txBody>
-          <a:bodyPr/>
-          <a:lstStyle/>
-          <a:p>
-            <a:r>
-              <a:rPr lang="en-US" dirty="0"/>
-              <a:t> </a:t>
-            </a:r>
-            <a:r>
-              <a:rPr lang="en-US" sz="1400" dirty="0" smtClean="0"/>
-              <a:t>Each telemetric plan will be in an ICD file format (.grep file).</a:t>
-            </a:r>
-          </a:p>
-          <a:p>
-            <a:r>
-              <a:rPr lang="en-US" sz="1400" dirty="0"/>
-              <a:t> </a:t>
-            </a:r>
-            <a:r>
-              <a:rPr lang="en-US" sz="1400" dirty="0" smtClean="0"/>
-              <a:t>The telemetric plan members will be build throw GDE application. </a:t>
-            </a:r>
-          </a:p>
-          <a:p>
-            <a:r>
-              <a:rPr lang="en-US" sz="1400" dirty="0"/>
-              <a:t> </a:t>
-            </a:r>
-            <a:r>
-              <a:rPr lang="en-US" sz="1400" dirty="0" smtClean="0"/>
-              <a:t>Each telemetric plan member will consist fields as described in the previous slides (RATE_LEVEL, flash flag, </a:t>
-            </a:r>
-            <a:r>
-              <a:rPr lang="en-US" sz="1400" dirty="0" err="1" smtClean="0"/>
-              <a:t>etc</a:t>
-            </a:r>
-            <a:r>
-              <a:rPr lang="en-US" sz="1400" dirty="0" smtClean="0"/>
-              <a:t> …).</a:t>
-            </a:r>
-          </a:p>
-          <a:p>
-            <a:r>
-              <a:rPr lang="en-US" sz="1400" dirty="0" smtClean="0"/>
-              <a:t> In this solution the VTU (and therefore the RT viewer) and the RTC telemetric module will share same software building units (same data types, structures, </a:t>
-            </a:r>
-            <a:r>
-              <a:rPr lang="en-US" sz="1400" dirty="0" err="1" smtClean="0"/>
-              <a:t>etc</a:t>
-            </a:r>
-            <a:r>
-              <a:rPr lang="en-US" sz="1400" dirty="0" smtClean="0"/>
-              <a:t>…)</a:t>
-            </a:r>
-          </a:p>
-          <a:p>
-            <a:pPr marL="0" indent="0">
-              <a:buNone/>
-            </a:pPr>
-            <a:endParaRPr lang="en-US" dirty="0" smtClean="0"/>
-          </a:p>
-          <a:p>
-            <a:pPr marL="0" indent="0">
-              <a:buNone/>
-            </a:pPr>
-            <a:r>
-              <a:rPr lang="en-US" dirty="0" smtClean="0"/>
-              <a:t>  </a:t>
-            </a:r>
-          </a:p>
-        </p:txBody>
-      </p:sp>
-      <p:sp>
-        <p:nvSpPr>
-          <p:cNvPr id="5" name="Title 4"/>
-          <p:cNvSpPr>
-            <a:spLocks noGrp="1"/>
-          </p:cNvSpPr>
-          <p:nvPr>
-            <p:ph type="title"/>
-          </p:nvPr>
-        </p:nvSpPr>
-        <p:spPr/>
-        <p:txBody>
-          <a:bodyPr/>
-          <a:lstStyle/>
-          <a:p>
-            <a:pPr algn="ctr" rtl="0"/>
-            <a:r>
-              <a:rPr lang="en-US" dirty="0"/>
-              <a:t>RT TLM parameters configuration</a:t>
-            </a:r>
-            <a:br>
-              <a:rPr lang="en-US" dirty="0"/>
-            </a:br>
-            <a:r>
-              <a:rPr lang="en-US" dirty="0"/>
-              <a:t>Solution </a:t>
-            </a:r>
-            <a:r>
-              <a:rPr lang="en-US" dirty="0" smtClean="0"/>
-              <a:t>A – ICD messages</a:t>
-            </a:r>
-            <a:endParaRPr lang="en-US" dirty="0"/>
-          </a:p>
-        </p:txBody>
-      </p:sp>
-    </p:spTree>
-    <p:extLst>
-      <p:ext uri="{BB962C8B-B14F-4D97-AF65-F5344CB8AC3E}">
-        <p14:creationId xmlns:p14="http://schemas.microsoft.com/office/powerpoint/2010/main" val="1509595162"/>
-      </p:ext>
-    </p:extLst>
-  </p:cSld>
-  <p:clrMapOvr>
-    <a:masterClrMapping/>
-  </p:clrMapOvr>
-  <p:transition/>
-  <p:timing>
-    <p:tnLst>
-      <p:par>
-        <p:cTn id="1" dur="indefinite" restart="never" nodeType="tmRoot"/>
-      </p:par>
-    </p:tnLst>
-  </p:timing>
-</p:sld>
-</file>
-
-<file path=ppt/slides/slide5.xml><?xml version="1.0" encoding="utf-8"?>
-<p:sld xmlns:a="http://schemas.openxmlformats.org/drawingml/2006/main" xmlns:r="http://schemas.openxmlformats.org/officeDocument/2006/relationships" xmlns:p="http://schemas.openxmlformats.org/presentationml/2006/main">
-  <p:cSld>
-    <p:spTree>
-      <p:nvGrpSpPr>
-        <p:cNvPr id="1" name=""/>
-        <p:cNvGrpSpPr/>
-        <p:nvPr/>
-      </p:nvGrpSpPr>
-      <p:grpSpPr>
-        <a:xfrm>
-          <a:off x="0" y="0"/>
-          <a:ext cx="0" cy="0"/>
-          <a:chOff x="0" y="0"/>
-          <a:chExt cx="0" cy="0"/>
-        </a:xfrm>
-      </p:grpSpPr>
-      <p:sp>
-        <p:nvSpPr>
-          <p:cNvPr id="6" name="Content Placeholder 5"/>
-          <p:cNvSpPr>
-            <a:spLocks noGrp="1"/>
-          </p:cNvSpPr>
-          <p:nvPr>
-            <p:ph idx="1"/>
-          </p:nvPr>
-        </p:nvSpPr>
-        <p:spPr>
-          <a:xfrm>
-            <a:off x="179388" y="1080001"/>
-            <a:ext cx="8713787" cy="651146"/>
-          </a:xfrm>
-        </p:spPr>
-        <p:txBody>
-          <a:bodyPr/>
-          <a:lstStyle/>
-          <a:p>
-            <a:r>
-              <a:rPr lang="en-US" dirty="0" smtClean="0"/>
-              <a:t>Parameters configurator tool goal is to add ability to insert / remove / view parameters for a chosen RTC module.  </a:t>
-            </a:r>
-          </a:p>
-          <a:p>
-            <a:pPr marL="0" indent="0">
-              <a:buNone/>
-            </a:pPr>
-            <a:endParaRPr lang="en-US" dirty="0" smtClean="0"/>
-          </a:p>
-          <a:p>
-            <a:pPr marL="0" indent="0">
-              <a:buNone/>
-            </a:pPr>
-            <a:r>
-              <a:rPr lang="en-US" dirty="0" smtClean="0"/>
-              <a:t>  </a:t>
-            </a:r>
-          </a:p>
-        </p:txBody>
-      </p:sp>
-      <p:sp>
-        <p:nvSpPr>
-          <p:cNvPr id="5" name="Title 4"/>
-          <p:cNvSpPr>
-            <a:spLocks noGrp="1"/>
-          </p:cNvSpPr>
-          <p:nvPr>
-            <p:ph type="title"/>
-          </p:nvPr>
-        </p:nvSpPr>
-        <p:spPr/>
-        <p:txBody>
-          <a:bodyPr/>
-          <a:lstStyle/>
-          <a:p>
-            <a:pPr algn="ctr" rtl="0"/>
-            <a:r>
-              <a:rPr lang="en-US" sz="2000" dirty="0"/>
-              <a:t>RT TLM parameters configuration</a:t>
-            </a:r>
-            <a:br>
-              <a:rPr lang="en-US" sz="2000" dirty="0"/>
-            </a:br>
-            <a:r>
-              <a:rPr lang="en-US" sz="2000" dirty="0"/>
-              <a:t>Solution </a:t>
-            </a:r>
-            <a:r>
-              <a:rPr lang="en-US" sz="2000" dirty="0" smtClean="0"/>
-              <a:t>B – Parameters configurator tool </a:t>
-            </a:r>
-            <a:endParaRPr lang="en-US" sz="2000" dirty="0"/>
-          </a:p>
-        </p:txBody>
-      </p:sp>
-      <p:pic>
-        <p:nvPicPr>
-          <p:cNvPr id="2" name="Picture 2"/>
-          <p:cNvPicPr>
-            <a:picLocks noChangeAspect="1" noChangeArrowheads="1"/>
-          </p:cNvPicPr>
-          <p:nvPr/>
-        </p:nvPicPr>
-        <p:blipFill>
-          <a:blip r:embed="rId2">
-            <a:extLst>
-              <a:ext uri="{28A0092B-C50C-407E-A947-70E740481C1C}">
-                <a14:useLocalDpi xmlns:a14="http://schemas.microsoft.com/office/drawing/2010/main" val="0"/>
-              </a:ext>
-            </a:extLst>
-          </a:blip>
-          <a:srcRect/>
-          <a:stretch>
-            <a:fillRect/>
-          </a:stretch>
-        </p:blipFill>
-        <p:spPr bwMode="auto">
-          <a:xfrm>
-            <a:off x="556003" y="2148052"/>
-            <a:ext cx="3499788" cy="1120210"/>
-          </a:xfrm>
-          <a:prstGeom prst="rect">
-            <a:avLst/>
-          </a:prstGeom>
-          <a:noFill/>
-          <a:ln>
-            <a:noFill/>
-          </a:ln>
-          <a:effectLst/>
-          <a:extLst>
-            <a:ext uri="{909E8E84-426E-40DD-AFC4-6F175D3DCCD1}">
-              <a14:hiddenFill xmlns:a14="http://schemas.microsoft.com/office/drawing/2010/main">
-                <a:solidFill>
-                  <a:schemeClr val="accent1"/>
-                </a:solidFill>
-              </a14:hiddenFill>
-            </a:ext>
-            <a:ext uri="{91240B29-F687-4F45-9708-019B960494DF}">
-              <a14:hiddenLine xmlns:a14="http://schemas.microsoft.com/office/drawing/2010/main" w="9525">
-                <a:solidFill>
-                  <a:schemeClr val="tx1"/>
-                </a:solidFill>
-                <a:miter lim="800000"/>
-                <a:headEnd/>
-                <a:tailEnd/>
-              </a14:hiddenLine>
-            </a:ext>
-            <a:ext uri="{AF507438-7753-43E0-B8FC-AC1667EBCBE1}">
-              <a14:hiddenEffects xmlns:a14="http://schemas.microsoft.com/office/drawing/2010/main">
-                <a:effectLst>
-                  <a:outerShdw dist="35921" dir="2700000" algn="ctr" rotWithShape="0">
-                    <a:schemeClr val="bg2"/>
-                  </a:outerShdw>
-                </a:effectLst>
-              </a14:hiddenEffects>
-            </a:ext>
-          </a:extLst>
-        </p:spPr>
-      </p:pic>
-      <p:sp>
-        <p:nvSpPr>
-          <p:cNvPr id="3" name="TextBox 2"/>
-          <p:cNvSpPr txBox="1"/>
-          <p:nvPr/>
-        </p:nvSpPr>
-        <p:spPr>
-          <a:xfrm>
-            <a:off x="528452" y="1778720"/>
-            <a:ext cx="3650358" cy="338554"/>
-          </a:xfrm>
-          <a:prstGeom prst="rect">
-            <a:avLst/>
-          </a:prstGeom>
-          <a:noFill/>
-        </p:spPr>
-        <p:txBody>
-          <a:bodyPr wrap="none" rtlCol="0">
-            <a:spAutoFit/>
-          </a:bodyPr>
-          <a:lstStyle/>
-          <a:p>
-            <a:pPr algn="l" rtl="0"/>
-            <a:r>
-              <a:rPr lang="en-US" sz="1600" dirty="0" smtClean="0"/>
-              <a:t>Configure path to DB files and module</a:t>
-            </a:r>
-            <a:endParaRPr lang="en-US" sz="1600" dirty="0"/>
-          </a:p>
-        </p:txBody>
-      </p:sp>
-      <p:pic>
-        <p:nvPicPr>
-          <p:cNvPr id="4" name="Picture 3"/>
-          <p:cNvPicPr>
-            <a:picLocks noChangeAspect="1" noChangeArrowheads="1"/>
-          </p:cNvPicPr>
-          <p:nvPr/>
-        </p:nvPicPr>
-        <p:blipFill>
-          <a:blip r:embed="rId3">
-            <a:extLst>
-              <a:ext uri="{28A0092B-C50C-407E-A947-70E740481C1C}">
-                <a14:useLocalDpi xmlns:a14="http://schemas.microsoft.com/office/drawing/2010/main" val="0"/>
-              </a:ext>
-            </a:extLst>
-          </a:blip>
-          <a:srcRect/>
-          <a:stretch>
-            <a:fillRect/>
-          </a:stretch>
-        </p:blipFill>
-        <p:spPr bwMode="auto">
-          <a:xfrm>
-            <a:off x="571069" y="3834147"/>
-            <a:ext cx="3565124" cy="1826233"/>
-          </a:xfrm>
-          <a:prstGeom prst="rect">
-            <a:avLst/>
-          </a:prstGeom>
-          <a:noFill/>
-          <a:ln>
-            <a:noFill/>
-          </a:ln>
-          <a:effectLst/>
-          <a:extLst>
-            <a:ext uri="{909E8E84-426E-40DD-AFC4-6F175D3DCCD1}">
-              <a14:hiddenFill xmlns:a14="http://schemas.microsoft.com/office/drawing/2010/main">
-                <a:solidFill>
-                  <a:schemeClr val="accent1"/>
-                </a:solidFill>
-              </a14:hiddenFill>
-            </a:ext>
-            <a:ext uri="{91240B29-F687-4F45-9708-019B960494DF}">
-              <a14:hiddenLine xmlns:a14="http://schemas.microsoft.com/office/drawing/2010/main" w="9525">
-                <a:solidFill>
-                  <a:schemeClr val="tx1"/>
-                </a:solidFill>
-                <a:miter lim="800000"/>
-                <a:headEnd/>
-                <a:tailEnd/>
-              </a14:hiddenLine>
-            </a:ext>
-            <a:ext uri="{AF507438-7753-43E0-B8FC-AC1667EBCBE1}">
-              <a14:hiddenEffects xmlns:a14="http://schemas.microsoft.com/office/drawing/2010/main">
-                <a:effectLst>
-                  <a:outerShdw dist="35921" dir="2700000" algn="ctr" rotWithShape="0">
-                    <a:schemeClr val="bg2"/>
-                  </a:outerShdw>
-                </a:effectLst>
-              </a14:hiddenEffects>
-            </a:ext>
-          </a:extLst>
-        </p:spPr>
-      </p:pic>
-      <p:sp>
-        <p:nvSpPr>
-          <p:cNvPr id="9" name="TextBox 8"/>
-          <p:cNvSpPr txBox="1"/>
-          <p:nvPr/>
-        </p:nvSpPr>
-        <p:spPr>
-          <a:xfrm>
-            <a:off x="556003" y="3434643"/>
-            <a:ext cx="2364750" cy="369332"/>
-          </a:xfrm>
-          <a:prstGeom prst="rect">
-            <a:avLst/>
-          </a:prstGeom>
-          <a:noFill/>
-        </p:spPr>
-        <p:txBody>
-          <a:bodyPr wrap="none" rtlCol="0">
-            <a:spAutoFit/>
-          </a:bodyPr>
-          <a:lstStyle/>
-          <a:p>
-            <a:pPr algn="l" rtl="0"/>
-            <a:r>
-              <a:rPr lang="en-US" dirty="0" smtClean="0"/>
-              <a:t>Insert new parameter</a:t>
-            </a:r>
-            <a:endParaRPr lang="en-US" dirty="0"/>
-          </a:p>
-        </p:txBody>
-      </p:sp>
-      <p:pic>
-        <p:nvPicPr>
-          <p:cNvPr id="1028" name="Picture 4"/>
-          <p:cNvPicPr>
-            <a:picLocks noChangeAspect="1" noChangeArrowheads="1"/>
-          </p:cNvPicPr>
-          <p:nvPr/>
-        </p:nvPicPr>
-        <p:blipFill>
-          <a:blip r:embed="rId4">
-            <a:extLst>
-              <a:ext uri="{28A0092B-C50C-407E-A947-70E740481C1C}">
-                <a14:useLocalDpi xmlns:a14="http://schemas.microsoft.com/office/drawing/2010/main" val="0"/>
-              </a:ext>
-            </a:extLst>
-          </a:blip>
-          <a:srcRect/>
-          <a:stretch>
-            <a:fillRect/>
-          </a:stretch>
-        </p:blipFill>
-        <p:spPr bwMode="auto">
-          <a:xfrm>
-            <a:off x="4594762" y="2158893"/>
-            <a:ext cx="3426215" cy="1109369"/>
-          </a:xfrm>
-          <a:prstGeom prst="rect">
-            <a:avLst/>
-          </a:prstGeom>
-          <a:noFill/>
-          <a:ln>
-            <a:noFill/>
-          </a:ln>
-          <a:effectLst/>
-          <a:extLst>
-            <a:ext uri="{909E8E84-426E-40DD-AFC4-6F175D3DCCD1}">
-              <a14:hiddenFill xmlns:a14="http://schemas.microsoft.com/office/drawing/2010/main">
-                <a:solidFill>
-                  <a:schemeClr val="accent1"/>
-                </a:solidFill>
-              </a14:hiddenFill>
-            </a:ext>
-            <a:ext uri="{91240B29-F687-4F45-9708-019B960494DF}">
-              <a14:hiddenLine xmlns:a14="http://schemas.microsoft.com/office/drawing/2010/main" w="9525">
-                <a:solidFill>
-                  <a:schemeClr val="tx1"/>
-                </a:solidFill>
-                <a:miter lim="800000"/>
-                <a:headEnd/>
-                <a:tailEnd/>
-              </a14:hiddenLine>
-            </a:ext>
-            <a:ext uri="{AF507438-7753-43E0-B8FC-AC1667EBCBE1}">
-              <a14:hiddenEffects xmlns:a14="http://schemas.microsoft.com/office/drawing/2010/main">
-                <a:effectLst>
-                  <a:outerShdw dist="35921" dir="2700000" algn="ctr" rotWithShape="0">
-                    <a:schemeClr val="bg2"/>
-                  </a:outerShdw>
-                </a:effectLst>
-              </a14:hiddenEffects>
-            </a:ext>
-          </a:extLst>
-        </p:spPr>
-      </p:pic>
-      <p:sp>
-        <p:nvSpPr>
-          <p:cNvPr id="11" name="TextBox 10"/>
-          <p:cNvSpPr txBox="1"/>
-          <p:nvPr/>
-        </p:nvSpPr>
-        <p:spPr>
-          <a:xfrm>
-            <a:off x="4506264" y="1747942"/>
-            <a:ext cx="3890809" cy="369332"/>
-          </a:xfrm>
-          <a:prstGeom prst="rect">
-            <a:avLst/>
-          </a:prstGeom>
-          <a:noFill/>
-        </p:spPr>
-        <p:txBody>
-          <a:bodyPr wrap="none" rtlCol="0">
-            <a:spAutoFit/>
-          </a:bodyPr>
-          <a:lstStyle/>
-          <a:p>
-            <a:pPr algn="l" rtl="0"/>
-            <a:r>
-              <a:rPr lang="en-US" dirty="0" smtClean="0"/>
-              <a:t>Remove parameter from module DB</a:t>
-            </a:r>
-            <a:endParaRPr lang="en-US" dirty="0"/>
-          </a:p>
-        </p:txBody>
-      </p:sp>
-      <p:pic>
-        <p:nvPicPr>
-          <p:cNvPr id="1029" name="Picture 5"/>
-          <p:cNvPicPr>
-            <a:picLocks noChangeAspect="1" noChangeArrowheads="1"/>
-          </p:cNvPicPr>
-          <p:nvPr/>
-        </p:nvPicPr>
-        <p:blipFill>
-          <a:blip r:embed="rId5">
-            <a:extLst>
-              <a:ext uri="{28A0092B-C50C-407E-A947-70E740481C1C}">
-                <a14:useLocalDpi xmlns:a14="http://schemas.microsoft.com/office/drawing/2010/main" val="0"/>
-              </a:ext>
-            </a:extLst>
-          </a:blip>
-          <a:srcRect/>
-          <a:stretch>
-            <a:fillRect/>
-          </a:stretch>
-        </p:blipFill>
-        <p:spPr bwMode="auto">
-          <a:xfrm>
-            <a:off x="4594762" y="3834147"/>
-            <a:ext cx="3509205" cy="2280273"/>
-          </a:xfrm>
-          <a:prstGeom prst="rect">
-            <a:avLst/>
-          </a:prstGeom>
-          <a:noFill/>
-          <a:ln>
-            <a:noFill/>
-          </a:ln>
-          <a:effectLst/>
-          <a:extLst>
-            <a:ext uri="{909E8E84-426E-40DD-AFC4-6F175D3DCCD1}">
-              <a14:hiddenFill xmlns:a14="http://schemas.microsoft.com/office/drawing/2010/main">
-                <a:solidFill>
-                  <a:schemeClr val="accent1"/>
-                </a:solidFill>
-              </a14:hiddenFill>
-            </a:ext>
-            <a:ext uri="{91240B29-F687-4F45-9708-019B960494DF}">
-              <a14:hiddenLine xmlns:a14="http://schemas.microsoft.com/office/drawing/2010/main" w="9525">
-                <a:solidFill>
-                  <a:schemeClr val="tx1"/>
-                </a:solidFill>
-                <a:miter lim="800000"/>
-                <a:headEnd/>
-                <a:tailEnd/>
-              </a14:hiddenLine>
-            </a:ext>
-            <a:ext uri="{AF507438-7753-43E0-B8FC-AC1667EBCBE1}">
-              <a14:hiddenEffects xmlns:a14="http://schemas.microsoft.com/office/drawing/2010/main">
-                <a:effectLst>
-                  <a:outerShdw dist="35921" dir="2700000" algn="ctr" rotWithShape="0">
-                    <a:schemeClr val="bg2"/>
-                  </a:outerShdw>
-                </a:effectLst>
-              </a14:hiddenEffects>
-            </a:ext>
-          </a:extLst>
-        </p:spPr>
-      </p:pic>
-      <p:sp>
-        <p:nvSpPr>
-          <p:cNvPr id="13" name="TextBox 12"/>
-          <p:cNvSpPr txBox="1"/>
-          <p:nvPr/>
-        </p:nvSpPr>
-        <p:spPr>
-          <a:xfrm>
-            <a:off x="4933650" y="3434643"/>
-            <a:ext cx="2732479" cy="369332"/>
-          </a:xfrm>
-          <a:prstGeom prst="rect">
-            <a:avLst/>
-          </a:prstGeom>
-          <a:noFill/>
-        </p:spPr>
-        <p:txBody>
-          <a:bodyPr wrap="none" rtlCol="0">
-            <a:spAutoFit/>
-          </a:bodyPr>
-          <a:lstStyle/>
-          <a:p>
-            <a:pPr algn="l" rtl="0"/>
-            <a:r>
-              <a:rPr lang="en-US" dirty="0" smtClean="0"/>
-              <a:t>View module parameters</a:t>
-            </a:r>
-            <a:endParaRPr lang="en-US" dirty="0"/>
-          </a:p>
-        </p:txBody>
-      </p:sp>
-    </p:spTree>
-    <p:extLst>
-      <p:ext uri="{BB962C8B-B14F-4D97-AF65-F5344CB8AC3E}">
-        <p14:creationId xmlns:p14="http://schemas.microsoft.com/office/powerpoint/2010/main" val="2557997767"/>
-      </p:ext>
-    </p:extLst>
-  </p:cSld>
-  <p:clrMapOvr>
-    <a:masterClrMapping/>
-  </p:clrMapOvr>
-  <p:transition/>
-  <p:timing>
-    <p:tnLst>
-      <p:par>
-        <p:cTn id="1" dur="indefinite" restart="never" nodeType="tmRoot"/>
-      </p:par>
-    </p:tnLst>
-  </p:timing>
-</p:sld>
-</file>
-
-<file path=ppt/slides/slide6.xml><?xml version="1.0" encoding="utf-8"?>
 <p:sld xmlns:a="http://schemas.openxmlformats.org/drawingml/2006/main" xmlns:r="http://schemas.openxmlformats.org/officeDocument/2006/relationships" xmlns:p="http://schemas.openxmlformats.org/presentationml/2006/main">
   <p:cSld>
     <p:spTree>
@@ -6191,7 +4783,882 @@
 </p:sld>
 </file>
 
-<file path=ppt/slides/slide7.xml><?xml version="1.0" encoding="utf-8"?>
+<file path=ppt/slides/slide11.xml><?xml version="1.0" encoding="utf-8"?>
+<p:sld xmlns:a="http://schemas.openxmlformats.org/drawingml/2006/main" xmlns:r="http://schemas.openxmlformats.org/officeDocument/2006/relationships" xmlns:p="http://schemas.openxmlformats.org/presentationml/2006/main">
+  <p:cSld>
+    <p:spTree>
+      <p:nvGrpSpPr>
+        <p:cNvPr id="1" name=""/>
+        <p:cNvGrpSpPr/>
+        <p:nvPr/>
+      </p:nvGrpSpPr>
+      <p:grpSpPr>
+        <a:xfrm>
+          <a:off x="0" y="0"/>
+          <a:ext cx="0" cy="0"/>
+          <a:chOff x="0" y="0"/>
+          <a:chExt cx="0" cy="0"/>
+        </a:xfrm>
+      </p:grpSpPr>
+      <p:sp>
+        <p:nvSpPr>
+          <p:cNvPr id="5" name="Title 4"/>
+          <p:cNvSpPr>
+            <a:spLocks noGrp="1"/>
+          </p:cNvSpPr>
+          <p:nvPr>
+            <p:ph type="title"/>
+          </p:nvPr>
+        </p:nvSpPr>
+        <p:spPr/>
+        <p:txBody>
+          <a:bodyPr/>
+          <a:lstStyle/>
+          <a:p>
+            <a:pPr algn="ctr" rtl="0"/>
+            <a:r>
+              <a:rPr lang="en-US" sz="1400" dirty="0" smtClean="0"/>
+              <a:t>Telemetric SW </a:t>
+            </a:r>
+            <a:r>
+              <a:rPr lang="en-US" sz="1400" dirty="0" smtClean="0"/>
+              <a:t>flow</a:t>
+            </a:r>
+            <a:br>
+              <a:rPr lang="en-US" sz="1400" dirty="0" smtClean="0"/>
+            </a:br>
+            <a:r>
+              <a:rPr lang="en-US" sz="1400" dirty="0" smtClean="0"/>
+              <a:t>Write process</a:t>
+            </a:r>
+            <a:endParaRPr lang="en-US" sz="1400" dirty="0"/>
+          </a:p>
+        </p:txBody>
+      </p:sp>
+      <p:pic>
+        <p:nvPicPr>
+          <p:cNvPr id="2051" name="Picture 3" descr="C:\Software_projects\Elbit\ElbitMalat\Telemetric\DR\Flow charts\Write process.jpg"/>
+          <p:cNvPicPr>
+            <a:picLocks noChangeAspect="1" noChangeArrowheads="1"/>
+          </p:cNvPicPr>
+          <p:nvPr/>
+        </p:nvPicPr>
+        <p:blipFill>
+          <a:blip r:embed="rId2">
+            <a:extLst>
+              <a:ext uri="{28A0092B-C50C-407E-A947-70E740481C1C}">
+                <a14:useLocalDpi xmlns:a14="http://schemas.microsoft.com/office/drawing/2010/main" val="0"/>
+              </a:ext>
+            </a:extLst>
+          </a:blip>
+          <a:srcRect/>
+          <a:stretch>
+            <a:fillRect/>
+          </a:stretch>
+        </p:blipFill>
+        <p:spPr bwMode="auto">
+          <a:xfrm>
+            <a:off x="-18694" y="993485"/>
+            <a:ext cx="9162694" cy="5475553"/>
+          </a:xfrm>
+          <a:prstGeom prst="rect">
+            <a:avLst/>
+          </a:prstGeom>
+          <a:noFill/>
+          <a:extLst>
+            <a:ext uri="{909E8E84-426E-40DD-AFC4-6F175D3DCCD1}">
+              <a14:hiddenFill xmlns:a14="http://schemas.microsoft.com/office/drawing/2010/main">
+                <a:solidFill>
+                  <a:srgbClr val="FFFFFF"/>
+                </a:solidFill>
+              </a14:hiddenFill>
+            </a:ext>
+          </a:extLst>
+        </p:spPr>
+      </p:pic>
+    </p:spTree>
+    <p:extLst>
+      <p:ext uri="{BB962C8B-B14F-4D97-AF65-F5344CB8AC3E}">
+        <p14:creationId xmlns:p14="http://schemas.microsoft.com/office/powerpoint/2010/main" val="2391719726"/>
+      </p:ext>
+    </p:extLst>
+  </p:cSld>
+  <p:clrMapOvr>
+    <a:masterClrMapping/>
+  </p:clrMapOvr>
+  <p:transition/>
+  <p:timing>
+    <p:tnLst>
+      <p:par>
+        <p:cTn id="1" dur="indefinite" restart="never" nodeType="tmRoot"/>
+      </p:par>
+    </p:tnLst>
+  </p:timing>
+</p:sld>
+</file>
+
+<file path=ppt/slides/slide12.xml><?xml version="1.0" encoding="utf-8"?>
+<p:sld xmlns:a="http://schemas.openxmlformats.org/drawingml/2006/main" xmlns:r="http://schemas.openxmlformats.org/officeDocument/2006/relationships" xmlns:p="http://schemas.openxmlformats.org/presentationml/2006/main">
+  <p:cSld>
+    <p:spTree>
+      <p:nvGrpSpPr>
+        <p:cNvPr id="1" name=""/>
+        <p:cNvGrpSpPr/>
+        <p:nvPr/>
+      </p:nvGrpSpPr>
+      <p:grpSpPr>
+        <a:xfrm>
+          <a:off x="0" y="0"/>
+          <a:ext cx="0" cy="0"/>
+          <a:chOff x="0" y="0"/>
+          <a:chExt cx="0" cy="0"/>
+        </a:xfrm>
+      </p:grpSpPr>
+      <p:sp>
+        <p:nvSpPr>
+          <p:cNvPr id="5" name="Title 4"/>
+          <p:cNvSpPr>
+            <a:spLocks noGrp="1"/>
+          </p:cNvSpPr>
+          <p:nvPr>
+            <p:ph type="title"/>
+          </p:nvPr>
+        </p:nvSpPr>
+        <p:spPr/>
+        <p:txBody>
+          <a:bodyPr/>
+          <a:lstStyle/>
+          <a:p>
+            <a:pPr algn="ctr" rtl="0"/>
+            <a:r>
+              <a:rPr lang="en-US" sz="1400" dirty="0" smtClean="0"/>
+              <a:t>Telemetric SW </a:t>
+            </a:r>
+            <a:r>
+              <a:rPr lang="en-US" sz="1400" dirty="0" smtClean="0"/>
+              <a:t>flow</a:t>
+            </a:r>
+            <a:br>
+              <a:rPr lang="en-US" sz="1400" dirty="0" smtClean="0"/>
+            </a:br>
+            <a:r>
+              <a:rPr lang="en-US" sz="1400" dirty="0" smtClean="0"/>
+              <a:t>Flash write task, initialize process</a:t>
+            </a:r>
+            <a:endParaRPr lang="en-US" sz="1400" dirty="0"/>
+          </a:p>
+        </p:txBody>
+      </p:sp>
+      <p:pic>
+        <p:nvPicPr>
+          <p:cNvPr id="6" name="Picture 2" descr="C:\Software_projects\Elbit\ElbitMalat\Telemetric\DR\Flow charts\Init_flashWriteTask.jpg"/>
+          <p:cNvPicPr>
+            <a:picLocks noChangeAspect="1" noChangeArrowheads="1"/>
+          </p:cNvPicPr>
+          <p:nvPr/>
+        </p:nvPicPr>
+        <p:blipFill>
+          <a:blip r:embed="rId2">
+            <a:extLst>
+              <a:ext uri="{28A0092B-C50C-407E-A947-70E740481C1C}">
+                <a14:useLocalDpi xmlns:a14="http://schemas.microsoft.com/office/drawing/2010/main" val="0"/>
+              </a:ext>
+            </a:extLst>
+          </a:blip>
+          <a:srcRect/>
+          <a:stretch>
+            <a:fillRect/>
+          </a:stretch>
+        </p:blipFill>
+        <p:spPr bwMode="auto">
+          <a:xfrm>
+            <a:off x="2901216" y="952969"/>
+            <a:ext cx="3881721" cy="5345781"/>
+          </a:xfrm>
+          <a:prstGeom prst="rect">
+            <a:avLst/>
+          </a:prstGeom>
+          <a:noFill/>
+          <a:extLst>
+            <a:ext uri="{909E8E84-426E-40DD-AFC4-6F175D3DCCD1}">
+              <a14:hiddenFill xmlns:a14="http://schemas.microsoft.com/office/drawing/2010/main">
+                <a:solidFill>
+                  <a:srgbClr val="FFFFFF"/>
+                </a:solidFill>
+              </a14:hiddenFill>
+            </a:ext>
+          </a:extLst>
+        </p:spPr>
+      </p:pic>
+    </p:spTree>
+    <p:extLst>
+      <p:ext uri="{BB962C8B-B14F-4D97-AF65-F5344CB8AC3E}">
+        <p14:creationId xmlns:p14="http://schemas.microsoft.com/office/powerpoint/2010/main" val="1772794415"/>
+      </p:ext>
+    </p:extLst>
+  </p:cSld>
+  <p:clrMapOvr>
+    <a:masterClrMapping/>
+  </p:clrMapOvr>
+  <p:transition/>
+  <p:timing>
+    <p:tnLst>
+      <p:par>
+        <p:cTn id="1" dur="indefinite" restart="never" nodeType="tmRoot"/>
+      </p:par>
+    </p:tnLst>
+  </p:timing>
+</p:sld>
+</file>
+
+<file path=ppt/slides/slide13.xml><?xml version="1.0" encoding="utf-8"?>
+<p:sld xmlns:a="http://schemas.openxmlformats.org/drawingml/2006/main" xmlns:r="http://schemas.openxmlformats.org/officeDocument/2006/relationships" xmlns:p="http://schemas.openxmlformats.org/presentationml/2006/main">
+  <p:cSld>
+    <p:spTree>
+      <p:nvGrpSpPr>
+        <p:cNvPr id="1" name=""/>
+        <p:cNvGrpSpPr/>
+        <p:nvPr/>
+      </p:nvGrpSpPr>
+      <p:grpSpPr>
+        <a:xfrm>
+          <a:off x="0" y="0"/>
+          <a:ext cx="0" cy="0"/>
+          <a:chOff x="0" y="0"/>
+          <a:chExt cx="0" cy="0"/>
+        </a:xfrm>
+      </p:grpSpPr>
+      <p:sp>
+        <p:nvSpPr>
+          <p:cNvPr id="3" name="Content Placeholder 2"/>
+          <p:cNvSpPr>
+            <a:spLocks noGrp="1"/>
+          </p:cNvSpPr>
+          <p:nvPr>
+            <p:ph idx="1"/>
+          </p:nvPr>
+        </p:nvSpPr>
+        <p:spPr>
+          <a:xfrm>
+            <a:off x="179388" y="908556"/>
+            <a:ext cx="8713787" cy="5616575"/>
+          </a:xfrm>
+        </p:spPr>
+        <p:txBody>
+          <a:bodyPr anchor="ctr"/>
+          <a:lstStyle/>
+          <a:p>
+            <a:pPr marL="0" indent="0" algn="ctr">
+              <a:buNone/>
+              <a:defRPr/>
+            </a:pPr>
+            <a:r>
+              <a:rPr lang="en-US" sz="6600" dirty="0" smtClean="0"/>
+              <a:t>The End.</a:t>
+            </a:r>
+            <a:endParaRPr lang="en-US" sz="6600" dirty="0"/>
+          </a:p>
+          <a:p>
+            <a:pPr marL="360000" lvl="1" indent="0">
+              <a:buFontTx/>
+              <a:buNone/>
+              <a:defRPr/>
+            </a:pPr>
+            <a:endParaRPr lang="he-IL" dirty="0"/>
+          </a:p>
+        </p:txBody>
+      </p:sp>
+      <p:sp>
+        <p:nvSpPr>
+          <p:cNvPr id="18436" name="Slide Number Placeholder 3"/>
+          <p:cNvSpPr>
+            <a:spLocks noGrp="1"/>
+          </p:cNvSpPr>
+          <p:nvPr>
+            <p:ph type="sldNum" sz="quarter" idx="11"/>
+          </p:nvPr>
+        </p:nvSpPr>
+        <p:spPr bwMode="auto">
+          <a:noFill/>
+          <a:extLst>
+            <a:ext uri="{909E8E84-426E-40DD-AFC4-6F175D3DCCD1}">
+              <a14:hiddenFill xmlns:a14="http://schemas.microsoft.com/office/drawing/2010/main">
+                <a:solidFill>
+                  <a:srgbClr val="FFFFFF"/>
+                </a:solidFill>
+              </a14:hiddenFill>
+            </a:ext>
+            <a:ext uri="{91240B29-F687-4F45-9708-019B960494DF}">
+              <a14:hiddenLine xmlns:a14="http://schemas.microsoft.com/office/drawing/2010/main" w="9525">
+                <a:solidFill>
+                  <a:srgbClr val="000000"/>
+                </a:solidFill>
+                <a:miter lim="800000"/>
+                <a:headEnd/>
+                <a:tailEnd/>
+              </a14:hiddenLine>
+            </a:ext>
+          </a:extLst>
+        </p:spPr>
+        <p:txBody>
+          <a:bodyPr vert="horz" wrap="square" lIns="91440" tIns="45720" rIns="91440" bIns="45720" numCol="1" anchor="t" anchorCtr="0" compatLnSpc="1">
+            <a:prstTxWarp prst="textNoShape">
+              <a:avLst/>
+            </a:prstTxWarp>
+          </a:bodyPr>
+          <a:lstStyle>
+            <a:lvl1pPr eaLnBrk="0" hangingPunct="0">
+              <a:defRPr>
+                <a:solidFill>
+                  <a:schemeClr val="tx1"/>
+                </a:solidFill>
+                <a:latin typeface="Arial" charset="0"/>
+                <a:cs typeface="Arial" charset="0"/>
+              </a:defRPr>
+            </a:lvl1pPr>
+            <a:lvl2pPr marL="742950" indent="-285750" eaLnBrk="0" hangingPunct="0">
+              <a:defRPr>
+                <a:solidFill>
+                  <a:schemeClr val="tx1"/>
+                </a:solidFill>
+                <a:latin typeface="Arial" charset="0"/>
+                <a:cs typeface="Arial" charset="0"/>
+              </a:defRPr>
+            </a:lvl2pPr>
+            <a:lvl3pPr marL="1143000" indent="-228600" eaLnBrk="0" hangingPunct="0">
+              <a:defRPr>
+                <a:solidFill>
+                  <a:schemeClr val="tx1"/>
+                </a:solidFill>
+                <a:latin typeface="Arial" charset="0"/>
+                <a:cs typeface="Arial" charset="0"/>
+              </a:defRPr>
+            </a:lvl3pPr>
+            <a:lvl4pPr marL="1600200" indent="-228600" eaLnBrk="0" hangingPunct="0">
+              <a:defRPr>
+                <a:solidFill>
+                  <a:schemeClr val="tx1"/>
+                </a:solidFill>
+                <a:latin typeface="Arial" charset="0"/>
+                <a:cs typeface="Arial" charset="0"/>
+              </a:defRPr>
+            </a:lvl4pPr>
+            <a:lvl5pPr marL="2057400" indent="-228600" eaLnBrk="0" hangingPunct="0">
+              <a:defRPr>
+                <a:solidFill>
+                  <a:schemeClr val="tx1"/>
+                </a:solidFill>
+                <a:latin typeface="Arial" charset="0"/>
+                <a:cs typeface="Arial" charset="0"/>
+              </a:defRPr>
+            </a:lvl5pPr>
+            <a:lvl6pPr marL="2514600" indent="-228600" algn="r" rtl="1" eaLnBrk="0" fontAlgn="base" hangingPunct="0">
+              <a:spcBef>
+                <a:spcPct val="0"/>
+              </a:spcBef>
+              <a:spcAft>
+                <a:spcPct val="0"/>
+              </a:spcAft>
+              <a:defRPr>
+                <a:solidFill>
+                  <a:schemeClr val="tx1"/>
+                </a:solidFill>
+                <a:latin typeface="Arial" charset="0"/>
+                <a:cs typeface="Arial" charset="0"/>
+              </a:defRPr>
+            </a:lvl6pPr>
+            <a:lvl7pPr marL="2971800" indent="-228600" algn="r" rtl="1" eaLnBrk="0" fontAlgn="base" hangingPunct="0">
+              <a:spcBef>
+                <a:spcPct val="0"/>
+              </a:spcBef>
+              <a:spcAft>
+                <a:spcPct val="0"/>
+              </a:spcAft>
+              <a:defRPr>
+                <a:solidFill>
+                  <a:schemeClr val="tx1"/>
+                </a:solidFill>
+                <a:latin typeface="Arial" charset="0"/>
+                <a:cs typeface="Arial" charset="0"/>
+              </a:defRPr>
+            </a:lvl7pPr>
+            <a:lvl8pPr marL="3429000" indent="-228600" algn="r" rtl="1" eaLnBrk="0" fontAlgn="base" hangingPunct="0">
+              <a:spcBef>
+                <a:spcPct val="0"/>
+              </a:spcBef>
+              <a:spcAft>
+                <a:spcPct val="0"/>
+              </a:spcAft>
+              <a:defRPr>
+                <a:solidFill>
+                  <a:schemeClr val="tx1"/>
+                </a:solidFill>
+                <a:latin typeface="Arial" charset="0"/>
+                <a:cs typeface="Arial" charset="0"/>
+              </a:defRPr>
+            </a:lvl8pPr>
+            <a:lvl9pPr marL="3886200" indent="-228600" algn="r" rtl="1" eaLnBrk="0" fontAlgn="base" hangingPunct="0">
+              <a:spcBef>
+                <a:spcPct val="0"/>
+              </a:spcBef>
+              <a:spcAft>
+                <a:spcPct val="0"/>
+              </a:spcAft>
+              <a:defRPr>
+                <a:solidFill>
+                  <a:schemeClr val="tx1"/>
+                </a:solidFill>
+                <a:latin typeface="Arial" charset="0"/>
+                <a:cs typeface="Arial" charset="0"/>
+              </a:defRPr>
+            </a:lvl9pPr>
+          </a:lstStyle>
+          <a:p>
+            <a:pPr eaLnBrk="1" hangingPunct="1"/>
+            <a:fld id="{11F1AA19-9141-472E-89E4-8C389C88C0EC}" type="slidenum">
+              <a:rPr lang="he-IL" smtClean="0">
+                <a:solidFill>
+                  <a:schemeClr val="bg1"/>
+                </a:solidFill>
+              </a:rPr>
+              <a:pPr eaLnBrk="1" hangingPunct="1"/>
+              <a:t>13</a:t>
+            </a:fld>
+            <a:endParaRPr lang="en-US" smtClean="0">
+              <a:solidFill>
+                <a:schemeClr val="bg1"/>
+              </a:solidFill>
+            </a:endParaRPr>
+          </a:p>
+        </p:txBody>
+      </p:sp>
+      <p:sp>
+        <p:nvSpPr>
+          <p:cNvPr id="18463" name="Rectangle 1"/>
+          <p:cNvSpPr>
+            <a:spLocks noChangeArrowheads="1"/>
+          </p:cNvSpPr>
+          <p:nvPr/>
+        </p:nvSpPr>
+        <p:spPr bwMode="auto">
+          <a:xfrm>
+            <a:off x="1116013" y="5084763"/>
+            <a:ext cx="9144000" cy="457200"/>
+          </a:xfrm>
+          <a:prstGeom prst="rect">
+            <a:avLst/>
+          </a:prstGeom>
+          <a:noFill/>
+          <a:ln>
+            <a:noFill/>
+          </a:ln>
+          <a:effectLst/>
+          <a:extLst>
+            <a:ext uri="{909E8E84-426E-40DD-AFC4-6F175D3DCCD1}">
+              <a14:hiddenFill xmlns:a14="http://schemas.microsoft.com/office/drawing/2010/main">
+                <a:solidFill>
+                  <a:schemeClr val="accent1"/>
+                </a:solidFill>
+              </a14:hiddenFill>
+            </a:ext>
+            <a:ext uri="{91240B29-F687-4F45-9708-019B960494DF}">
+              <a14:hiddenLine xmlns:a14="http://schemas.microsoft.com/office/drawing/2010/main" w="9525">
+                <a:solidFill>
+                  <a:schemeClr val="tx1"/>
+                </a:solidFill>
+                <a:miter lim="800000"/>
+                <a:headEnd/>
+                <a:tailEnd/>
+              </a14:hiddenLine>
+            </a:ext>
+            <a:ext uri="{AF507438-7753-43E0-B8FC-AC1667EBCBE1}">
+              <a14:hiddenEffects xmlns:a14="http://schemas.microsoft.com/office/drawing/2010/main">
+                <a:effectLst>
+                  <a:outerShdw dist="35921" dir="2700000" algn="ctr" rotWithShape="0">
+                    <a:schemeClr val="bg2"/>
+                  </a:outerShdw>
+                </a:effectLst>
+              </a14:hiddenEffects>
+            </a:ext>
+          </a:extLst>
+        </p:spPr>
+        <p:txBody>
+          <a:bodyPr wrap="none" anchor="ctr">
+            <a:spAutoFit/>
+          </a:bodyPr>
+          <a:lstStyle/>
+          <a:p>
+            <a:pPr eaLnBrk="0" hangingPunct="0"/>
+            <a:endParaRPr lang="he-IL"/>
+          </a:p>
+        </p:txBody>
+      </p:sp>
+    </p:spTree>
+    <p:extLst>
+      <p:ext uri="{BB962C8B-B14F-4D97-AF65-F5344CB8AC3E}">
+        <p14:creationId xmlns:p14="http://schemas.microsoft.com/office/powerpoint/2010/main" val="897997203"/>
+      </p:ext>
+    </p:extLst>
+  </p:cSld>
+  <p:clrMapOvr>
+    <a:masterClrMapping/>
+  </p:clrMapOvr>
+  <p:transition/>
+  <p:timing>
+    <p:tnLst>
+      <p:par>
+        <p:cTn id="1" dur="indefinite" restart="never" nodeType="tmRoot"/>
+      </p:par>
+    </p:tnLst>
+  </p:timing>
+</p:sld>
+</file>
+
+<file path=ppt/slides/slide2.xml><?xml version="1.0" encoding="utf-8"?>
+<p:sld xmlns:a="http://schemas.openxmlformats.org/drawingml/2006/main" xmlns:r="http://schemas.openxmlformats.org/officeDocument/2006/relationships" xmlns:p="http://schemas.openxmlformats.org/presentationml/2006/main">
+  <p:cSld>
+    <p:spTree>
+      <p:nvGrpSpPr>
+        <p:cNvPr id="1" name=""/>
+        <p:cNvGrpSpPr/>
+        <p:nvPr/>
+      </p:nvGrpSpPr>
+      <p:grpSpPr>
+        <a:xfrm>
+          <a:off x="0" y="0"/>
+          <a:ext cx="0" cy="0"/>
+          <a:chOff x="0" y="0"/>
+          <a:chExt cx="0" cy="0"/>
+        </a:xfrm>
+      </p:grpSpPr>
+      <p:sp>
+        <p:nvSpPr>
+          <p:cNvPr id="6" name="Content Placeholder 5"/>
+          <p:cNvSpPr>
+            <a:spLocks noGrp="1"/>
+          </p:cNvSpPr>
+          <p:nvPr>
+            <p:ph idx="1"/>
+          </p:nvPr>
+        </p:nvSpPr>
+        <p:spPr/>
+        <p:txBody>
+          <a:bodyPr/>
+          <a:lstStyle/>
+          <a:p>
+            <a:r>
+              <a:rPr lang="en-US" sz="1100" dirty="0"/>
+              <a:t>RTC shall record system status and events </a:t>
+            </a:r>
+            <a:r>
+              <a:rPr lang="en-US" sz="1100" dirty="0" smtClean="0"/>
+              <a:t>from RTC SW modules and export them to RT viewer using UDP connection.</a:t>
+            </a:r>
+            <a:endParaRPr lang="en-US" sz="1100" dirty="0"/>
+          </a:p>
+          <a:p>
+            <a:r>
+              <a:rPr lang="en-US" sz="1100" dirty="0" smtClean="0"/>
+              <a:t>The telemetric module will consist data base </a:t>
+            </a:r>
+            <a:r>
+              <a:rPr lang="en-US" sz="1100" dirty="0"/>
+              <a:t>files (*.c, *,h</a:t>
+            </a:r>
+            <a:r>
+              <a:rPr lang="en-US" sz="1100" dirty="0" smtClean="0"/>
+              <a:t>) for each RTC module. This files will consist all the data members that need to be sample throw the telemetric procedure. </a:t>
+            </a:r>
+          </a:p>
+          <a:p>
+            <a:r>
+              <a:rPr lang="en-US" sz="1100" dirty="0" smtClean="0"/>
+              <a:t>Each telemetric data member will consist the following information fields:</a:t>
+            </a:r>
+          </a:p>
+          <a:p>
+            <a:pPr lvl="1"/>
+            <a:r>
+              <a:rPr lang="en-US" sz="1050" dirty="0" smtClean="0"/>
+              <a:t>Group: the RTC module that the data member belong to (e.g. PFD, UAV, etc.…) [up to 32 groups].</a:t>
+            </a:r>
+          </a:p>
+          <a:p>
+            <a:pPr lvl="1"/>
+            <a:r>
+              <a:rPr lang="en-US" sz="1050" dirty="0" smtClean="0"/>
+              <a:t>Data index: The member location at the telemetric RTC module structure [ up to 255 parameters in module].</a:t>
+            </a:r>
+          </a:p>
+          <a:p>
+            <a:pPr lvl="1"/>
+            <a:r>
+              <a:rPr lang="en-US" sz="1050" dirty="0" smtClean="0"/>
+              <a:t>Offset </a:t>
+            </a:r>
+            <a:r>
+              <a:rPr lang="en-US" sz="1050" dirty="0"/>
+              <a:t>[void*]: </a:t>
+            </a:r>
+            <a:r>
+              <a:rPr lang="en-US" sz="1050" dirty="0" smtClean="0"/>
+              <a:t>memory address </a:t>
+            </a:r>
+            <a:r>
+              <a:rPr lang="en-US" sz="1050" dirty="0"/>
+              <a:t>of the </a:t>
+            </a:r>
+            <a:r>
+              <a:rPr lang="en-US" sz="1050" dirty="0" smtClean="0"/>
+              <a:t>data at </a:t>
+            </a:r>
+            <a:r>
+              <a:rPr lang="en-US" sz="1050" dirty="0"/>
+              <a:t>the </a:t>
+            </a:r>
+            <a:r>
+              <a:rPr lang="en-US" sz="1050" dirty="0" smtClean="0"/>
+              <a:t>RTC module.</a:t>
+            </a:r>
+          </a:p>
+          <a:p>
+            <a:pPr lvl="1"/>
+            <a:r>
+              <a:rPr lang="en-US" sz="1050" dirty="0" smtClean="0"/>
+              <a:t>Data type: Data type of the </a:t>
+            </a:r>
+            <a:r>
+              <a:rPr lang="en-US" sz="1050" dirty="0"/>
+              <a:t>data [INT1_INT8, INT16, INT32, </a:t>
+            </a:r>
+            <a:r>
+              <a:rPr lang="en-US" sz="1050" dirty="0" smtClean="0"/>
+              <a:t>INT64, FLOAT_DOUBLE ].</a:t>
+            </a:r>
+          </a:p>
+          <a:p>
+            <a:pPr lvl="1"/>
+            <a:r>
+              <a:rPr lang="en-US" sz="1050" dirty="0" smtClean="0"/>
+              <a:t>Data sign: polarity of the data [sign, unsinged].</a:t>
+            </a:r>
+            <a:endParaRPr lang="en-US" sz="1050" dirty="0"/>
+          </a:p>
+          <a:p>
+            <a:pPr lvl="1"/>
+            <a:r>
+              <a:rPr lang="en-US" sz="1050" dirty="0" smtClean="0"/>
+              <a:t>Visually: Indicate that the data </a:t>
+            </a:r>
+            <a:r>
+              <a:rPr lang="en-US" sz="1050" dirty="0"/>
+              <a:t>will be show in RT viewer </a:t>
+            </a:r>
+            <a:r>
+              <a:rPr lang="en-US" sz="1050" dirty="0" smtClean="0"/>
+              <a:t>application (visually = true).</a:t>
+            </a:r>
+            <a:endParaRPr lang="he-IL" sz="1050" dirty="0"/>
+          </a:p>
+          <a:p>
+            <a:pPr lvl="1"/>
+            <a:r>
+              <a:rPr lang="en-US" sz="1050" dirty="0" smtClean="0"/>
+              <a:t>Flash: </a:t>
+            </a:r>
+            <a:r>
+              <a:rPr lang="en-US" sz="1050" dirty="0"/>
+              <a:t>Indicate that the data will be </a:t>
+            </a:r>
+            <a:r>
+              <a:rPr lang="en-US" sz="1050" dirty="0" smtClean="0"/>
+              <a:t>saved at Flash. (Flash </a:t>
+            </a:r>
+            <a:r>
+              <a:rPr lang="en-US" sz="1050" dirty="0"/>
+              <a:t>= true).</a:t>
+            </a:r>
+            <a:endParaRPr lang="he-IL" sz="1050" dirty="0"/>
+          </a:p>
+          <a:p>
+            <a:pPr lvl="1"/>
+            <a:r>
+              <a:rPr lang="en-US" sz="1050" dirty="0" smtClean="0"/>
+              <a:t>Rate level: Rate sample of the data member [fast</a:t>
+            </a:r>
+            <a:r>
+              <a:rPr lang="en-US" sz="1050" dirty="0"/>
+              <a:t>, normal, </a:t>
+            </a:r>
+            <a:r>
+              <a:rPr lang="en-US" sz="1050" dirty="0" smtClean="0"/>
+              <a:t>slow] (can be configured throw “offline parameters”).</a:t>
+            </a:r>
+            <a:endParaRPr lang="en-US" sz="1100" dirty="0" smtClean="0"/>
+          </a:p>
+          <a:p>
+            <a:r>
+              <a:rPr lang="en-US" sz="1100" dirty="0" smtClean="0"/>
+              <a:t>Each telemetric data member that will saved to Flash / Current structure will be saved at the following form:</a:t>
+            </a:r>
+          </a:p>
+          <a:p>
+            <a:pPr lvl="1"/>
+            <a:r>
+              <a:rPr lang="en-US" sz="900" dirty="0" smtClean="0"/>
+              <a:t>Data: The member data will be </a:t>
+            </a:r>
+            <a:r>
+              <a:rPr lang="en-US" sz="900" dirty="0"/>
+              <a:t>convert </a:t>
+            </a:r>
+            <a:r>
+              <a:rPr lang="en-US" sz="900" dirty="0" smtClean="0"/>
+              <a:t>and compress to bytes </a:t>
+            </a:r>
+            <a:r>
+              <a:rPr lang="en-US" sz="900" dirty="0"/>
+              <a:t>(bytes without leading spaces</a:t>
+            </a:r>
+            <a:r>
+              <a:rPr lang="en-US" sz="900" dirty="0" smtClean="0"/>
+              <a:t>).</a:t>
+            </a:r>
+          </a:p>
+          <a:p>
+            <a:pPr lvl="1"/>
+            <a:r>
+              <a:rPr lang="en-US" sz="900" dirty="0" smtClean="0"/>
+              <a:t>Information bytes (3 bytes): This bytes consist the telemetric member information by bit fields at the following order:</a:t>
+            </a:r>
+          </a:p>
+          <a:p>
+            <a:pPr lvl="1"/>
+            <a:endParaRPr lang="en-US" sz="900" dirty="0"/>
+          </a:p>
+          <a:p>
+            <a:pPr lvl="1"/>
+            <a:endParaRPr lang="en-US" sz="900" dirty="0" smtClean="0"/>
+          </a:p>
+          <a:p>
+            <a:pPr marL="457200" lvl="1" indent="0">
+              <a:buNone/>
+            </a:pPr>
+            <a:r>
+              <a:rPr lang="en-US" sz="900" dirty="0"/>
+              <a:t> </a:t>
+            </a:r>
+            <a:endParaRPr lang="en-US" sz="1100" dirty="0"/>
+          </a:p>
+          <a:p>
+            <a:endParaRPr lang="en-US" sz="1100" dirty="0" smtClean="0"/>
+          </a:p>
+          <a:p>
+            <a:pPr marL="0" indent="0">
+              <a:buNone/>
+            </a:pPr>
+            <a:endParaRPr lang="en-US" sz="1100" dirty="0" smtClean="0"/>
+          </a:p>
+        </p:txBody>
+      </p:sp>
+      <p:sp>
+        <p:nvSpPr>
+          <p:cNvPr id="5" name="Title 4"/>
+          <p:cNvSpPr>
+            <a:spLocks noGrp="1"/>
+          </p:cNvSpPr>
+          <p:nvPr>
+            <p:ph type="title"/>
+          </p:nvPr>
+        </p:nvSpPr>
+        <p:spPr/>
+        <p:txBody>
+          <a:bodyPr/>
+          <a:lstStyle/>
+          <a:p>
+            <a:pPr algn="ctr" rtl="0"/>
+            <a:r>
+              <a:rPr lang="en-US" dirty="0" smtClean="0"/>
+              <a:t>RT TLM </a:t>
+            </a:r>
+            <a:r>
+              <a:rPr lang="en-US" dirty="0" smtClean="0"/>
+              <a:t/>
+            </a:r>
+            <a:br>
+              <a:rPr lang="en-US" dirty="0" smtClean="0"/>
+            </a:br>
+            <a:r>
+              <a:rPr lang="en-US" dirty="0" smtClean="0"/>
+              <a:t>General Requirements</a:t>
+            </a:r>
+            <a:endParaRPr lang="en-US" dirty="0"/>
+          </a:p>
+        </p:txBody>
+      </p:sp>
+      <p:pic>
+        <p:nvPicPr>
+          <p:cNvPr id="1026" name="Picture 2" descr="C:\Software_projects\Elbit\ElbitMalat\Telemetric\DR\Flow charts\bits order.jpg"/>
+          <p:cNvPicPr>
+            <a:picLocks noChangeAspect="1" noChangeArrowheads="1"/>
+          </p:cNvPicPr>
+          <p:nvPr/>
+        </p:nvPicPr>
+        <p:blipFill>
+          <a:blip r:embed="rId2">
+            <a:extLst>
+              <a:ext uri="{28A0092B-C50C-407E-A947-70E740481C1C}">
+                <a14:useLocalDpi xmlns:a14="http://schemas.microsoft.com/office/drawing/2010/main" val="0"/>
+              </a:ext>
+            </a:extLst>
+          </a:blip>
+          <a:srcRect/>
+          <a:stretch>
+            <a:fillRect/>
+          </a:stretch>
+        </p:blipFill>
+        <p:spPr bwMode="auto">
+          <a:xfrm>
+            <a:off x="464817" y="4493278"/>
+            <a:ext cx="8202371" cy="901682"/>
+          </a:xfrm>
+          <a:prstGeom prst="rect">
+            <a:avLst/>
+          </a:prstGeom>
+          <a:noFill/>
+          <a:extLst>
+            <a:ext uri="{909E8E84-426E-40DD-AFC4-6F175D3DCCD1}">
+              <a14:hiddenFill xmlns:a14="http://schemas.microsoft.com/office/drawing/2010/main">
+                <a:solidFill>
+                  <a:srgbClr val="FFFFFF"/>
+                </a:solidFill>
+              </a14:hiddenFill>
+            </a:ext>
+          </a:extLst>
+        </p:spPr>
+      </p:pic>
+    </p:spTree>
+    <p:extLst>
+      <p:ext uri="{BB962C8B-B14F-4D97-AF65-F5344CB8AC3E}">
+        <p14:creationId xmlns:p14="http://schemas.microsoft.com/office/powerpoint/2010/main" val="4166834640"/>
+      </p:ext>
+    </p:extLst>
+  </p:cSld>
+  <p:clrMapOvr>
+    <a:masterClrMapping/>
+  </p:clrMapOvr>
+  <p:transition/>
+  <p:timing>
+    <p:tnLst>
+      <p:par>
+        <p:cTn id="1" dur="indefinite" restart="never" nodeType="tmRoot"/>
+      </p:par>
+    </p:tnLst>
+  </p:timing>
+</p:sld>
+</file>
+
+<file path=ppt/slides/slide3.xml><?xml version="1.0" encoding="utf-8"?>
 <p:sld xmlns:a="http://schemas.openxmlformats.org/drawingml/2006/main" xmlns:r="http://schemas.openxmlformats.org/officeDocument/2006/relationships" xmlns:p="http://schemas.openxmlformats.org/presentationml/2006/main">
   <p:cSld>
     <p:spTree>
@@ -7559,7 +7026,1081 @@
 </p:sld>
 </file>
 
-<file path=ppt/slides/slide8.xml><?xml version="1.0" encoding="utf-8"?>
+<file path=ppt/slides/slide4.xml><?xml version="1.0" encoding="utf-8"?>
+<p:sld xmlns:a="http://schemas.openxmlformats.org/drawingml/2006/main" xmlns:r="http://schemas.openxmlformats.org/officeDocument/2006/relationships" xmlns:p="http://schemas.openxmlformats.org/presentationml/2006/main">
+  <p:cSld>
+    <p:spTree>
+      <p:nvGrpSpPr>
+        <p:cNvPr id="1" name=""/>
+        <p:cNvGrpSpPr/>
+        <p:nvPr/>
+      </p:nvGrpSpPr>
+      <p:grpSpPr>
+        <a:xfrm>
+          <a:off x="0" y="0"/>
+          <a:ext cx="0" cy="0"/>
+          <a:chOff x="0" y="0"/>
+          <a:chExt cx="0" cy="0"/>
+        </a:xfrm>
+      </p:grpSpPr>
+      <mc:AlternateContent xmlns:mc="http://schemas.openxmlformats.org/markup-compatibility/2006">
+        <mc:Choice xmlns:a14="http://schemas.microsoft.com/office/drawing/2010/main" Requires="a14">
+          <p:sp>
+            <p:nvSpPr>
+              <p:cNvPr id="6" name="Content Placeholder 5"/>
+              <p:cNvSpPr>
+                <a:spLocks noGrp="1"/>
+              </p:cNvSpPr>
+              <p:nvPr>
+                <p:ph idx="1"/>
+              </p:nvPr>
+            </p:nvSpPr>
+            <p:spPr>
+              <a:xfrm>
+                <a:off x="179388" y="1080000"/>
+                <a:ext cx="8713787" cy="3613919"/>
+              </a:xfrm>
+            </p:spPr>
+            <p:txBody>
+              <a:bodyPr/>
+              <a:lstStyle/>
+              <a:p>
+                <a:endParaRPr lang="en-US" sz="1100" dirty="0" smtClean="0"/>
+              </a:p>
+              <a:p>
+                <a:r>
+                  <a:rPr lang="en-US" sz="1100" dirty="0" smtClean="0"/>
+                  <a:t>RTC shall record system status and events using read / write to internal FLASH memory in the following conditions:</a:t>
+                </a:r>
+              </a:p>
+              <a:p>
+                <a:pPr lvl="1"/>
+                <a:r>
+                  <a:rPr lang="en-US" sz="1100" dirty="0" smtClean="0"/>
+                  <a:t>Write to </a:t>
+                </a:r>
+                <a:r>
+                  <a:rPr lang="en-US" sz="1100" dirty="0" smtClean="0"/>
+                  <a:t>Flash: </a:t>
+                </a:r>
+              </a:p>
+              <a:p>
+                <a:pPr lvl="2"/>
+                <a:r>
+                  <a:rPr lang="en-US" sz="1050" dirty="0" smtClean="0"/>
+                  <a:t>Member update rate: Each telemetric member (that have Flash enable flag) will be updated and store to Flash local structure according to his rate speed.  </a:t>
+                </a:r>
+              </a:p>
+              <a:p>
+                <a:pPr lvl="2"/>
+                <a:r>
+                  <a:rPr lang="en-US" sz="1050" dirty="0" smtClean="0"/>
+                  <a:t>Block update rate: The local Flash data base will </a:t>
+                </a:r>
+                <a:r>
+                  <a:rPr lang="en-US" sz="1050" dirty="0"/>
+                  <a:t>be saved at the flash memory every </a:t>
+                </a:r>
+                <a:r>
+                  <a:rPr lang="en-US" sz="1050" dirty="0" smtClean="0"/>
+                  <a:t>t sec (where t </a:t>
+                </a:r>
+                <a:r>
+                  <a:rPr lang="en-US" sz="1050" dirty="0"/>
+                  <a:t>= time factor that is a part of the “offline parameters</a:t>
+                </a:r>
+                <a:r>
+                  <a:rPr lang="en-US" sz="1050" dirty="0" smtClean="0"/>
+                  <a:t>”) in Flash data blocks in order to read data history from Flash.</a:t>
+                </a:r>
+              </a:p>
+              <a:p>
+                <a:pPr marL="914400" lvl="2" indent="0">
+                  <a:buNone/>
+                </a:pPr>
+                <a14:m>
+                  <m:oMath xmlns:m="http://schemas.openxmlformats.org/officeDocument/2006/math">
+                    <m:r>
+                      <a:rPr lang="en-US" sz="1050" i="1">
+                        <a:latin typeface="Cambria Math"/>
+                      </a:rPr>
+                      <m:t>𝑛𝑢𝑚𝑏𝑒𝑟</m:t>
+                    </m:r>
+                    <m:r>
+                      <a:rPr lang="en-US" sz="1050" i="1">
+                        <a:latin typeface="Cambria Math"/>
+                      </a:rPr>
+                      <m:t> </m:t>
+                    </m:r>
+                    <m:r>
+                      <a:rPr lang="en-US" sz="1050" i="1">
+                        <a:latin typeface="Cambria Math"/>
+                      </a:rPr>
+                      <m:t>𝑜𝑓</m:t>
+                    </m:r>
+                    <m:r>
+                      <a:rPr lang="en-US" sz="1050" i="1">
+                        <a:latin typeface="Cambria Math"/>
+                      </a:rPr>
+                      <m:t> </m:t>
+                    </m:r>
+                    <m:r>
+                      <a:rPr lang="en-US" sz="1050" i="1">
+                        <a:latin typeface="Cambria Math"/>
+                      </a:rPr>
+                      <m:t>𝐹𝑙𝑎𝑠</m:t>
+                    </m:r>
+                    <m:r>
+                      <a:rPr lang="en-US" sz="1050" i="1">
+                        <a:latin typeface="Cambria Math"/>
+                      </a:rPr>
+                      <m:t>h</m:t>
+                    </m:r>
+                    <m:r>
+                      <a:rPr lang="en-US" sz="1050" i="1">
+                        <a:latin typeface="Cambria Math"/>
+                      </a:rPr>
+                      <m:t> </m:t>
+                    </m:r>
+                    <m:r>
+                      <a:rPr lang="en-US" sz="1050" i="1">
+                        <a:latin typeface="Cambria Math"/>
+                      </a:rPr>
+                      <m:t>𝑏𝑙𝑜𝑐𝑘𝑠</m:t>
+                    </m:r>
+                    <m:r>
+                      <a:rPr lang="en-US" sz="1050" i="1">
+                        <a:latin typeface="Cambria Math"/>
+                      </a:rPr>
+                      <m:t>= </m:t>
+                    </m:r>
+                    <m:f>
+                      <m:fPr>
+                        <m:ctrlPr>
+                          <a:rPr lang="en-US" sz="1050" i="1">
+                            <a:latin typeface="Cambria Math"/>
+                          </a:rPr>
+                        </m:ctrlPr>
+                      </m:fPr>
+                      <m:num>
+                        <m:r>
+                          <a:rPr lang="en-US" sz="1050" i="1">
+                            <a:latin typeface="Cambria Math"/>
+                          </a:rPr>
+                          <m:t>𝐹𝑙𝑎𝑠</m:t>
+                        </m:r>
+                        <m:r>
+                          <a:rPr lang="en-US" sz="1050" i="1">
+                            <a:latin typeface="Cambria Math"/>
+                          </a:rPr>
+                          <m:t>h</m:t>
+                        </m:r>
+                        <m:r>
+                          <a:rPr lang="en-US" sz="1050" i="1">
+                            <a:latin typeface="Cambria Math"/>
+                          </a:rPr>
+                          <m:t> </m:t>
+                        </m:r>
+                        <m:r>
+                          <a:rPr lang="en-US" sz="1050" i="1">
+                            <a:latin typeface="Cambria Math"/>
+                          </a:rPr>
+                          <m:t>𝑡𝑜𝑡𝑎𝑙</m:t>
+                        </m:r>
+                        <m:r>
+                          <a:rPr lang="en-US" sz="1050" i="1">
+                            <a:latin typeface="Cambria Math"/>
+                          </a:rPr>
+                          <m:t> </m:t>
+                        </m:r>
+                        <m:r>
+                          <a:rPr lang="en-US" sz="1050" i="1">
+                            <a:latin typeface="Cambria Math"/>
+                          </a:rPr>
+                          <m:t>𝑚𝑒𝑚𝑜𝑟𝑦</m:t>
+                        </m:r>
+                        <m:r>
+                          <a:rPr lang="en-US" sz="1050" i="1">
+                            <a:latin typeface="Cambria Math"/>
+                          </a:rPr>
+                          <m:t> </m:t>
+                        </m:r>
+                        <m:r>
+                          <a:rPr lang="en-US" sz="1050" i="1">
+                            <a:latin typeface="Cambria Math"/>
+                          </a:rPr>
+                          <m:t>𝑠𝑝𝑎𝑐𝑒</m:t>
+                        </m:r>
+                        <m:r>
+                          <a:rPr lang="en-US" sz="1050" i="1">
+                            <a:latin typeface="Cambria Math"/>
+                          </a:rPr>
+                          <m:t> </m:t>
+                        </m:r>
+                        <m:r>
+                          <a:rPr lang="en-US" sz="1050" i="1">
+                            <a:latin typeface="Cambria Math"/>
+                          </a:rPr>
+                          <m:t>𝑎𝑡</m:t>
+                        </m:r>
+                        <m:r>
+                          <a:rPr lang="en-US" sz="1050" i="1">
+                            <a:latin typeface="Cambria Math"/>
+                          </a:rPr>
+                          <m:t> </m:t>
+                        </m:r>
+                        <m:r>
+                          <a:rPr lang="en-US" sz="1050" i="1">
+                            <a:latin typeface="Cambria Math"/>
+                          </a:rPr>
+                          <m:t>𝑅𝑇𝐶</m:t>
+                        </m:r>
+                        <m:r>
+                          <a:rPr lang="en-US" sz="1050" i="1">
+                            <a:latin typeface="Cambria Math"/>
+                          </a:rPr>
+                          <m:t>.</m:t>
+                        </m:r>
+                      </m:num>
+                      <m:den>
+                        <m:r>
+                          <a:rPr lang="en-US" sz="1050" i="1">
+                            <a:latin typeface="Cambria Math"/>
+                          </a:rPr>
+                          <m:t>𝑠𝑖𝑧𝑒</m:t>
+                        </m:r>
+                        <m:r>
+                          <a:rPr lang="en-US" sz="1050" i="1">
+                            <a:latin typeface="Cambria Math"/>
+                          </a:rPr>
+                          <m:t> </m:t>
+                        </m:r>
+                        <m:r>
+                          <a:rPr lang="en-US" sz="1050" i="1">
+                            <a:latin typeface="Cambria Math"/>
+                          </a:rPr>
+                          <m:t>𝑜𝑓</m:t>
+                        </m:r>
+                        <m:r>
+                          <a:rPr lang="en-US" sz="1050" i="1">
+                            <a:latin typeface="Cambria Math"/>
+                          </a:rPr>
+                          <m:t>  </m:t>
+                        </m:r>
+                        <m:r>
+                          <a:rPr lang="en-US" sz="1050" i="1">
+                            <a:latin typeface="Cambria Math"/>
+                          </a:rPr>
+                          <m:t>𝑡𝑒𝑙𝑒𝑚𝑒𝑡𝑟𝑖𝑐</m:t>
+                        </m:r>
+                        <m:r>
+                          <a:rPr lang="en-US" sz="1050" i="1">
+                            <a:latin typeface="Cambria Math"/>
+                          </a:rPr>
+                          <m:t> </m:t>
+                        </m:r>
+                        <m:r>
+                          <a:rPr lang="en-US" sz="1050" i="1">
+                            <a:latin typeface="Cambria Math"/>
+                          </a:rPr>
+                          <m:t>𝑑𝑎𝑡𝑎</m:t>
+                        </m:r>
+                        <m:r>
+                          <a:rPr lang="en-US" sz="1050" i="1">
+                            <a:latin typeface="Cambria Math"/>
+                          </a:rPr>
+                          <m:t> </m:t>
+                        </m:r>
+                        <m:r>
+                          <a:rPr lang="en-US" sz="1050" i="1">
+                            <a:latin typeface="Cambria Math"/>
+                          </a:rPr>
+                          <m:t>𝑏𝑎𝑠𝑒</m:t>
+                        </m:r>
+                      </m:den>
+                    </m:f>
+                  </m:oMath>
+                </a14:m>
+                <a:r>
+                  <a:rPr lang="en-US" sz="1050" dirty="0"/>
+                  <a:t>  </a:t>
+                </a:r>
+              </a:p>
+              <a:p>
+                <a:pPr marL="914400" lvl="2" indent="0">
+                  <a:buNone/>
+                </a:pPr>
+                <a14:m>
+                  <m:oMathPara xmlns:m="http://schemas.openxmlformats.org/officeDocument/2006/math">
+                    <m:oMathParaPr>
+                      <m:jc m:val="centerGroup"/>
+                    </m:oMathParaPr>
+                    <m:oMath xmlns:m="http://schemas.openxmlformats.org/officeDocument/2006/math">
+                      <m:r>
+                        <a:rPr lang="en-US" sz="1050" i="1">
+                          <a:latin typeface="Cambria Math"/>
+                        </a:rPr>
+                        <m:t>𝑆𝑖𝑧𝑒</m:t>
+                      </m:r>
+                      <m:r>
+                        <a:rPr lang="en-US" sz="1050" i="1">
+                          <a:latin typeface="Cambria Math"/>
+                        </a:rPr>
+                        <m:t> </m:t>
+                      </m:r>
+                      <m:r>
+                        <a:rPr lang="en-US" sz="1050" i="1">
+                          <a:latin typeface="Cambria Math"/>
+                        </a:rPr>
+                        <m:t>𝑜𝑓</m:t>
+                      </m:r>
+                      <m:r>
+                        <a:rPr lang="en-US" sz="1050" i="1">
+                          <a:latin typeface="Cambria Math"/>
+                        </a:rPr>
+                        <m:t> </m:t>
+                      </m:r>
+                      <m:r>
+                        <a:rPr lang="en-US" sz="1050" i="1">
+                          <a:latin typeface="Cambria Math"/>
+                        </a:rPr>
+                        <m:t>𝑡𝑒𝑙𝑒𝑚𝑡𝑟𝑖𝑐</m:t>
+                      </m:r>
+                      <m:r>
+                        <a:rPr lang="en-US" sz="1050" i="1">
+                          <a:latin typeface="Cambria Math"/>
+                        </a:rPr>
+                        <m:t> </m:t>
+                      </m:r>
+                      <m:r>
+                        <a:rPr lang="en-US" sz="1050" i="1">
+                          <a:latin typeface="Cambria Math"/>
+                        </a:rPr>
+                        <m:t>𝑑𝑎𝑡𝑎</m:t>
+                      </m:r>
+                      <m:r>
+                        <a:rPr lang="en-US" sz="1050" i="1">
+                          <a:latin typeface="Cambria Math"/>
+                        </a:rPr>
+                        <m:t> </m:t>
+                      </m:r>
+                      <m:r>
+                        <a:rPr lang="en-US" sz="1050" i="1">
+                          <a:latin typeface="Cambria Math"/>
+                        </a:rPr>
+                        <m:t>𝑏𝑎𝑠𝑒</m:t>
+                      </m:r>
+                      <m:r>
+                        <a:rPr lang="en-US" sz="1050" i="1">
+                          <a:latin typeface="Cambria Math"/>
+                        </a:rPr>
+                        <m:t>≅</m:t>
+                      </m:r>
+                      <m:d>
+                        <m:dPr>
+                          <m:ctrlPr>
+                            <a:rPr lang="en-US" sz="1050" i="1">
+                              <a:latin typeface="Cambria Math"/>
+                            </a:rPr>
+                          </m:ctrlPr>
+                        </m:dPr>
+                        <m:e>
+                          <m:r>
+                            <a:rPr lang="en-US" sz="1050" i="1">
+                              <a:latin typeface="Cambria Math"/>
+                            </a:rPr>
+                            <m:t>𝑒𝑣𝑒𝑟𝑎𝑔𝑒</m:t>
+                          </m:r>
+                          <m:r>
+                            <a:rPr lang="en-US" sz="1050" i="1">
+                              <a:latin typeface="Cambria Math"/>
+                            </a:rPr>
+                            <m:t> </m:t>
+                          </m:r>
+                          <m:r>
+                            <a:rPr lang="en-US" sz="1050" i="1">
+                              <a:latin typeface="Cambria Math"/>
+                            </a:rPr>
+                            <m:t>𝑎𝑚𝑜𝑢𝑛𝑡</m:t>
+                          </m:r>
+                          <m:r>
+                            <a:rPr lang="en-US" sz="1050" i="1">
+                              <a:latin typeface="Cambria Math"/>
+                            </a:rPr>
+                            <m:t> </m:t>
+                          </m:r>
+                          <m:r>
+                            <a:rPr lang="en-US" sz="1050" i="1">
+                              <a:latin typeface="Cambria Math"/>
+                            </a:rPr>
+                            <m:t>𝑜𝑓</m:t>
+                          </m:r>
+                          <m:r>
+                            <a:rPr lang="en-US" sz="1050" i="1">
+                              <a:latin typeface="Cambria Math"/>
+                            </a:rPr>
+                            <m:t> </m:t>
+                          </m:r>
+                          <m:r>
+                            <a:rPr lang="en-US" sz="1050" i="1">
+                              <a:latin typeface="Cambria Math"/>
+                            </a:rPr>
+                            <m:t>𝑏𝑦𝑡𝑒𝑠</m:t>
+                          </m:r>
+                          <m:r>
+                            <a:rPr lang="en-US" sz="1050" i="1">
+                              <a:latin typeface="Cambria Math"/>
+                            </a:rPr>
+                            <m:t> </m:t>
+                          </m:r>
+                          <m:r>
+                            <a:rPr lang="en-US" sz="1050" i="1">
+                              <a:latin typeface="Cambria Math"/>
+                            </a:rPr>
+                            <m:t>𝑖𝑛</m:t>
+                          </m:r>
+                          <m:r>
+                            <a:rPr lang="en-US" sz="1050" i="1">
+                              <a:latin typeface="Cambria Math"/>
+                            </a:rPr>
+                            <m:t> </m:t>
+                          </m:r>
+                          <m:r>
+                            <a:rPr lang="en-US" sz="1050" i="1">
+                              <a:latin typeface="Cambria Math"/>
+                            </a:rPr>
+                            <m:t>1</m:t>
+                          </m:r>
+                          <m:r>
+                            <a:rPr lang="en-US" sz="1050" i="1">
+                              <a:latin typeface="Cambria Math"/>
+                            </a:rPr>
+                            <m:t> </m:t>
+                          </m:r>
+                          <m:r>
+                            <a:rPr lang="en-US" sz="1050" i="1">
+                              <a:latin typeface="Cambria Math"/>
+                            </a:rPr>
+                            <m:t>𝑑𝑎𝑡𝑎</m:t>
+                          </m:r>
+                          <m:r>
+                            <a:rPr lang="en-US" sz="1050" i="1">
+                              <a:latin typeface="Cambria Math"/>
+                            </a:rPr>
+                            <m:t> </m:t>
+                          </m:r>
+                          <m:r>
+                            <a:rPr lang="en-US" sz="1050" i="1">
+                              <a:latin typeface="Cambria Math"/>
+                            </a:rPr>
+                            <m:t>𝑚𝑒𝑚𝑏𝑒𝑟</m:t>
+                          </m:r>
+                          <m:r>
+                            <a:rPr lang="en-US" sz="1050" i="1">
+                              <a:latin typeface="Cambria Math"/>
+                            </a:rPr>
+                            <m:t>+</m:t>
+                          </m:r>
+                          <m:r>
+                            <a:rPr lang="en-US" sz="1050" i="1">
+                              <a:latin typeface="Cambria Math"/>
+                            </a:rPr>
+                            <m:t>3</m:t>
+                          </m:r>
+                          <m:r>
+                            <a:rPr lang="en-US" sz="1050" i="1">
+                              <a:latin typeface="Cambria Math"/>
+                            </a:rPr>
+                            <m:t> </m:t>
+                          </m:r>
+                          <m:r>
+                            <a:rPr lang="en-US" sz="1050" i="1">
+                              <a:latin typeface="Cambria Math"/>
+                            </a:rPr>
+                            <m:t>𝑐𝑜𝑛𝑓𝑖𝑔𝑢𝑟𝑎𝑡𝑖𝑜𝑛</m:t>
+                          </m:r>
+                          <m:r>
+                            <a:rPr lang="en-US" sz="1050" i="1">
+                              <a:latin typeface="Cambria Math"/>
+                            </a:rPr>
+                            <m:t> </m:t>
+                          </m:r>
+                          <m:r>
+                            <a:rPr lang="en-US" sz="1050" i="1">
+                              <a:latin typeface="Cambria Math"/>
+                            </a:rPr>
+                            <m:t>𝑏𝑦𝑡𝑒𝑠</m:t>
+                          </m:r>
+                        </m:e>
+                      </m:d>
+                      <m:r>
+                        <a:rPr lang="en-US" sz="1050" i="1">
+                          <a:latin typeface="Cambria Math"/>
+                        </a:rPr>
+                        <m:t>∗</m:t>
+                      </m:r>
+                      <m:r>
+                        <a:rPr lang="en-US" sz="1050" i="1">
+                          <a:latin typeface="Cambria Math"/>
+                        </a:rPr>
+                        <m:t>𝑛𝑢𝑚𝑏𝑒𝑟</m:t>
+                      </m:r>
+                      <m:r>
+                        <a:rPr lang="en-US" sz="1050" i="1">
+                          <a:latin typeface="Cambria Math"/>
+                        </a:rPr>
+                        <m:t> </m:t>
+                      </m:r>
+                      <m:r>
+                        <a:rPr lang="en-US" sz="1050" i="1">
+                          <a:latin typeface="Cambria Math"/>
+                        </a:rPr>
+                        <m:t>𝑜𝑓</m:t>
+                      </m:r>
+                      <m:r>
+                        <a:rPr lang="en-US" sz="1050" i="1">
+                          <a:latin typeface="Cambria Math"/>
+                        </a:rPr>
+                        <m:t> </m:t>
+                      </m:r>
+                      <m:r>
+                        <a:rPr lang="en-US" sz="1050" i="1">
+                          <a:latin typeface="Cambria Math"/>
+                        </a:rPr>
+                        <m:t>𝑚𝑒𝑚𝑏𝑒𝑟𝑠</m:t>
+                      </m:r>
+                      <m:r>
+                        <a:rPr lang="en-US" sz="1050" i="1">
+                          <a:latin typeface="Cambria Math"/>
+                        </a:rPr>
+                        <m:t>. </m:t>
+                      </m:r>
+                    </m:oMath>
+                  </m:oMathPara>
+                </a14:m>
+                <a:endParaRPr lang="en-US" sz="1050" dirty="0"/>
+              </a:p>
+              <a:p>
+                <a:pPr marL="914400" lvl="2" indent="0">
+                  <a:buNone/>
+                </a:pPr>
+                <a:endParaRPr lang="en-US" sz="1050" dirty="0" smtClean="0"/>
+              </a:p>
+              <a:p>
+                <a:pPr lvl="2"/>
+                <a:r>
+                  <a:rPr lang="en-US" sz="1050" dirty="0" smtClean="0"/>
+                  <a:t>Flash block header: This header will be added to each Flash block that will write be to Flash. This header consist: number of members in the block.</a:t>
+                </a:r>
+                <a:endParaRPr lang="en-US" sz="1000" dirty="0"/>
+              </a:p>
+              <a:p>
+                <a:pPr lvl="1"/>
+                <a:r>
+                  <a:rPr lang="en-US" sz="1100" dirty="0" smtClean="0"/>
+                  <a:t>Read from Flash: </a:t>
+                </a:r>
+                <a:r>
+                  <a:rPr lang="en-US" sz="1100" dirty="0" smtClean="0"/>
+                  <a:t>The </a:t>
+                </a:r>
+                <a:r>
+                  <a:rPr lang="en-US" sz="1100" dirty="0" smtClean="0"/>
+                  <a:t>RT viewer will be able to read and present data from Flash at any given time and if the user checked the option to read data from </a:t>
+                </a:r>
+                <a:r>
+                  <a:rPr lang="en-US" sz="1100" dirty="0" smtClean="0"/>
+                  <a:t>Flash at the RT viewer interface.</a:t>
+                </a:r>
+                <a:endParaRPr lang="en-US" sz="1100" dirty="0" smtClean="0"/>
+              </a:p>
+              <a:p>
+                <a:pPr lvl="1"/>
+                <a:r>
+                  <a:rPr lang="en-US" sz="1100" dirty="0" smtClean="0"/>
+                  <a:t>The </a:t>
+                </a:r>
+                <a:r>
+                  <a:rPr lang="en-US" sz="1100" dirty="0"/>
+                  <a:t>write </a:t>
+                </a:r>
+                <a:r>
+                  <a:rPr lang="en-US" sz="1100" dirty="0" smtClean="0"/>
+                  <a:t> to flash operations </a:t>
+                </a:r>
+                <a:r>
+                  <a:rPr lang="en-US" sz="1100" dirty="0"/>
+                  <a:t>will </a:t>
+                </a:r>
+                <a:r>
+                  <a:rPr lang="en-US" sz="1100" dirty="0" smtClean="0"/>
+                  <a:t>be protected in thread safe (this protection will be a </a:t>
+                </a:r>
+                <a:r>
+                  <a:rPr lang="en-US" sz="1100" dirty="0" smtClean="0"/>
+                  <a:t>handle by HBS SW layer).</a:t>
+                </a:r>
+              </a:p>
+              <a:p>
+                <a:pPr lvl="1"/>
+                <a:r>
+                  <a:rPr lang="en-US" sz="1100" dirty="0" smtClean="0"/>
+                  <a:t>HBS methods that will handle read / write from Flash are: </a:t>
+                </a:r>
+                <a:r>
+                  <a:rPr lang="en-US" sz="1100" dirty="0" err="1" smtClean="0"/>
+                  <a:t>p_CDS_write</a:t>
+                </a:r>
+                <a:r>
+                  <a:rPr lang="en-US" sz="1100" dirty="0" smtClean="0"/>
+                  <a:t>, </a:t>
+                </a:r>
+                <a:r>
+                  <a:rPr lang="en-US" sz="1100" dirty="0" err="1" smtClean="0"/>
+                  <a:t>p_CDS_read</a:t>
+                </a:r>
+                <a:r>
+                  <a:rPr lang="en-US" sz="1100" dirty="0"/>
+                  <a:t>.</a:t>
+                </a:r>
+                <a:r>
+                  <a:rPr lang="en-US" sz="1100" dirty="0" smtClean="0"/>
+                  <a:t> </a:t>
+                </a:r>
+                <a:endParaRPr lang="en-US" sz="1100" dirty="0" smtClean="0"/>
+              </a:p>
+              <a:p>
+                <a:pPr marL="0" indent="0">
+                  <a:buNone/>
+                </a:pPr>
+                <a:endParaRPr lang="en-US" sz="1100" dirty="0" smtClean="0"/>
+              </a:p>
+              <a:p>
+                <a:pPr marL="0" indent="0">
+                  <a:buNone/>
+                </a:pPr>
+                <a:r>
+                  <a:rPr lang="en-US" dirty="0" smtClean="0"/>
+                  <a:t>  </a:t>
+                </a:r>
+                <a:endParaRPr lang="en-US" dirty="0" smtClean="0"/>
+              </a:p>
+            </p:txBody>
+          </p:sp>
+        </mc:Choice>
+        <mc:Fallback>
+          <p:sp>
+            <p:nvSpPr>
+              <p:cNvPr id="6" name="Content Placeholder 5"/>
+              <p:cNvSpPr>
+                <a:spLocks noGrp="1" noRot="1" noChangeAspect="1" noMove="1" noResize="1" noEditPoints="1" noAdjustHandles="1" noChangeArrowheads="1" noChangeShapeType="1" noTextEdit="1"/>
+              </p:cNvSpPr>
+              <p:nvPr>
+                <p:ph idx="1"/>
+              </p:nvPr>
+            </p:nvSpPr>
+            <p:spPr>
+              <a:xfrm>
+                <a:off x="179388" y="1080000"/>
+                <a:ext cx="8713787" cy="3613919"/>
+              </a:xfrm>
+              <a:blipFill rotWithShape="1">
+                <a:blip r:embed="rId2"/>
+                <a:stretch>
+                  <a:fillRect/>
+                </a:stretch>
+              </a:blipFill>
+            </p:spPr>
+            <p:txBody>
+              <a:bodyPr/>
+              <a:lstStyle/>
+              <a:p>
+                <a:r>
+                  <a:rPr lang="en-US">
+                    <a:noFill/>
+                  </a:rPr>
+                  <a:t> </a:t>
+                </a:r>
+              </a:p>
+            </p:txBody>
+          </p:sp>
+        </mc:Fallback>
+      </mc:AlternateContent>
+      <p:sp>
+        <p:nvSpPr>
+          <p:cNvPr id="5" name="Title 4"/>
+          <p:cNvSpPr>
+            <a:spLocks noGrp="1"/>
+          </p:cNvSpPr>
+          <p:nvPr>
+            <p:ph type="title"/>
+          </p:nvPr>
+        </p:nvSpPr>
+        <p:spPr/>
+        <p:txBody>
+          <a:bodyPr/>
+          <a:lstStyle/>
+          <a:p>
+            <a:pPr algn="ctr" rtl="0"/>
+            <a:r>
+              <a:rPr lang="en-US" dirty="0" smtClean="0"/>
+              <a:t>RT TLM </a:t>
+            </a:r>
+            <a:r>
+              <a:rPr lang="en-US" dirty="0" smtClean="0"/>
+              <a:t/>
+            </a:r>
+            <a:br>
+              <a:rPr lang="en-US" dirty="0" smtClean="0"/>
+            </a:br>
+            <a:r>
+              <a:rPr lang="en-US" dirty="0" smtClean="0"/>
+              <a:t>Flash / current data requirements</a:t>
+            </a:r>
+            <a:endParaRPr lang="en-US" dirty="0"/>
+          </a:p>
+        </p:txBody>
+      </p:sp>
+      <p:sp>
+        <p:nvSpPr>
+          <p:cNvPr id="2" name="TextBox 1"/>
+          <p:cNvSpPr txBox="1"/>
+          <p:nvPr/>
+        </p:nvSpPr>
+        <p:spPr>
+          <a:xfrm>
+            <a:off x="4140692" y="1013460"/>
+            <a:ext cx="928459" cy="369332"/>
+          </a:xfrm>
+          <a:prstGeom prst="rect">
+            <a:avLst/>
+          </a:prstGeom>
+          <a:noFill/>
+        </p:spPr>
+        <p:txBody>
+          <a:bodyPr wrap="none" rtlCol="0">
+            <a:spAutoFit/>
+          </a:bodyPr>
+          <a:lstStyle/>
+          <a:p>
+            <a:r>
+              <a:rPr lang="en-US" dirty="0" smtClean="0">
+                <a:solidFill>
+                  <a:schemeClr val="accent6"/>
+                </a:solidFill>
+              </a:rPr>
+              <a:t>FLASH</a:t>
+            </a:r>
+            <a:endParaRPr lang="en-US" dirty="0">
+              <a:solidFill>
+                <a:schemeClr val="accent6"/>
+              </a:solidFill>
+            </a:endParaRPr>
+          </a:p>
+        </p:txBody>
+      </p:sp>
+      <p:sp>
+        <p:nvSpPr>
+          <p:cNvPr id="7" name="Content Placeholder 5"/>
+          <p:cNvSpPr txBox="1">
+            <a:spLocks/>
+          </p:cNvSpPr>
+          <p:nvPr/>
+        </p:nvSpPr>
+        <p:spPr bwMode="auto">
+          <a:xfrm>
+            <a:off x="248027" y="4968239"/>
+            <a:ext cx="8713787" cy="1584961"/>
+          </a:xfrm>
+          <a:prstGeom prst="rect">
+            <a:avLst/>
+          </a:prstGeom>
+          <a:noFill/>
+          <a:ln w="9525">
+            <a:noFill/>
+            <a:miter lim="800000"/>
+            <a:headEnd/>
+            <a:tailEnd/>
+          </a:ln>
+        </p:spPr>
+        <p:txBody>
+          <a:bodyPr vert="horz" wrap="square" lIns="91440" tIns="45720" rIns="91440" bIns="45720" numCol="1" anchor="t" anchorCtr="0" compatLnSpc="1">
+            <a:prstTxWarp prst="textNoShape">
+              <a:avLst/>
+            </a:prstTxWarp>
+          </a:bodyPr>
+          <a:lstStyle>
+            <a:lvl1pPr marL="285750" indent="-285750" algn="l" rtl="0" eaLnBrk="0" fontAlgn="base" hangingPunct="0">
+              <a:spcBef>
+                <a:spcPct val="45000"/>
+              </a:spcBef>
+              <a:spcAft>
+                <a:spcPct val="0"/>
+              </a:spcAft>
+              <a:buSzPct val="100000"/>
+              <a:buFontTx/>
+              <a:buBlip>
+                <a:blip r:embed="rId3"/>
+              </a:buBlip>
+              <a:defRPr b="1">
+                <a:solidFill>
+                  <a:schemeClr val="tx1"/>
+                </a:solidFill>
+                <a:latin typeface="+mn-lt"/>
+                <a:ea typeface="+mn-ea"/>
+                <a:cs typeface="+mn-cs"/>
+              </a:defRPr>
+            </a:lvl1pPr>
+            <a:lvl2pPr marL="742950" indent="-285750" algn="l" rtl="0" eaLnBrk="0" fontAlgn="base" hangingPunct="0">
+              <a:spcBef>
+                <a:spcPct val="45000"/>
+              </a:spcBef>
+              <a:spcAft>
+                <a:spcPct val="0"/>
+              </a:spcAft>
+              <a:buSzPct val="100000"/>
+              <a:buFontTx/>
+              <a:buBlip>
+                <a:blip r:embed="rId4"/>
+              </a:buBlip>
+              <a:defRPr sz="1600">
+                <a:solidFill>
+                  <a:schemeClr val="tx1"/>
+                </a:solidFill>
+                <a:latin typeface="+mn-lt"/>
+                <a:cs typeface="+mn-cs"/>
+              </a:defRPr>
+            </a:lvl2pPr>
+            <a:lvl3pPr marL="1085850" indent="-171450" algn="l" rtl="0" eaLnBrk="0" fontAlgn="base" hangingPunct="0">
+              <a:spcBef>
+                <a:spcPct val="45000"/>
+              </a:spcBef>
+              <a:spcAft>
+                <a:spcPct val="0"/>
+              </a:spcAft>
+              <a:buSzPct val="100000"/>
+              <a:buFontTx/>
+              <a:buBlip>
+                <a:blip r:embed="rId5"/>
+              </a:buBlip>
+              <a:defRPr sz="1200">
+                <a:solidFill>
+                  <a:schemeClr val="tx1"/>
+                </a:solidFill>
+                <a:latin typeface="+mn-lt"/>
+                <a:cs typeface="+mn-cs"/>
+              </a:defRPr>
+            </a:lvl3pPr>
+            <a:lvl4pPr marL="1600200" indent="-228600" algn="l" rtl="0" eaLnBrk="0" fontAlgn="base" hangingPunct="0">
+              <a:spcBef>
+                <a:spcPct val="45000"/>
+              </a:spcBef>
+              <a:spcAft>
+                <a:spcPct val="0"/>
+              </a:spcAft>
+              <a:buChar char="–"/>
+              <a:defRPr sz="1600">
+                <a:solidFill>
+                  <a:schemeClr val="tx1"/>
+                </a:solidFill>
+                <a:latin typeface="Times New Roman" pitchFamily="18" charset="0"/>
+                <a:cs typeface="+mn-cs"/>
+              </a:defRPr>
+            </a:lvl4pPr>
+            <a:lvl5pPr marL="2057400" indent="-228600" algn="l" rtl="0" eaLnBrk="0" fontAlgn="base" hangingPunct="0">
+              <a:spcBef>
+                <a:spcPct val="45000"/>
+              </a:spcBef>
+              <a:spcAft>
+                <a:spcPct val="0"/>
+              </a:spcAft>
+              <a:buChar char="»"/>
+              <a:defRPr sz="1400">
+                <a:solidFill>
+                  <a:schemeClr val="tx1"/>
+                </a:solidFill>
+                <a:latin typeface="Times New Roman" pitchFamily="18" charset="0"/>
+                <a:cs typeface="+mn-cs"/>
+              </a:defRPr>
+            </a:lvl5pPr>
+            <a:lvl6pPr marL="2514600" indent="-228600" algn="l" rtl="0" fontAlgn="base">
+              <a:spcBef>
+                <a:spcPct val="45000"/>
+              </a:spcBef>
+              <a:spcAft>
+                <a:spcPct val="0"/>
+              </a:spcAft>
+              <a:buChar char="»"/>
+              <a:defRPr sz="1400">
+                <a:solidFill>
+                  <a:schemeClr val="tx1"/>
+                </a:solidFill>
+                <a:latin typeface="Times New Roman" pitchFamily="18" charset="0"/>
+                <a:cs typeface="+mn-cs"/>
+              </a:defRPr>
+            </a:lvl6pPr>
+            <a:lvl7pPr marL="2971800" indent="-228600" algn="l" rtl="0" fontAlgn="base">
+              <a:spcBef>
+                <a:spcPct val="45000"/>
+              </a:spcBef>
+              <a:spcAft>
+                <a:spcPct val="0"/>
+              </a:spcAft>
+              <a:buChar char="»"/>
+              <a:defRPr sz="1400">
+                <a:solidFill>
+                  <a:schemeClr val="tx1"/>
+                </a:solidFill>
+                <a:latin typeface="Times New Roman" pitchFamily="18" charset="0"/>
+                <a:cs typeface="+mn-cs"/>
+              </a:defRPr>
+            </a:lvl7pPr>
+            <a:lvl8pPr marL="3429000" indent="-228600" algn="l" rtl="0" fontAlgn="base">
+              <a:spcBef>
+                <a:spcPct val="45000"/>
+              </a:spcBef>
+              <a:spcAft>
+                <a:spcPct val="0"/>
+              </a:spcAft>
+              <a:buChar char="»"/>
+              <a:defRPr sz="1400">
+                <a:solidFill>
+                  <a:schemeClr val="tx1"/>
+                </a:solidFill>
+                <a:latin typeface="Times New Roman" pitchFamily="18" charset="0"/>
+                <a:cs typeface="+mn-cs"/>
+              </a:defRPr>
+            </a:lvl8pPr>
+            <a:lvl9pPr marL="3886200" indent="-228600" algn="l" rtl="0" fontAlgn="base">
+              <a:spcBef>
+                <a:spcPct val="45000"/>
+              </a:spcBef>
+              <a:spcAft>
+                <a:spcPct val="0"/>
+              </a:spcAft>
+              <a:buChar char="»"/>
+              <a:defRPr sz="1400">
+                <a:solidFill>
+                  <a:schemeClr val="tx1"/>
+                </a:solidFill>
+                <a:latin typeface="Times New Roman" pitchFamily="18" charset="0"/>
+                <a:cs typeface="+mn-cs"/>
+              </a:defRPr>
+            </a:lvl9pPr>
+          </a:lstStyle>
+          <a:p>
+            <a:endParaRPr lang="en-US" sz="1100" kern="0" dirty="0" smtClean="0"/>
+          </a:p>
+          <a:p>
+            <a:r>
+              <a:rPr lang="en-US" sz="1050" b="0" dirty="0"/>
+              <a:t>RTC shall save current condition of the telemetric data base to be able to read upon user request from the RT viewer interface at any given time. The members that will be save have to be visually enable flag.</a:t>
+            </a:r>
+          </a:p>
+          <a:p>
+            <a:pPr marL="285750" lvl="1">
+              <a:buFontTx/>
+              <a:buBlip>
+                <a:blip r:embed="rId3"/>
+              </a:buBlip>
+            </a:pPr>
+            <a:r>
+              <a:rPr lang="en-US" sz="1050" dirty="0"/>
+              <a:t>Read current data: The RT viewer will be able to read and present current data at any given time and if the user checked the option to read current data at the RT viewer interface.</a:t>
+            </a:r>
+          </a:p>
+          <a:p>
+            <a:pPr marL="285750" lvl="1">
+              <a:buFontTx/>
+              <a:buBlip>
+                <a:blip r:embed="rId3"/>
+              </a:buBlip>
+            </a:pPr>
+            <a:endParaRPr lang="en-US" sz="1100" b="1" kern="0" dirty="0" smtClean="0">
+              <a:ea typeface="+mn-ea"/>
+            </a:endParaRPr>
+          </a:p>
+          <a:p>
+            <a:pPr marL="0" indent="0">
+              <a:buFontTx/>
+              <a:buNone/>
+            </a:pPr>
+            <a:endParaRPr lang="en-US" sz="1100" kern="0" dirty="0" smtClean="0"/>
+          </a:p>
+          <a:p>
+            <a:pPr marL="0" indent="0">
+              <a:buFontTx/>
+              <a:buNone/>
+            </a:pPr>
+            <a:r>
+              <a:rPr lang="en-US" kern="0" dirty="0" smtClean="0"/>
+              <a:t>  </a:t>
+            </a:r>
+            <a:endParaRPr lang="en-US" kern="0" dirty="0" smtClean="0"/>
+          </a:p>
+        </p:txBody>
+      </p:sp>
+      <p:sp>
+        <p:nvSpPr>
+          <p:cNvPr id="8" name="TextBox 7"/>
+          <p:cNvSpPr txBox="1"/>
+          <p:nvPr/>
+        </p:nvSpPr>
+        <p:spPr>
+          <a:xfrm>
+            <a:off x="3871387" y="4783573"/>
+            <a:ext cx="1467068" cy="369332"/>
+          </a:xfrm>
+          <a:prstGeom prst="rect">
+            <a:avLst/>
+          </a:prstGeom>
+          <a:noFill/>
+        </p:spPr>
+        <p:txBody>
+          <a:bodyPr wrap="none" rtlCol="0">
+            <a:spAutoFit/>
+          </a:bodyPr>
+          <a:lstStyle/>
+          <a:p>
+            <a:pPr algn="r" rtl="0"/>
+            <a:r>
+              <a:rPr lang="en-US" dirty="0" smtClean="0">
+                <a:solidFill>
+                  <a:schemeClr val="accent6"/>
+                </a:solidFill>
+              </a:rPr>
+              <a:t>Current data</a:t>
+            </a:r>
+            <a:endParaRPr lang="en-US" dirty="0">
+              <a:solidFill>
+                <a:schemeClr val="accent6"/>
+              </a:solidFill>
+            </a:endParaRPr>
+          </a:p>
+        </p:txBody>
+      </p:sp>
+    </p:spTree>
+    <p:extLst>
+      <p:ext uri="{BB962C8B-B14F-4D97-AF65-F5344CB8AC3E}">
+        <p14:creationId xmlns:p14="http://schemas.microsoft.com/office/powerpoint/2010/main" val="555503669"/>
+      </p:ext>
+    </p:extLst>
+  </p:cSld>
+  <p:clrMapOvr>
+    <a:masterClrMapping/>
+  </p:clrMapOvr>
+  <p:transition/>
+  <p:timing>
+    <p:tnLst>
+      <p:par>
+        <p:cTn id="1" dur="indefinite" restart="never" nodeType="tmRoot"/>
+      </p:par>
+    </p:tnLst>
+  </p:timing>
+</p:sld>
+</file>
+
+<file path=ppt/slides/slide5.xml><?xml version="1.0" encoding="utf-8"?>
 <p:sld xmlns:a="http://schemas.openxmlformats.org/drawingml/2006/main" xmlns:r="http://schemas.openxmlformats.org/officeDocument/2006/relationships" xmlns:p="http://schemas.openxmlformats.org/presentationml/2006/main">
   <p:cSld>
     <p:spTree>
@@ -7578,7 +8119,42 @@
       </p:grpSpPr>
       <p:sp>
         <p:nvSpPr>
-          <p:cNvPr id="6" name="Content Placeholder 5"/>
+          <p:cNvPr id="5" name="Title 4"/>
+          <p:cNvSpPr>
+            <a:spLocks noGrp="1"/>
+          </p:cNvSpPr>
+          <p:nvPr>
+            <p:ph type="title"/>
+          </p:nvPr>
+        </p:nvSpPr>
+        <p:spPr/>
+        <p:txBody>
+          <a:bodyPr/>
+          <a:lstStyle/>
+          <a:p>
+            <a:pPr algn="ctr" rtl="0"/>
+            <a:r>
+              <a:rPr lang="en-US" dirty="0" smtClean="0"/>
+              <a:t>RT TLM </a:t>
+            </a:r>
+            <a:r>
+              <a:rPr lang="en-US" dirty="0" smtClean="0"/>
+              <a:t/>
+            </a:r>
+            <a:br>
+              <a:rPr lang="en-US" dirty="0" smtClean="0"/>
+            </a:br>
+            <a:r>
+              <a:rPr lang="en-US" dirty="0" smtClean="0"/>
+              <a:t>RT viewer requirements</a:t>
+            </a:r>
+            <a:endParaRPr lang="en-US" dirty="0"/>
+          </a:p>
+        </p:txBody>
+      </p:sp>
+      <p:sp>
+        <p:nvSpPr>
+          <p:cNvPr id="2" name="Content Placeholder 1"/>
           <p:cNvSpPr>
             <a:spLocks noGrp="1"/>
           </p:cNvSpPr>
@@ -7591,22 +8167,181 @@
           <a:bodyPr/>
           <a:lstStyle/>
           <a:p>
-            <a:pPr marL="0" indent="0">
-              <a:buNone/>
-            </a:pPr>
+            <a:r>
+              <a:rPr lang="en-US" sz="1300" dirty="0" smtClean="0"/>
+              <a:t>The RT viewer shell present telemetric data from upon user request at any given time from 3 different sources:</a:t>
+            </a:r>
+          </a:p>
+          <a:p>
+            <a:pPr lvl="1"/>
+            <a:r>
+              <a:rPr lang="en-US" sz="1050" dirty="0" smtClean="0"/>
+              <a:t>Current data:  Current condition of the RTC telemetric members. </a:t>
+            </a:r>
+          </a:p>
+          <a:p>
+            <a:pPr lvl="1"/>
+            <a:r>
+              <a:rPr lang="en-US" sz="1050" dirty="0" smtClean="0"/>
+              <a:t>Flash data: All Flash blocks that had been written to Flash (from latest to oldest).</a:t>
+            </a:r>
+          </a:p>
+          <a:p>
+            <a:pPr lvl="1"/>
+            <a:r>
+              <a:rPr lang="en-US" sz="1050" dirty="0" smtClean="0"/>
+              <a:t>File: raw data that had been previous stored (format of text file).</a:t>
+            </a:r>
+          </a:p>
+          <a:p>
+            <a:r>
+              <a:rPr lang="en-US" dirty="0"/>
+              <a:t> </a:t>
+            </a:r>
+            <a:r>
+              <a:rPr lang="en-US" sz="1300" dirty="0" smtClean="0"/>
+              <a:t>The RT viewer shell present the telemetric data at the following way:</a:t>
+            </a:r>
+          </a:p>
+          <a:p>
+            <a:pPr lvl="1"/>
+            <a:r>
+              <a:rPr lang="en-US" sz="1050" dirty="0" smtClean="0"/>
+              <a:t>Table of all members: This table will consist all telemetric members information one after one. This data can be view at:</a:t>
+            </a:r>
+          </a:p>
+          <a:p>
+            <a:pPr lvl="2"/>
+            <a:r>
+              <a:rPr lang="en-US" sz="1050" dirty="0" smtClean="0"/>
+              <a:t>Sort values: The user will be able to sort those data from low to high, low to high or group them by RTC module.</a:t>
+            </a:r>
+          </a:p>
+          <a:p>
+            <a:pPr lvl="2"/>
+            <a:r>
+              <a:rPr lang="en-US" sz="1050" dirty="0" smtClean="0"/>
+              <a:t>Data view: The user will be able to view members data by bytes or by original data values.</a:t>
+            </a:r>
+          </a:p>
+          <a:p>
+            <a:pPr lvl="1"/>
+            <a:r>
+              <a:rPr lang="en-US" sz="1050" dirty="0" smtClean="0"/>
+              <a:t>Visual way: The user will able to search after data member by his name or index and by his group. Then the RT viewer shell present for this selected member a 2D figure and  table of results by time stamp.</a:t>
+            </a:r>
+          </a:p>
+          <a:p>
+            <a:r>
+              <a:rPr lang="en-US" sz="1300" b="1" dirty="0" smtClean="0">
+                <a:ea typeface="+mn-ea"/>
+              </a:rPr>
+              <a:t> The </a:t>
+            </a:r>
+            <a:r>
+              <a:rPr lang="en-US" sz="1300" b="1" dirty="0">
+                <a:ea typeface="+mn-ea"/>
+              </a:rPr>
+              <a:t>RT viewer shall present telemetric members by his names:</a:t>
+            </a:r>
+          </a:p>
+          <a:p>
+            <a:pPr lvl="1"/>
+            <a:r>
+              <a:rPr lang="en-US" sz="1050" dirty="0" smtClean="0"/>
+              <a:t>The telemetric members names will be read from generated file. This file generate by 3d application. </a:t>
+            </a:r>
+          </a:p>
+          <a:p>
+            <a:r>
+              <a:rPr lang="en-US" sz="1250" dirty="0"/>
+              <a:t> </a:t>
+            </a:r>
+            <a:r>
+              <a:rPr lang="en-US" sz="1250" dirty="0" smtClean="0"/>
+              <a:t>The RT viewer shall saved output files:</a:t>
+            </a:r>
+          </a:p>
+          <a:p>
+            <a:pPr lvl="1"/>
+            <a:r>
+              <a:rPr lang="en-US" sz="1050" dirty="0" smtClean="0"/>
+              <a:t>Upon user request the RT viewer shell generate the following output files:</a:t>
+            </a:r>
+          </a:p>
+          <a:p>
+            <a:pPr lvl="2"/>
+            <a:r>
+              <a:rPr lang="en-US" sz="1050" dirty="0"/>
+              <a:t>Table of all </a:t>
+            </a:r>
+            <a:r>
+              <a:rPr lang="en-US" sz="1050" dirty="0" smtClean="0"/>
+              <a:t>members – At text file.</a:t>
+            </a:r>
+          </a:p>
+          <a:p>
+            <a:pPr lvl="2"/>
+            <a:r>
+              <a:rPr lang="en-US" sz="1050" dirty="0" smtClean="0"/>
+              <a:t>Raw data of the incoming data.</a:t>
+            </a:r>
+          </a:p>
+          <a:p>
+            <a:pPr lvl="2"/>
+            <a:r>
+              <a:rPr lang="en-US" sz="1050" dirty="0" smtClean="0"/>
+              <a:t>Picture (format *.jpg) of the 2D figure.  </a:t>
+            </a:r>
+            <a:endParaRPr lang="en-US" sz="1050" dirty="0"/>
+          </a:p>
+          <a:p>
+            <a:pPr lvl="1"/>
             <a:endParaRPr lang="en-US" dirty="0" smtClean="0"/>
           </a:p>
           <a:p>
-            <a:pPr marL="0" indent="0">
-              <a:buNone/>
-            </a:pPr>
-            <a:r>
-              <a:rPr lang="en-US" dirty="0" smtClean="0"/>
-              <a:t>  </a:t>
-            </a:r>
+            <a:endParaRPr lang="en-US" dirty="0"/>
           </a:p>
         </p:txBody>
       </p:sp>
+    </p:spTree>
+    <p:extLst>
+      <p:ext uri="{BB962C8B-B14F-4D97-AF65-F5344CB8AC3E}">
+        <p14:creationId xmlns:p14="http://schemas.microsoft.com/office/powerpoint/2010/main" val="2212492260"/>
+      </p:ext>
+    </p:extLst>
+  </p:cSld>
+  <p:clrMapOvr>
+    <a:masterClrMapping/>
+  </p:clrMapOvr>
+  <p:transition/>
+  <p:timing>
+    <p:tnLst>
+      <p:par>
+        <p:cTn id="1" dur="indefinite" restart="never" nodeType="tmRoot"/>
+      </p:par>
+    </p:tnLst>
+  </p:timing>
+</p:sld>
+</file>
+
+<file path=ppt/slides/slide6.xml><?xml version="1.0" encoding="utf-8"?>
+<p:sld xmlns:a="http://schemas.openxmlformats.org/drawingml/2006/main" xmlns:r="http://schemas.openxmlformats.org/officeDocument/2006/relationships" xmlns:p="http://schemas.openxmlformats.org/presentationml/2006/main">
+  <p:cSld>
+    <p:spTree>
+      <p:nvGrpSpPr>
+        <p:cNvPr id="1" name=""/>
+        <p:cNvGrpSpPr/>
+        <p:nvPr/>
+      </p:nvGrpSpPr>
+      <p:grpSpPr>
+        <a:xfrm>
+          <a:off x="0" y="0"/>
+          <a:ext cx="0" cy="0"/>
+          <a:chOff x="0" y="0"/>
+          <a:chExt cx="0" cy="0"/>
+        </a:xfrm>
+      </p:grpSpPr>
       <p:sp>
         <p:nvSpPr>
           <p:cNvPr id="5" name="Title 4"/>
@@ -7622,17 +8357,29 @@
           <a:bodyPr/>
           <a:lstStyle/>
           <a:p>
-            <a:r>
-              <a:rPr lang="en-US" sz="1400" dirty="0" smtClean="0"/>
-              <a:t>Telemetric SW flow – Initialization and compilation process</a:t>
-            </a:r>
-            <a:endParaRPr lang="en-US" sz="1400" dirty="0"/>
+            <a:pPr algn="ctr" rtl="0"/>
+            <a:r>
+              <a:rPr lang="en-US" dirty="0" smtClean="0"/>
+              <a:t>RT TLM </a:t>
+            </a:r>
+            <a:r>
+              <a:rPr lang="en-US" dirty="0" smtClean="0"/>
+              <a:t/>
+            </a:r>
+            <a:br>
+              <a:rPr lang="en-US" dirty="0" smtClean="0"/>
+            </a:br>
+            <a:r>
+              <a:rPr lang="en-US" dirty="0" smtClean="0"/>
+              <a:t>RT viewer - Presentation of table</a:t>
+            </a:r>
+            <a:endParaRPr lang="en-US" dirty="0"/>
           </a:p>
         </p:txBody>
       </p:sp>
       <p:pic>
         <p:nvPicPr>
-          <p:cNvPr id="1026" name="Picture 2"/>
+          <p:cNvPr id="5122" name="Picture 2"/>
           <p:cNvPicPr>
             <a:picLocks noChangeAspect="1" noChangeArrowheads="1"/>
           </p:cNvPicPr>
@@ -7653,8 +8400,8 @@
         </p:blipFill>
         <p:spPr bwMode="auto">
           <a:xfrm>
-            <a:off x="1809750" y="1323023"/>
-            <a:ext cx="5786490" cy="4513897"/>
+            <a:off x="341191" y="1009934"/>
+            <a:ext cx="8731439" cy="4954068"/>
           </a:xfrm>
           <a:prstGeom prst="rect">
             <a:avLst/>
@@ -7687,7 +8434,273 @@
     </p:spTree>
     <p:extLst>
       <p:ext uri="{BB962C8B-B14F-4D97-AF65-F5344CB8AC3E}">
-        <p14:creationId xmlns:p14="http://schemas.microsoft.com/office/powerpoint/2010/main" val="2391719726"/>
+        <p14:creationId xmlns:p14="http://schemas.microsoft.com/office/powerpoint/2010/main" val="4164485151"/>
+      </p:ext>
+    </p:extLst>
+  </p:cSld>
+  <p:clrMapOvr>
+    <a:masterClrMapping/>
+  </p:clrMapOvr>
+  <p:transition/>
+  <p:timing>
+    <p:tnLst>
+      <p:par>
+        <p:cTn id="1" dur="indefinite" restart="never" nodeType="tmRoot"/>
+      </p:par>
+    </p:tnLst>
+  </p:timing>
+</p:sld>
+</file>
+
+<file path=ppt/slides/slide7.xml><?xml version="1.0" encoding="utf-8"?>
+<p:sld xmlns:a="http://schemas.openxmlformats.org/drawingml/2006/main" xmlns:r="http://schemas.openxmlformats.org/officeDocument/2006/relationships" xmlns:p="http://schemas.openxmlformats.org/presentationml/2006/main">
+  <p:cSld>
+    <p:spTree>
+      <p:nvGrpSpPr>
+        <p:cNvPr id="1" name=""/>
+        <p:cNvGrpSpPr/>
+        <p:nvPr/>
+      </p:nvGrpSpPr>
+      <p:grpSpPr>
+        <a:xfrm>
+          <a:off x="0" y="0"/>
+          <a:ext cx="0" cy="0"/>
+          <a:chOff x="0" y="0"/>
+          <a:chExt cx="0" cy="0"/>
+        </a:xfrm>
+      </p:grpSpPr>
+      <p:sp>
+        <p:nvSpPr>
+          <p:cNvPr id="5" name="Title 4"/>
+          <p:cNvSpPr>
+            <a:spLocks noGrp="1"/>
+          </p:cNvSpPr>
+          <p:nvPr>
+            <p:ph type="title"/>
+          </p:nvPr>
+        </p:nvSpPr>
+        <p:spPr/>
+        <p:txBody>
+          <a:bodyPr/>
+          <a:lstStyle/>
+          <a:p>
+            <a:pPr algn="ctr" rtl="0"/>
+            <a:r>
+              <a:rPr lang="en-US" dirty="0" smtClean="0"/>
+              <a:t>RT TLM </a:t>
+            </a:r>
+            <a:r>
+              <a:rPr lang="en-US" dirty="0" smtClean="0"/>
+              <a:t/>
+            </a:r>
+            <a:br>
+              <a:rPr lang="en-US" dirty="0" smtClean="0"/>
+            </a:br>
+            <a:r>
+              <a:rPr lang="en-US" dirty="0" smtClean="0"/>
+              <a:t>RT viewer - Presentation of table</a:t>
+            </a:r>
+            <a:endParaRPr lang="en-US" dirty="0"/>
+          </a:p>
+        </p:txBody>
+      </p:sp>
+      <p:pic>
+        <p:nvPicPr>
+          <p:cNvPr id="6146" name="Picture 2"/>
+          <p:cNvPicPr>
+            <a:picLocks noChangeAspect="1" noChangeArrowheads="1"/>
+          </p:cNvPicPr>
+          <p:nvPr/>
+        </p:nvPicPr>
+        <p:blipFill>
+          <a:blip r:embed="rId2">
+            <a:extLst>
+              <a:ext uri="{28A0092B-C50C-407E-A947-70E740481C1C}">
+                <a14:useLocalDpi xmlns:a14="http://schemas.microsoft.com/office/drawing/2010/main" val="0"/>
+              </a:ext>
+            </a:extLst>
+          </a:blip>
+          <a:srcRect/>
+          <a:stretch>
+            <a:fillRect/>
+          </a:stretch>
+        </p:blipFill>
+        <p:spPr bwMode="auto">
+          <a:xfrm>
+            <a:off x="926910" y="1173705"/>
+            <a:ext cx="7583578" cy="5041355"/>
+          </a:xfrm>
+          <a:prstGeom prst="rect">
+            <a:avLst/>
+          </a:prstGeom>
+          <a:noFill/>
+          <a:ln>
+            <a:noFill/>
+          </a:ln>
+          <a:extLst>
+            <a:ext uri="{909E8E84-426E-40DD-AFC4-6F175D3DCCD1}">
+              <a14:hiddenFill xmlns:a14="http://schemas.microsoft.com/office/drawing/2010/main">
+                <a:solidFill>
+                  <a:schemeClr val="accent1"/>
+                </a:solidFill>
+              </a14:hiddenFill>
+            </a:ext>
+            <a:ext uri="{91240B29-F687-4F45-9708-019B960494DF}">
+              <a14:hiddenLine xmlns:a14="http://schemas.microsoft.com/office/drawing/2010/main" w="9525">
+                <a:solidFill>
+                  <a:schemeClr val="tx1"/>
+                </a:solidFill>
+                <a:miter lim="800000"/>
+                <a:headEnd/>
+                <a:tailEnd/>
+              </a14:hiddenLine>
+            </a:ext>
+          </a:extLst>
+        </p:spPr>
+      </p:pic>
+    </p:spTree>
+    <p:extLst>
+      <p:ext uri="{BB962C8B-B14F-4D97-AF65-F5344CB8AC3E}">
+        <p14:creationId xmlns:p14="http://schemas.microsoft.com/office/powerpoint/2010/main" val="1453379152"/>
+      </p:ext>
+    </p:extLst>
+  </p:cSld>
+  <p:clrMapOvr>
+    <a:masterClrMapping/>
+  </p:clrMapOvr>
+  <p:transition/>
+  <p:timing>
+    <p:tnLst>
+      <p:par>
+        <p:cTn id="1" dur="indefinite" restart="never" nodeType="tmRoot"/>
+      </p:par>
+    </p:tnLst>
+  </p:timing>
+</p:sld>
+</file>
+
+<file path=ppt/slides/slide8.xml><?xml version="1.0" encoding="utf-8"?>
+<p:sld xmlns:a="http://schemas.openxmlformats.org/drawingml/2006/main" xmlns:r="http://schemas.openxmlformats.org/officeDocument/2006/relationships" xmlns:p="http://schemas.openxmlformats.org/presentationml/2006/main">
+  <p:cSld>
+    <p:spTree>
+      <p:nvGrpSpPr>
+        <p:cNvPr id="1" name=""/>
+        <p:cNvGrpSpPr/>
+        <p:nvPr/>
+      </p:nvGrpSpPr>
+      <p:grpSpPr>
+        <a:xfrm>
+          <a:off x="0" y="0"/>
+          <a:ext cx="0" cy="0"/>
+          <a:chOff x="0" y="0"/>
+          <a:chExt cx="0" cy="0"/>
+        </a:xfrm>
+      </p:grpSpPr>
+      <p:sp>
+        <p:nvSpPr>
+          <p:cNvPr id="6" name="Content Placeholder 5"/>
+          <p:cNvSpPr>
+            <a:spLocks noGrp="1"/>
+          </p:cNvSpPr>
+          <p:nvPr>
+            <p:ph idx="1"/>
+          </p:nvPr>
+        </p:nvSpPr>
+        <p:spPr>
+          <a:xfrm>
+            <a:off x="179388" y="1080000"/>
+            <a:ext cx="8713787" cy="2448060"/>
+          </a:xfrm>
+        </p:spPr>
+        <p:txBody>
+          <a:bodyPr/>
+          <a:lstStyle/>
+          <a:p>
+            <a:r>
+              <a:rPr lang="en-US" dirty="0"/>
+              <a:t> </a:t>
+            </a:r>
+            <a:r>
+              <a:rPr lang="en-US" sz="1400" dirty="0" smtClean="0"/>
+              <a:t>Each telemetric plan will be in an ICD file format (.grep file</a:t>
+            </a:r>
+            <a:r>
+              <a:rPr lang="en-US" sz="1400" dirty="0" smtClean="0"/>
+              <a:t>).</a:t>
+            </a:r>
+          </a:p>
+          <a:p>
+            <a:r>
+              <a:rPr lang="en-US" sz="1400" dirty="0" smtClean="0"/>
+              <a:t> The </a:t>
+            </a:r>
+            <a:r>
+              <a:rPr lang="en-US" sz="1400" dirty="0"/>
+              <a:t>telemetric plan members will be build throw GDE application.</a:t>
+            </a:r>
+            <a:endParaRPr lang="en-US" sz="1400" dirty="0" smtClean="0"/>
+          </a:p>
+          <a:p>
+            <a:r>
+              <a:rPr lang="en-US" sz="1400" dirty="0"/>
+              <a:t> </a:t>
+            </a:r>
+            <a:r>
+              <a:rPr lang="en-US" sz="1400" dirty="0" smtClean="0"/>
+              <a:t>The ICD message will be form by system engineers.</a:t>
+            </a:r>
+            <a:endParaRPr lang="en-US" dirty="0" smtClean="0"/>
+          </a:p>
+          <a:p>
+            <a:pPr marL="0" indent="0">
+              <a:buNone/>
+            </a:pPr>
+            <a:r>
+              <a:rPr lang="en-US" dirty="0" smtClean="0"/>
+              <a:t>  </a:t>
+            </a:r>
+          </a:p>
+        </p:txBody>
+      </p:sp>
+      <p:sp>
+        <p:nvSpPr>
+          <p:cNvPr id="5" name="Title 4"/>
+          <p:cNvSpPr>
+            <a:spLocks noGrp="1"/>
+          </p:cNvSpPr>
+          <p:nvPr>
+            <p:ph type="title"/>
+          </p:nvPr>
+        </p:nvSpPr>
+        <p:spPr/>
+        <p:txBody>
+          <a:bodyPr/>
+          <a:lstStyle/>
+          <a:p>
+            <a:pPr algn="ctr" rtl="0"/>
+            <a:r>
+              <a:rPr lang="en-US" dirty="0"/>
+              <a:t>RT TLM parameters configuration</a:t>
+            </a:r>
+            <a:br>
+              <a:rPr lang="en-US" dirty="0"/>
+            </a:br>
+            <a:r>
+              <a:rPr lang="en-US" dirty="0"/>
+              <a:t>Solution </a:t>
+            </a:r>
+            <a:r>
+              <a:rPr lang="en-US" dirty="0" smtClean="0"/>
+              <a:t>A – ICD messages</a:t>
+            </a:r>
+            <a:endParaRPr lang="en-US" dirty="0"/>
+          </a:p>
+        </p:txBody>
+      </p:sp>
+    </p:spTree>
+    <p:extLst>
+      <p:ext uri="{BB962C8B-B14F-4D97-AF65-F5344CB8AC3E}">
+        <p14:creationId xmlns:p14="http://schemas.microsoft.com/office/powerpoint/2010/main" val="1509595162"/>
       </p:ext>
     </p:extLst>
   </p:cSld>
@@ -7732,10 +8745,21 @@
             <p:ph idx="1"/>
           </p:nvPr>
         </p:nvSpPr>
-        <p:spPr/>
+        <p:spPr>
+          <a:xfrm>
+            <a:off x="179388" y="1080001"/>
+            <a:ext cx="8713787" cy="651146"/>
+          </a:xfrm>
+        </p:spPr>
         <p:txBody>
           <a:bodyPr/>
           <a:lstStyle/>
+          <a:p>
+            <a:r>
+              <a:rPr lang="en-US" dirty="0" smtClean="0"/>
+              <a:t>Parameters configurator tool goal is to add ability to insert / remove / view parameters for a chosen RTC module.  </a:t>
+            </a:r>
+          </a:p>
           <a:p>
             <a:pPr marL="0" indent="0">
               <a:buNone/>
@@ -7768,9 +8792,21 @@
           <a:bodyPr/>
           <a:lstStyle/>
           <a:p>
+            <a:pPr algn="ctr" rtl="0"/>
+            <a:r>
+              <a:rPr lang="en-US" sz="2000" dirty="0"/>
+              <a:t>RT TLM parameters configuration</a:t>
+            </a:r>
+            <a:br>
+              <a:rPr lang="en-US" sz="2000" dirty="0"/>
+            </a:br>
+            <a:r>
+              <a:rPr lang="en-US" sz="2000" dirty="0"/>
+              <a:t>Solution </a:t>
+            </a:r>
             <a:r>
               <a:rPr lang="en-US" sz="2000" dirty="0" smtClean="0"/>
-              <a:t>Telemetric SW flow – Write process</a:t>
+              <a:t>B – Parameters configurator tool </a:t>
             </a:r>
             <a:endParaRPr lang="en-US" sz="2000" dirty="0"/>
           </a:p>
@@ -7778,7 +8814,7 @@
       </p:sp>
       <p:pic>
         <p:nvPicPr>
-          <p:cNvPr id="2050" name="Picture 2" descr="C:\Software_projects\Elbit\ElbitMalat\TLM_dr\Ver_1_002\Write_task.PNG"/>
+          <p:cNvPr id="2" name="Picture 2"/>
           <p:cNvPicPr>
             <a:picLocks noChangeAspect="1" noChangeArrowheads="1"/>
           </p:cNvPicPr>
@@ -7799,28 +8835,367 @@
         </p:blipFill>
         <p:spPr bwMode="auto">
           <a:xfrm>
-            <a:off x="208341" y="1388584"/>
-            <a:ext cx="8592759" cy="3312955"/>
+            <a:off x="556003" y="2148052"/>
+            <a:ext cx="3499788" cy="1120210"/>
           </a:xfrm>
           <a:prstGeom prst="rect">
             <a:avLst/>
           </a:prstGeom>
           <a:noFill/>
+          <a:ln>
+            <a:noFill/>
+          </a:ln>
+          <a:effectLst/>
           <a:extLst>
             <a:ext uri="{909E8E84-426E-40DD-AFC4-6F175D3DCCD1}">
               <a14:hiddenFill xmlns:a14="http://schemas.microsoft.com/office/drawing/2010/main">
                 <a:solidFill>
-                  <a:srgbClr val="FFFFFF"/>
+                  <a:schemeClr val="accent1"/>
                 </a:solidFill>
               </a14:hiddenFill>
+            </a:ext>
+            <a:ext uri="{91240B29-F687-4F45-9708-019B960494DF}">
+              <a14:hiddenLine xmlns:a14="http://schemas.microsoft.com/office/drawing/2010/main" w="9525">
+                <a:solidFill>
+                  <a:schemeClr val="tx1"/>
+                </a:solidFill>
+                <a:miter lim="800000"/>
+                <a:headEnd/>
+                <a:tailEnd/>
+              </a14:hiddenLine>
+            </a:ext>
+            <a:ext uri="{AF507438-7753-43E0-B8FC-AC1667EBCBE1}">
+              <a14:hiddenEffects xmlns:a14="http://schemas.microsoft.com/office/drawing/2010/main">
+                <a:effectLst>
+                  <a:outerShdw dist="35921" dir="2700000" algn="ctr" rotWithShape="0">
+                    <a:schemeClr val="bg2"/>
+                  </a:outerShdw>
+                </a:effectLst>
+              </a14:hiddenEffects>
             </a:ext>
           </a:extLst>
         </p:spPr>
       </p:pic>
+      <p:sp>
+        <p:nvSpPr>
+          <p:cNvPr id="3" name="TextBox 2"/>
+          <p:cNvSpPr txBox="1"/>
+          <p:nvPr/>
+        </p:nvSpPr>
+        <p:spPr>
+          <a:xfrm>
+            <a:off x="528452" y="1778720"/>
+            <a:ext cx="3650358" cy="338554"/>
+          </a:xfrm>
+          <a:prstGeom prst="rect">
+            <a:avLst/>
+          </a:prstGeom>
+          <a:noFill/>
+        </p:spPr>
+        <p:txBody>
+          <a:bodyPr wrap="none" rtlCol="0">
+            <a:spAutoFit/>
+          </a:bodyPr>
+          <a:lstStyle/>
+          <a:p>
+            <a:pPr algn="l" rtl="0"/>
+            <a:r>
+              <a:rPr lang="en-US" sz="1600" dirty="0" smtClean="0"/>
+              <a:t>Configure path to DB files and module</a:t>
+            </a:r>
+            <a:endParaRPr lang="en-US" sz="1600" dirty="0"/>
+          </a:p>
+        </p:txBody>
+      </p:sp>
+      <p:pic>
+        <p:nvPicPr>
+          <p:cNvPr id="4" name="Picture 3"/>
+          <p:cNvPicPr>
+            <a:picLocks noChangeAspect="1" noChangeArrowheads="1"/>
+          </p:cNvPicPr>
+          <p:nvPr/>
+        </p:nvPicPr>
+        <p:blipFill>
+          <a:blip r:embed="rId3">
+            <a:extLst>
+              <a:ext uri="{28A0092B-C50C-407E-A947-70E740481C1C}">
+                <a14:useLocalDpi xmlns:a14="http://schemas.microsoft.com/office/drawing/2010/main" val="0"/>
+              </a:ext>
+            </a:extLst>
+          </a:blip>
+          <a:srcRect/>
+          <a:stretch>
+            <a:fillRect/>
+          </a:stretch>
+        </p:blipFill>
+        <p:spPr bwMode="auto">
+          <a:xfrm>
+            <a:off x="571069" y="3834147"/>
+            <a:ext cx="3565124" cy="1826233"/>
+          </a:xfrm>
+          <a:prstGeom prst="rect">
+            <a:avLst/>
+          </a:prstGeom>
+          <a:noFill/>
+          <a:ln>
+            <a:noFill/>
+          </a:ln>
+          <a:effectLst/>
+          <a:extLst>
+            <a:ext uri="{909E8E84-426E-40DD-AFC4-6F175D3DCCD1}">
+              <a14:hiddenFill xmlns:a14="http://schemas.microsoft.com/office/drawing/2010/main">
+                <a:solidFill>
+                  <a:schemeClr val="accent1"/>
+                </a:solidFill>
+              </a14:hiddenFill>
+            </a:ext>
+            <a:ext uri="{91240B29-F687-4F45-9708-019B960494DF}">
+              <a14:hiddenLine xmlns:a14="http://schemas.microsoft.com/office/drawing/2010/main" w="9525">
+                <a:solidFill>
+                  <a:schemeClr val="tx1"/>
+                </a:solidFill>
+                <a:miter lim="800000"/>
+                <a:headEnd/>
+                <a:tailEnd/>
+              </a14:hiddenLine>
+            </a:ext>
+            <a:ext uri="{AF507438-7753-43E0-B8FC-AC1667EBCBE1}">
+              <a14:hiddenEffects xmlns:a14="http://schemas.microsoft.com/office/drawing/2010/main">
+                <a:effectLst>
+                  <a:outerShdw dist="35921" dir="2700000" algn="ctr" rotWithShape="0">
+                    <a:schemeClr val="bg2"/>
+                  </a:outerShdw>
+                </a:effectLst>
+              </a14:hiddenEffects>
+            </a:ext>
+          </a:extLst>
+        </p:spPr>
+      </p:pic>
+      <p:sp>
+        <p:nvSpPr>
+          <p:cNvPr id="9" name="TextBox 8"/>
+          <p:cNvSpPr txBox="1"/>
+          <p:nvPr/>
+        </p:nvSpPr>
+        <p:spPr>
+          <a:xfrm>
+            <a:off x="556003" y="3434643"/>
+            <a:ext cx="2364750" cy="369332"/>
+          </a:xfrm>
+          <a:prstGeom prst="rect">
+            <a:avLst/>
+          </a:prstGeom>
+          <a:noFill/>
+        </p:spPr>
+        <p:txBody>
+          <a:bodyPr wrap="none" rtlCol="0">
+            <a:spAutoFit/>
+          </a:bodyPr>
+          <a:lstStyle/>
+          <a:p>
+            <a:pPr algn="l" rtl="0"/>
+            <a:r>
+              <a:rPr lang="en-US" dirty="0" smtClean="0"/>
+              <a:t>Insert new parameter</a:t>
+            </a:r>
+            <a:endParaRPr lang="en-US" dirty="0"/>
+          </a:p>
+        </p:txBody>
+      </p:sp>
+      <p:pic>
+        <p:nvPicPr>
+          <p:cNvPr id="1028" name="Picture 4"/>
+          <p:cNvPicPr>
+            <a:picLocks noChangeAspect="1" noChangeArrowheads="1"/>
+          </p:cNvPicPr>
+          <p:nvPr/>
+        </p:nvPicPr>
+        <p:blipFill>
+          <a:blip r:embed="rId4">
+            <a:extLst>
+              <a:ext uri="{28A0092B-C50C-407E-A947-70E740481C1C}">
+                <a14:useLocalDpi xmlns:a14="http://schemas.microsoft.com/office/drawing/2010/main" val="0"/>
+              </a:ext>
+            </a:extLst>
+          </a:blip>
+          <a:srcRect/>
+          <a:stretch>
+            <a:fillRect/>
+          </a:stretch>
+        </p:blipFill>
+        <p:spPr bwMode="auto">
+          <a:xfrm>
+            <a:off x="4594762" y="2158893"/>
+            <a:ext cx="3426215" cy="1109369"/>
+          </a:xfrm>
+          <a:prstGeom prst="rect">
+            <a:avLst/>
+          </a:prstGeom>
+          <a:noFill/>
+          <a:ln>
+            <a:noFill/>
+          </a:ln>
+          <a:effectLst/>
+          <a:extLst>
+            <a:ext uri="{909E8E84-426E-40DD-AFC4-6F175D3DCCD1}">
+              <a14:hiddenFill xmlns:a14="http://schemas.microsoft.com/office/drawing/2010/main">
+                <a:solidFill>
+                  <a:schemeClr val="accent1"/>
+                </a:solidFill>
+              </a14:hiddenFill>
+            </a:ext>
+            <a:ext uri="{91240B29-F687-4F45-9708-019B960494DF}">
+              <a14:hiddenLine xmlns:a14="http://schemas.microsoft.com/office/drawing/2010/main" w="9525">
+                <a:solidFill>
+                  <a:schemeClr val="tx1"/>
+                </a:solidFill>
+                <a:miter lim="800000"/>
+                <a:headEnd/>
+                <a:tailEnd/>
+              </a14:hiddenLine>
+            </a:ext>
+            <a:ext uri="{AF507438-7753-43E0-B8FC-AC1667EBCBE1}">
+              <a14:hiddenEffects xmlns:a14="http://schemas.microsoft.com/office/drawing/2010/main">
+                <a:effectLst>
+                  <a:outerShdw dist="35921" dir="2700000" algn="ctr" rotWithShape="0">
+                    <a:schemeClr val="bg2"/>
+                  </a:outerShdw>
+                </a:effectLst>
+              </a14:hiddenEffects>
+            </a:ext>
+          </a:extLst>
+        </p:spPr>
+      </p:pic>
+      <p:sp>
+        <p:nvSpPr>
+          <p:cNvPr id="11" name="TextBox 10"/>
+          <p:cNvSpPr txBox="1"/>
+          <p:nvPr/>
+        </p:nvSpPr>
+        <p:spPr>
+          <a:xfrm>
+            <a:off x="4506264" y="1747942"/>
+            <a:ext cx="3890809" cy="369332"/>
+          </a:xfrm>
+          <a:prstGeom prst="rect">
+            <a:avLst/>
+          </a:prstGeom>
+          <a:noFill/>
+        </p:spPr>
+        <p:txBody>
+          <a:bodyPr wrap="none" rtlCol="0">
+            <a:spAutoFit/>
+          </a:bodyPr>
+          <a:lstStyle/>
+          <a:p>
+            <a:pPr algn="l" rtl="0"/>
+            <a:r>
+              <a:rPr lang="en-US" dirty="0" smtClean="0"/>
+              <a:t>Remove parameter from module DB</a:t>
+            </a:r>
+            <a:endParaRPr lang="en-US" dirty="0"/>
+          </a:p>
+        </p:txBody>
+      </p:sp>
+      <p:pic>
+        <p:nvPicPr>
+          <p:cNvPr id="1029" name="Picture 5"/>
+          <p:cNvPicPr>
+            <a:picLocks noChangeAspect="1" noChangeArrowheads="1"/>
+          </p:cNvPicPr>
+          <p:nvPr/>
+        </p:nvPicPr>
+        <p:blipFill>
+          <a:blip r:embed="rId5">
+            <a:extLst>
+              <a:ext uri="{28A0092B-C50C-407E-A947-70E740481C1C}">
+                <a14:useLocalDpi xmlns:a14="http://schemas.microsoft.com/office/drawing/2010/main" val="0"/>
+              </a:ext>
+            </a:extLst>
+          </a:blip>
+          <a:srcRect/>
+          <a:stretch>
+            <a:fillRect/>
+          </a:stretch>
+        </p:blipFill>
+        <p:spPr bwMode="auto">
+          <a:xfrm>
+            <a:off x="4594762" y="3834147"/>
+            <a:ext cx="3509205" cy="2280273"/>
+          </a:xfrm>
+          <a:prstGeom prst="rect">
+            <a:avLst/>
+          </a:prstGeom>
+          <a:noFill/>
+          <a:ln>
+            <a:noFill/>
+          </a:ln>
+          <a:effectLst/>
+          <a:extLst>
+            <a:ext uri="{909E8E84-426E-40DD-AFC4-6F175D3DCCD1}">
+              <a14:hiddenFill xmlns:a14="http://schemas.microsoft.com/office/drawing/2010/main">
+                <a:solidFill>
+                  <a:schemeClr val="accent1"/>
+                </a:solidFill>
+              </a14:hiddenFill>
+            </a:ext>
+            <a:ext uri="{91240B29-F687-4F45-9708-019B960494DF}">
+              <a14:hiddenLine xmlns:a14="http://schemas.microsoft.com/office/drawing/2010/main" w="9525">
+                <a:solidFill>
+                  <a:schemeClr val="tx1"/>
+                </a:solidFill>
+                <a:miter lim="800000"/>
+                <a:headEnd/>
+                <a:tailEnd/>
+              </a14:hiddenLine>
+            </a:ext>
+            <a:ext uri="{AF507438-7753-43E0-B8FC-AC1667EBCBE1}">
+              <a14:hiddenEffects xmlns:a14="http://schemas.microsoft.com/office/drawing/2010/main">
+                <a:effectLst>
+                  <a:outerShdw dist="35921" dir="2700000" algn="ctr" rotWithShape="0">
+                    <a:schemeClr val="bg2"/>
+                  </a:outerShdw>
+                </a:effectLst>
+              </a14:hiddenEffects>
+            </a:ext>
+          </a:extLst>
+        </p:spPr>
+      </p:pic>
+      <p:sp>
+        <p:nvSpPr>
+          <p:cNvPr id="13" name="TextBox 12"/>
+          <p:cNvSpPr txBox="1"/>
+          <p:nvPr/>
+        </p:nvSpPr>
+        <p:spPr>
+          <a:xfrm>
+            <a:off x="4933650" y="3434643"/>
+            <a:ext cx="2732479" cy="369332"/>
+          </a:xfrm>
+          <a:prstGeom prst="rect">
+            <a:avLst/>
+          </a:prstGeom>
+          <a:noFill/>
+        </p:spPr>
+        <p:txBody>
+          <a:bodyPr wrap="none" rtlCol="0">
+            <a:spAutoFit/>
+          </a:bodyPr>
+          <a:lstStyle/>
+          <a:p>
+            <a:pPr algn="l" rtl="0"/>
+            <a:r>
+              <a:rPr lang="en-US" dirty="0" smtClean="0"/>
+              <a:t>View module parameters</a:t>
+            </a:r>
+            <a:endParaRPr lang="en-US" dirty="0"/>
+          </a:p>
+        </p:txBody>
+      </p:sp>
     </p:spTree>
     <p:extLst>
       <p:ext uri="{BB962C8B-B14F-4D97-AF65-F5344CB8AC3E}">
-        <p14:creationId xmlns:p14="http://schemas.microsoft.com/office/powerpoint/2010/main" val="1305255653"/>
+        <p14:creationId xmlns:p14="http://schemas.microsoft.com/office/powerpoint/2010/main" val="2557997767"/>
       </p:ext>
     </p:extLst>
   </p:cSld>
@@ -9125,28 +10500,6 @@
 </file>
 
 <file path=customXml/item1.xml><?xml version="1.0" encoding="utf-8"?>
-<p:properties xmlns:p="http://schemas.microsoft.com/office/2006/metadata/properties" xmlns:xsi="http://www.w3.org/2001/XMLSchema-instance" xmlns:pc="http://schemas.microsoft.com/office/infopath/2007/PartnerControls">
-  <documentManagement>
-    <TaxKeywordTaxHTField xmlns="985891ea-cc2b-426e-89e8-b7f21e8d7005">
-      <Terms xmlns="http://schemas.microsoft.com/office/infopath/2007/PartnerControls"/>
-    </TaxKeywordTaxHTField>
-    <Tags_x0020_And_x0020_Notes xmlns="54f95060-3a06-49bc-a45d-760f455d169f" xsi:nil="true"/>
-    <TaxCatchAll xmlns="985891ea-cc2b-426e-89e8-b7f21e8d7005"/>
-    <AverageRating xmlns="http://schemas.microsoft.com/sharepoint/v3" xsi:nil="true"/>
-  </documentManagement>
-</p:properties>
-</file>
-
-<file path=customXml/item2.xml><?xml version="1.0" encoding="utf-8"?>
-<?mso-contentType ?>
-<FormTemplates xmlns="http://schemas.microsoft.com/sharepoint/v3/contenttype/forms">
-  <Display>DocumentLibraryForm</Display>
-  <Edit>DocumentLibraryForm</Edit>
-  <New>DocumentLibraryForm</New>
-</FormTemplates>
-</file>
-
-<file path=customXml/item3.xml><?xml version="1.0" encoding="utf-8"?>
 <ct:contentTypeSchema xmlns:ct="http://schemas.microsoft.com/office/2006/metadata/contentType" xmlns:ma="http://schemas.microsoft.com/office/2006/metadata/properties/metaAttributes" ct:_="" ma:_="" ma:contentTypeName="Document" ma:contentTypeID="0x01010026E16916E631B848A501381DD8EEAED7" ma:contentTypeVersion="6" ma:contentTypeDescription="Create a new document." ma:contentTypeScope="" ma:versionID="7df0c0be0b8d97f49516200f286f52d8">
   <xsd:schema xmlns:xsd="http://www.w3.org/2001/XMLSchema" xmlns:xs="http://www.w3.org/2001/XMLSchema" xmlns:p="http://schemas.microsoft.com/office/2006/metadata/properties" xmlns:ns1="http://schemas.microsoft.com/sharepoint/v3" xmlns:ns2="985891ea-cc2b-426e-89e8-b7f21e8d7005" xmlns:ns3="54f95060-3a06-49bc-a45d-760f455d169f" targetNamespace="http://schemas.microsoft.com/office/2006/metadata/properties" ma:root="true" ma:fieldsID="aeccfae96436f93cdc7abaadb9e42baa" ns1:_="" ns2:_="" ns3:_="">
     <xsd:import namespace="http://schemas.microsoft.com/sharepoint/v3"/>
@@ -9314,33 +10667,29 @@
 </ct:contentTypeSchema>
 </file>
 
-<file path=customXml/itemProps1.xml><?xml version="1.0" encoding="utf-8"?>
-<ds:datastoreItem xmlns:ds="http://schemas.openxmlformats.org/officeDocument/2006/customXml" ds:itemID="{430D1EAC-4B40-4093-B2DA-DF232B1F2BEB}">
-  <ds:schemaRefs>
-    <ds:schemaRef ds:uri="http://schemas.microsoft.com/sharepoint/v3"/>
-    <ds:schemaRef ds:uri="http://schemas.microsoft.com/office/infopath/2007/PartnerControls"/>
-    <ds:schemaRef ds:uri="http://www.w3.org/XML/1998/namespace"/>
-    <ds:schemaRef ds:uri="http://purl.org/dc/terms/"/>
-    <ds:schemaRef ds:uri="http://schemas.microsoft.com/office/2006/metadata/properties"/>
-    <ds:schemaRef ds:uri="54f95060-3a06-49bc-a45d-760f455d169f"/>
-    <ds:schemaRef ds:uri="http://purl.org/dc/dcmitype/"/>
-    <ds:schemaRef ds:uri="http://schemas.microsoft.com/office/2006/documentManagement/types"/>
-    <ds:schemaRef ds:uri="http://schemas.openxmlformats.org/package/2006/metadata/core-properties"/>
-    <ds:schemaRef ds:uri="985891ea-cc2b-426e-89e8-b7f21e8d7005"/>
-    <ds:schemaRef ds:uri="http://purl.org/dc/elements/1.1/"/>
-  </ds:schemaRefs>
-</ds:datastoreItem>
+<file path=customXml/item2.xml><?xml version="1.0" encoding="utf-8"?>
+<?mso-contentType ?>
+<FormTemplates xmlns="http://schemas.microsoft.com/sharepoint/v3/contenttype/forms">
+  <Display>DocumentLibraryForm</Display>
+  <Edit>DocumentLibraryForm</Edit>
+  <New>DocumentLibraryForm</New>
+</FormTemplates>
 </file>
 
-<file path=customXml/itemProps2.xml><?xml version="1.0" encoding="utf-8"?>
-<ds:datastoreItem xmlns:ds="http://schemas.openxmlformats.org/officeDocument/2006/customXml" ds:itemID="{3C889E48-FC40-4A9E-AE65-14B743C28FF7}">
-  <ds:schemaRefs>
-    <ds:schemaRef ds:uri="http://schemas.microsoft.com/sharepoint/v3/contenttype/forms"/>
-  </ds:schemaRefs>
-</ds:datastoreItem>
+<file path=customXml/item3.xml><?xml version="1.0" encoding="utf-8"?>
+<p:properties xmlns:p="http://schemas.microsoft.com/office/2006/metadata/properties" xmlns:xsi="http://www.w3.org/2001/XMLSchema-instance" xmlns:pc="http://schemas.microsoft.com/office/infopath/2007/PartnerControls">
+  <documentManagement>
+    <TaxKeywordTaxHTField xmlns="985891ea-cc2b-426e-89e8-b7f21e8d7005">
+      <Terms xmlns="http://schemas.microsoft.com/office/infopath/2007/PartnerControls"/>
+    </TaxKeywordTaxHTField>
+    <Tags_x0020_And_x0020_Notes xmlns="54f95060-3a06-49bc-a45d-760f455d169f" xsi:nil="true"/>
+    <TaxCatchAll xmlns="985891ea-cc2b-426e-89e8-b7f21e8d7005"/>
+    <AverageRating xmlns="http://schemas.microsoft.com/sharepoint/v3" xsi:nil="true"/>
+  </documentManagement>
+</p:properties>
 </file>
 
-<file path=customXml/itemProps3.xml><?xml version="1.0" encoding="utf-8"?>
+<file path=customXml/itemProps1.xml><?xml version="1.0" encoding="utf-8"?>
 <ds:datastoreItem xmlns:ds="http://schemas.openxmlformats.org/officeDocument/2006/customXml" ds:itemID="{04C21879-72D6-412B-A31C-815B925B0559}">
   <ds:schemaRefs>
     <ds:schemaRef ds:uri="http://schemas.microsoft.com/office/2006/metadata/contentType"/>
@@ -9358,4 +10707,30 @@
     <ds:schemaRef ds:uri="http://schemas.microsoft.com/internal/obd"/>
   </ds:schemaRefs>
 </ds:datastoreItem>
+</file>
+
+<file path=customXml/itemProps2.xml><?xml version="1.0" encoding="utf-8"?>
+<ds:datastoreItem xmlns:ds="http://schemas.openxmlformats.org/officeDocument/2006/customXml" ds:itemID="{3C889E48-FC40-4A9E-AE65-14B743C28FF7}">
+  <ds:schemaRefs>
+    <ds:schemaRef ds:uri="http://schemas.microsoft.com/sharepoint/v3/contenttype/forms"/>
+  </ds:schemaRefs>
+</ds:datastoreItem>
+</file>
+
+<file path=customXml/itemProps3.xml><?xml version="1.0" encoding="utf-8"?>
+<ds:datastoreItem xmlns:ds="http://schemas.openxmlformats.org/officeDocument/2006/customXml" ds:itemID="{430D1EAC-4B40-4093-B2DA-DF232B1F2BEB}">
+  <ds:schemaRefs>
+    <ds:schemaRef ds:uri="http://schemas.microsoft.com/office/2006/metadata/properties"/>
+    <ds:schemaRef ds:uri="http://purl.org/dc/terms/"/>
+    <ds:schemaRef ds:uri="http://schemas.microsoft.com/office/infopath/2007/PartnerControls"/>
+    <ds:schemaRef ds:uri="http://schemas.microsoft.com/office/2006/documentManagement/types"/>
+    <ds:schemaRef ds:uri="http://purl.org/dc/elements/1.1/"/>
+    <ds:schemaRef ds:uri="http://www.w3.org/XML/1998/namespace"/>
+    <ds:schemaRef ds:uri="http://schemas.openxmlformats.org/package/2006/metadata/core-properties"/>
+    <ds:schemaRef ds:uri="54f95060-3a06-49bc-a45d-760f455d169f"/>
+    <ds:schemaRef ds:uri="985891ea-cc2b-426e-89e8-b7f21e8d7005"/>
+    <ds:schemaRef ds:uri="http://schemas.microsoft.com/sharepoint/v3"/>
+    <ds:schemaRef ds:uri="http://purl.org/dc/dcmitype/"/>
+  </ds:schemaRefs>
+</ds:datastoreItem>
 </file>
</xml_diff>

<commit_message>
Upload more file to GIT
</commit_message>
<xml_diff>
--- a/DR/Ver_1_002/ALPstar_TLM_DR_1_002.pptx
+++ b/DR/Ver_1_002/ALPstar_TLM_DR_1_002.pptx
@@ -4193,15 +4193,7 @@
             <a:pPr rtl="0"/>
             <a:r>
               <a:rPr lang="en-US" sz="5400" dirty="0" smtClean="0"/>
-              <a:t>RT </a:t>
-            </a:r>
-            <a:r>
-              <a:rPr lang="en-US" sz="5400" dirty="0" smtClean="0"/>
-              <a:t>Telemetric (TLM) SW </a:t>
-            </a:r>
-            <a:r>
-              <a:rPr lang="en-US" sz="5400" dirty="0" smtClean="0"/>
-              <a:t>DR</a:t>
+              <a:t>RT Telemetric (TLM) SW DR</a:t>
             </a:r>
             <a:br>
               <a:rPr lang="en-US" sz="5400" dirty="0" smtClean="0"/>
@@ -4818,11 +4810,7 @@
             <a:pPr algn="ctr" rtl="0"/>
             <a:r>
               <a:rPr lang="en-US" sz="1400" dirty="0" smtClean="0"/>
-              <a:t>Telemetric SW </a:t>
-            </a:r>
-            <a:r>
-              <a:rPr lang="en-US" sz="1400" dirty="0" smtClean="0"/>
-              <a:t>flow</a:t>
+              <a:t>Telemetric SW flow</a:t>
             </a:r>
             <a:br>
               <a:rPr lang="en-US" sz="1400" dirty="0" smtClean="0"/>
@@ -4932,11 +4920,7 @@
             <a:pPr algn="ctr" rtl="0"/>
             <a:r>
               <a:rPr lang="en-US" sz="1400" dirty="0" smtClean="0"/>
-              <a:t>Telemetric SW </a:t>
-            </a:r>
-            <a:r>
-              <a:rPr lang="en-US" sz="1400" dirty="0" smtClean="0"/>
-              <a:t>flow</a:t>
+              <a:t>Telemetric SW flow</a:t>
             </a:r>
             <a:br>
               <a:rPr lang="en-US" sz="1400" dirty="0" smtClean="0"/>
@@ -5580,10 +5564,6 @@
             <a:r>
               <a:rPr lang="en-US" dirty="0" smtClean="0"/>
               <a:t>RT TLM </a:t>
-            </a:r>
-            <a:r>
-              <a:rPr lang="en-US" dirty="0" smtClean="0"/>
-              <a:t/>
             </a:r>
             <a:br>
               <a:rPr lang="en-US" dirty="0" smtClean="0"/>
@@ -7043,8 +7023,8 @@
           <a:chExt cx="0" cy="0"/>
         </a:xfrm>
       </p:grpSpPr>
-      <mc:AlternateContent xmlns:mc="http://schemas.openxmlformats.org/markup-compatibility/2006">
-        <mc:Choice xmlns:a14="http://schemas.microsoft.com/office/drawing/2010/main" Requires="a14">
+      <mc:AlternateContent xmlns:mc="http://schemas.openxmlformats.org/markup-compatibility/2006" xmlns:a14="http://schemas.microsoft.com/office/drawing/2010/main">
+        <mc:Choice Requires="a14">
           <p:sp>
             <p:nvSpPr>
               <p:cNvPr id="6" name="Content Placeholder 5"/>
@@ -7077,11 +7057,7 @@
                 <a:pPr lvl="1"/>
                 <a:r>
                   <a:rPr lang="en-US" sz="1100" dirty="0" smtClean="0"/>
-                  <a:t>Write to </a:t>
-                </a:r>
-                <a:r>
-                  <a:rPr lang="en-US" sz="1100" dirty="0" smtClean="0"/>
-                  <a:t>Flash: </a:t>
+                  <a:t>Write to Flash: </a:t>
                 </a:r>
               </a:p>
               <a:p>
@@ -7598,21 +7574,8 @@
                 <a:pPr lvl="1"/>
                 <a:r>
                   <a:rPr lang="en-US" sz="1100" dirty="0" smtClean="0"/>
-                  <a:t>Read from Flash: </a:t>
+                  <a:t>Read from Flash: The RT viewer will be able to read and present data from Flash at any given time and if the user checked the option to read data from Flash at the RT viewer interface.</a:t>
                 </a:r>
-                <a:r>
-                  <a:rPr lang="en-US" sz="1100" dirty="0" smtClean="0"/>
-                  <a:t>The </a:t>
-                </a:r>
-                <a:r>
-                  <a:rPr lang="en-US" sz="1100" dirty="0" smtClean="0"/>
-                  <a:t>RT viewer will be able to read and present data from Flash at any given time and if the user checked the option to read data from </a:t>
-                </a:r>
-                <a:r>
-                  <a:rPr lang="en-US" sz="1100" dirty="0" smtClean="0"/>
-                  <a:t>Flash at the RT viewer interface.</a:t>
-                </a:r>
-                <a:endParaRPr lang="en-US" sz="1100" dirty="0" smtClean="0"/>
               </a:p>
               <a:p>
                 <a:pPr lvl="1"/>
@@ -7634,11 +7597,7 @@
                 </a:r>
                 <a:r>
                   <a:rPr lang="en-US" sz="1100" dirty="0" smtClean="0"/>
-                  <a:t>be protected in thread safe (this protection will be a </a:t>
-                </a:r>
-                <a:r>
-                  <a:rPr lang="en-US" sz="1100" dirty="0" smtClean="0"/>
-                  <a:t>handle by HBS SW layer).</a:t>
+                  <a:t>be protected in thread safe (this protection will be a handle by HBS SW layer).</a:t>
                 </a:r>
               </a:p>
               <a:p>
@@ -7667,7 +7626,6 @@
                   <a:rPr lang="en-US" sz="1100" dirty="0" smtClean="0"/>
                   <a:t> </a:t>
                 </a:r>
-                <a:endParaRPr lang="en-US" sz="1100" dirty="0" smtClean="0"/>
               </a:p>
               <a:p>
                 <a:pPr marL="0" indent="0">
@@ -7683,12 +7641,11 @@
                   <a:rPr lang="en-US" dirty="0" smtClean="0"/>
                   <a:t>  </a:t>
                 </a:r>
-                <a:endParaRPr lang="en-US" dirty="0" smtClean="0"/>
               </a:p>
             </p:txBody>
           </p:sp>
         </mc:Choice>
-        <mc:Fallback>
+        <mc:Fallback xmlns="">
           <p:sp>
             <p:nvSpPr>
               <p:cNvPr id="6" name="Content Placeholder 5"/>
@@ -7745,10 +7702,6 @@
             <a:r>
               <a:rPr lang="en-US" dirty="0" smtClean="0"/>
               <a:t>RT TLM </a:t>
-            </a:r>
-            <a:r>
-              <a:rPr lang="en-US" dirty="0" smtClean="0"/>
-              <a:t/>
             </a:r>
             <a:br>
               <a:rPr lang="en-US" dirty="0" smtClean="0"/>
@@ -8036,7 +7989,6 @@
               <a:rPr lang="en-US" kern="0" dirty="0" smtClean="0"/>
               <a:t>  </a:t>
             </a:r>
-            <a:endParaRPr lang="en-US" kern="0" dirty="0" smtClean="0"/>
           </a:p>
         </p:txBody>
       </p:sp>
@@ -8137,10 +8089,6 @@
               <a:rPr lang="en-US" dirty="0" smtClean="0"/>
               <a:t>RT TLM </a:t>
             </a:r>
-            <a:r>
-              <a:rPr lang="en-US" dirty="0" smtClean="0"/>
-              <a:t/>
-            </a:r>
             <a:br>
               <a:rPr lang="en-US" dirty="0" smtClean="0"/>
             </a:br>
@@ -8362,10 +8310,6 @@
               <a:rPr lang="en-US" dirty="0" smtClean="0"/>
               <a:t>RT TLM </a:t>
             </a:r>
-            <a:r>
-              <a:rPr lang="en-US" dirty="0" smtClean="0"/>
-              <a:t/>
-            </a:r>
             <a:br>
               <a:rPr lang="en-US" dirty="0" smtClean="0"/>
             </a:br>
@@ -8379,7 +8323,7 @@
       </p:sp>
       <p:pic>
         <p:nvPicPr>
-          <p:cNvPr id="5122" name="Picture 2"/>
+          <p:cNvPr id="1027" name="Picture 3"/>
           <p:cNvPicPr>
             <a:picLocks noChangeAspect="1" noChangeArrowheads="1"/>
           </p:cNvPicPr>
@@ -8400,8 +8344,8 @@
         </p:blipFill>
         <p:spPr bwMode="auto">
           <a:xfrm>
-            <a:off x="341191" y="1009934"/>
-            <a:ext cx="8731439" cy="4954068"/>
+            <a:off x="447675" y="936223"/>
+            <a:ext cx="8248650" cy="5476875"/>
           </a:xfrm>
           <a:prstGeom prst="rect">
             <a:avLst/>
@@ -8488,10 +8432,6 @@
             <a:r>
               <a:rPr lang="en-US" dirty="0" smtClean="0"/>
               <a:t>RT TLM </a:t>
-            </a:r>
-            <a:r>
-              <a:rPr lang="en-US" dirty="0" smtClean="0"/>
-              <a:t/>
             </a:r>
             <a:br>
               <a:rPr lang="en-US" dirty="0" smtClean="0"/>
@@ -8622,11 +8562,7 @@
             </a:r>
             <a:r>
               <a:rPr lang="en-US" sz="1400" dirty="0" smtClean="0"/>
-              <a:t>Each telemetric plan will be in an ICD file format (.grep file</a:t>
-            </a:r>
-            <a:r>
-              <a:rPr lang="en-US" sz="1400" dirty="0" smtClean="0"/>
-              <a:t>).</a:t>
+              <a:t>Each telemetric plan will be in an ICD file format (.grep file).</a:t>
             </a:r>
           </a:p>
           <a:p>
@@ -10500,6 +10436,28 @@
 </file>
 
 <file path=customXml/item1.xml><?xml version="1.0" encoding="utf-8"?>
+<p:properties xmlns:p="http://schemas.microsoft.com/office/2006/metadata/properties" xmlns:xsi="http://www.w3.org/2001/XMLSchema-instance" xmlns:pc="http://schemas.microsoft.com/office/infopath/2007/PartnerControls">
+  <documentManagement>
+    <TaxKeywordTaxHTField xmlns="985891ea-cc2b-426e-89e8-b7f21e8d7005">
+      <Terms xmlns="http://schemas.microsoft.com/office/infopath/2007/PartnerControls"/>
+    </TaxKeywordTaxHTField>
+    <Tags_x0020_And_x0020_Notes xmlns="54f95060-3a06-49bc-a45d-760f455d169f" xsi:nil="true"/>
+    <TaxCatchAll xmlns="985891ea-cc2b-426e-89e8-b7f21e8d7005"/>
+    <AverageRating xmlns="http://schemas.microsoft.com/sharepoint/v3" xsi:nil="true"/>
+  </documentManagement>
+</p:properties>
+</file>
+
+<file path=customXml/item2.xml><?xml version="1.0" encoding="utf-8"?>
+<?mso-contentType ?>
+<FormTemplates xmlns="http://schemas.microsoft.com/sharepoint/v3/contenttype/forms">
+  <Display>DocumentLibraryForm</Display>
+  <Edit>DocumentLibraryForm</Edit>
+  <New>DocumentLibraryForm</New>
+</FormTemplates>
+</file>
+
+<file path=customXml/item3.xml><?xml version="1.0" encoding="utf-8"?>
 <ct:contentTypeSchema xmlns:ct="http://schemas.microsoft.com/office/2006/metadata/contentType" xmlns:ma="http://schemas.microsoft.com/office/2006/metadata/properties/metaAttributes" ct:_="" ma:_="" ma:contentTypeName="Document" ma:contentTypeID="0x01010026E16916E631B848A501381DD8EEAED7" ma:contentTypeVersion="6" ma:contentTypeDescription="Create a new document." ma:contentTypeScope="" ma:versionID="7df0c0be0b8d97f49516200f286f52d8">
   <xsd:schema xmlns:xsd="http://www.w3.org/2001/XMLSchema" xmlns:xs="http://www.w3.org/2001/XMLSchema" xmlns:p="http://schemas.microsoft.com/office/2006/metadata/properties" xmlns:ns1="http://schemas.microsoft.com/sharepoint/v3" xmlns:ns2="985891ea-cc2b-426e-89e8-b7f21e8d7005" xmlns:ns3="54f95060-3a06-49bc-a45d-760f455d169f" targetNamespace="http://schemas.microsoft.com/office/2006/metadata/properties" ma:root="true" ma:fieldsID="aeccfae96436f93cdc7abaadb9e42baa" ns1:_="" ns2:_="" ns3:_="">
     <xsd:import namespace="http://schemas.microsoft.com/sharepoint/v3"/>
@@ -10667,29 +10625,33 @@
 </ct:contentTypeSchema>
 </file>
 
-<file path=customXml/item2.xml><?xml version="1.0" encoding="utf-8"?>
-<?mso-contentType ?>
-<FormTemplates xmlns="http://schemas.microsoft.com/sharepoint/v3/contenttype/forms">
-  <Display>DocumentLibraryForm</Display>
-  <Edit>DocumentLibraryForm</Edit>
-  <New>DocumentLibraryForm</New>
-</FormTemplates>
+<file path=customXml/itemProps1.xml><?xml version="1.0" encoding="utf-8"?>
+<ds:datastoreItem xmlns:ds="http://schemas.openxmlformats.org/officeDocument/2006/customXml" ds:itemID="{430D1EAC-4B40-4093-B2DA-DF232B1F2BEB}">
+  <ds:schemaRefs>
+    <ds:schemaRef ds:uri="54f95060-3a06-49bc-a45d-760f455d169f"/>
+    <ds:schemaRef ds:uri="http://schemas.openxmlformats.org/package/2006/metadata/core-properties"/>
+    <ds:schemaRef ds:uri="http://purl.org/dc/elements/1.1/"/>
+    <ds:schemaRef ds:uri="http://schemas.microsoft.com/office/2006/metadata/properties"/>
+    <ds:schemaRef ds:uri="http://schemas.microsoft.com/office/2006/documentManagement/types"/>
+    <ds:schemaRef ds:uri="http://schemas.microsoft.com/sharepoint/v3"/>
+    <ds:schemaRef ds:uri="http://schemas.microsoft.com/office/infopath/2007/PartnerControls"/>
+    <ds:schemaRef ds:uri="http://purl.org/dc/dcmitype/"/>
+    <ds:schemaRef ds:uri="985891ea-cc2b-426e-89e8-b7f21e8d7005"/>
+    <ds:schemaRef ds:uri="http://www.w3.org/XML/1998/namespace"/>
+    <ds:schemaRef ds:uri="http://purl.org/dc/terms/"/>
+  </ds:schemaRefs>
+</ds:datastoreItem>
 </file>
 
-<file path=customXml/item3.xml><?xml version="1.0" encoding="utf-8"?>
-<p:properties xmlns:p="http://schemas.microsoft.com/office/2006/metadata/properties" xmlns:xsi="http://www.w3.org/2001/XMLSchema-instance" xmlns:pc="http://schemas.microsoft.com/office/infopath/2007/PartnerControls">
-  <documentManagement>
-    <TaxKeywordTaxHTField xmlns="985891ea-cc2b-426e-89e8-b7f21e8d7005">
-      <Terms xmlns="http://schemas.microsoft.com/office/infopath/2007/PartnerControls"/>
-    </TaxKeywordTaxHTField>
-    <Tags_x0020_And_x0020_Notes xmlns="54f95060-3a06-49bc-a45d-760f455d169f" xsi:nil="true"/>
-    <TaxCatchAll xmlns="985891ea-cc2b-426e-89e8-b7f21e8d7005"/>
-    <AverageRating xmlns="http://schemas.microsoft.com/sharepoint/v3" xsi:nil="true"/>
-  </documentManagement>
-</p:properties>
+<file path=customXml/itemProps2.xml><?xml version="1.0" encoding="utf-8"?>
+<ds:datastoreItem xmlns:ds="http://schemas.openxmlformats.org/officeDocument/2006/customXml" ds:itemID="{3C889E48-FC40-4A9E-AE65-14B743C28FF7}">
+  <ds:schemaRefs>
+    <ds:schemaRef ds:uri="http://schemas.microsoft.com/sharepoint/v3/contenttype/forms"/>
+  </ds:schemaRefs>
+</ds:datastoreItem>
 </file>
 
-<file path=customXml/itemProps1.xml><?xml version="1.0" encoding="utf-8"?>
+<file path=customXml/itemProps3.xml><?xml version="1.0" encoding="utf-8"?>
 <ds:datastoreItem xmlns:ds="http://schemas.openxmlformats.org/officeDocument/2006/customXml" ds:itemID="{04C21879-72D6-412B-A31C-815B925B0559}">
   <ds:schemaRefs>
     <ds:schemaRef ds:uri="http://schemas.microsoft.com/office/2006/metadata/contentType"/>
@@ -10707,30 +10669,4 @@
     <ds:schemaRef ds:uri="http://schemas.microsoft.com/internal/obd"/>
   </ds:schemaRefs>
 </ds:datastoreItem>
-</file>
-
-<file path=customXml/itemProps2.xml><?xml version="1.0" encoding="utf-8"?>
-<ds:datastoreItem xmlns:ds="http://schemas.openxmlformats.org/officeDocument/2006/customXml" ds:itemID="{3C889E48-FC40-4A9E-AE65-14B743C28FF7}">
-  <ds:schemaRefs>
-    <ds:schemaRef ds:uri="http://schemas.microsoft.com/sharepoint/v3/contenttype/forms"/>
-  </ds:schemaRefs>
-</ds:datastoreItem>
-</file>
-
-<file path=customXml/itemProps3.xml><?xml version="1.0" encoding="utf-8"?>
-<ds:datastoreItem xmlns:ds="http://schemas.openxmlformats.org/officeDocument/2006/customXml" ds:itemID="{430D1EAC-4B40-4093-B2DA-DF232B1F2BEB}">
-  <ds:schemaRefs>
-    <ds:schemaRef ds:uri="http://schemas.microsoft.com/office/2006/metadata/properties"/>
-    <ds:schemaRef ds:uri="http://purl.org/dc/terms/"/>
-    <ds:schemaRef ds:uri="http://schemas.microsoft.com/office/infopath/2007/PartnerControls"/>
-    <ds:schemaRef ds:uri="http://schemas.microsoft.com/office/2006/documentManagement/types"/>
-    <ds:schemaRef ds:uri="http://purl.org/dc/elements/1.1/"/>
-    <ds:schemaRef ds:uri="http://www.w3.org/XML/1998/namespace"/>
-    <ds:schemaRef ds:uri="http://schemas.openxmlformats.org/package/2006/metadata/core-properties"/>
-    <ds:schemaRef ds:uri="54f95060-3a06-49bc-a45d-760f455d169f"/>
-    <ds:schemaRef ds:uri="985891ea-cc2b-426e-89e8-b7f21e8d7005"/>
-    <ds:schemaRef ds:uri="http://schemas.microsoft.com/sharepoint/v3"/>
-    <ds:schemaRef ds:uri="http://purl.org/dc/dcmitype/"/>
-  </ds:schemaRefs>
-</ds:datastoreItem>
 </file>
</xml_diff>

<commit_message>
Commit fixes: A. Improve DR - need to acomplish figures.
</commit_message>
<xml_diff>
--- a/DR/Ver_1_002/ALPstar_TLM_DR_1_002.pptx
+++ b/DR/Ver_1_002/ALPstar_TLM_DR_1_002.pptx
@@ -5,25 +5,28 @@
     <p:sldMasterId id="2147483660" r:id="rId4"/>
   </p:sldMasterIdLst>
   <p:notesMasterIdLst>
-    <p:notesMasterId r:id="rId18"/>
+    <p:notesMasterId r:id="rId21"/>
   </p:notesMasterIdLst>
   <p:handoutMasterIdLst>
-    <p:handoutMasterId r:id="rId19"/>
+    <p:handoutMasterId r:id="rId22"/>
   </p:handoutMasterIdLst>
   <p:sldIdLst>
     <p:sldId id="340" r:id="rId5"/>
     <p:sldId id="344" r:id="rId6"/>
     <p:sldId id="359" r:id="rId7"/>
     <p:sldId id="362" r:id="rId8"/>
-    <p:sldId id="363" r:id="rId9"/>
-    <p:sldId id="365" r:id="rId10"/>
-    <p:sldId id="366" r:id="rId11"/>
-    <p:sldId id="361" r:id="rId12"/>
-    <p:sldId id="357" r:id="rId13"/>
-    <p:sldId id="358" r:id="rId14"/>
-    <p:sldId id="356" r:id="rId15"/>
-    <p:sldId id="364" r:id="rId16"/>
-    <p:sldId id="353" r:id="rId17"/>
+    <p:sldId id="367" r:id="rId9"/>
+    <p:sldId id="369" r:id="rId10"/>
+    <p:sldId id="368" r:id="rId11"/>
+    <p:sldId id="363" r:id="rId12"/>
+    <p:sldId id="365" r:id="rId13"/>
+    <p:sldId id="366" r:id="rId14"/>
+    <p:sldId id="361" r:id="rId15"/>
+    <p:sldId id="357" r:id="rId16"/>
+    <p:sldId id="358" r:id="rId17"/>
+    <p:sldId id="356" r:id="rId18"/>
+    <p:sldId id="364" r:id="rId19"/>
+    <p:sldId id="353" r:id="rId20"/>
   </p:sldIdLst>
   <p:sldSz cx="9144000" cy="6858000" type="screen4x3"/>
   <p:notesSz cx="6858000" cy="9296400"/>
@@ -148,6 +151,9 @@
             <p14:sldId id="344"/>
             <p14:sldId id="359"/>
             <p14:sldId id="362"/>
+            <p14:sldId id="367"/>
+            <p14:sldId id="369"/>
+            <p14:sldId id="368"/>
             <p14:sldId id="363"/>
             <p14:sldId id="365"/>
             <p14:sldId id="366"/>
@@ -160,6 +166,34 @@
           </p14:sldIdLst>
         </p14:section>
       </p14:sectionLst>
+    </p:ext>
+    <p:ext uri="{EFAFB233-063F-42B5-8137-9DF3F51BA10A}">
+      <p15:sldGuideLst xmlns:p15="http://schemas.microsoft.com/office/powerpoint/2012/main">
+        <p15:guide id="1" orient="horz" pos="2160">
+          <p15:clr>
+            <a:srgbClr val="A4A3A4"/>
+          </p15:clr>
+        </p15:guide>
+        <p15:guide id="2" pos="2880">
+          <p15:clr>
+            <a:srgbClr val="A4A3A4"/>
+          </p15:clr>
+        </p15:guide>
+      </p15:sldGuideLst>
+    </p:ext>
+    <p:ext uri="{2D200454-40CA-4A62-9FC3-DE9A4176ACB9}">
+      <p15:notesGuideLst xmlns:p15="http://schemas.microsoft.com/office/powerpoint/2012/main">
+        <p15:guide id="1" orient="horz" pos="2928">
+          <p15:clr>
+            <a:srgbClr val="A4A3A4"/>
+          </p15:clr>
+        </p15:guide>
+        <p15:guide id="2" pos="2160">
+          <p15:clr>
+            <a:srgbClr val="A4A3A4"/>
+          </p15:clr>
+        </p15:guide>
+      </p15:notesGuideLst>
     </p:ext>
   </p:extLst>
 </p:presentation>
@@ -247,7 +281,7 @@
           <a:p>
             <a:fld id="{3094E33D-6E1D-4268-A0C7-E7AE08740D1A}" type="datetimeFigureOut">
               <a:rPr lang="en-US" smtClean="0"/>
-              <a:t>10/28/2018</a:t>
+              <a:t>11/10/2018</a:t>
             </a:fld>
             <a:endParaRPr lang="en-US"/>
           </a:p>
@@ -413,7 +447,7 @@
             <a:fld id="{95651016-69E9-464F-AF89-5684AEF24FEC}" type="datetimeFigureOut">
               <a:rPr lang="he-IL" smtClean="0"/>
               <a:pPr/>
-              <a:t>י"ט/חשון/תשע"ט</a:t>
+              <a:t>ב'/כסלו/תשע"ט</a:t>
             </a:fld>
             <a:endParaRPr lang="he-IL"/>
           </a:p>
@@ -479,35 +513,35 @@
           <a:p>
             <a:pPr lvl="0"/>
             <a:r>
-              <a:rPr lang="en-US" smtClean="0"/>
+              <a:rPr lang="en-US"/>
               <a:t>Click to edit Master text styles</a:t>
             </a:r>
           </a:p>
           <a:p>
             <a:pPr lvl="1"/>
             <a:r>
-              <a:rPr lang="en-US" smtClean="0"/>
+              <a:rPr lang="en-US"/>
               <a:t>Second level</a:t>
             </a:r>
           </a:p>
           <a:p>
             <a:pPr lvl="2"/>
             <a:r>
-              <a:rPr lang="en-US" smtClean="0"/>
+              <a:rPr lang="en-US"/>
               <a:t>Third level</a:t>
             </a:r>
           </a:p>
           <a:p>
             <a:pPr lvl="3"/>
             <a:r>
-              <a:rPr lang="en-US" smtClean="0"/>
+              <a:rPr lang="en-US"/>
               <a:t>Fourth level</a:t>
             </a:r>
           </a:p>
           <a:p>
             <a:pPr lvl="4"/>
             <a:r>
-              <a:rPr lang="en-US" smtClean="0"/>
+              <a:rPr lang="en-US"/>
               <a:t>Fifth level</a:t>
             </a:r>
             <a:endParaRPr lang="he-IL"/>
@@ -969,7 +1003,7 @@
           </a:lstStyle>
           <a:p>
             <a:r>
-              <a:rPr lang="en-US" dirty="0" smtClean="0"/>
+              <a:rPr lang="en-US" dirty="0"/>
               <a:t>Click to edit Master title style</a:t>
             </a:r>
             <a:endParaRPr lang="he-IL" dirty="0"/>
@@ -1037,7 +1071,7 @@
           </a:lstStyle>
           <a:p>
             <a:r>
-              <a:rPr lang="en-US" dirty="0" smtClean="0"/>
+              <a:rPr lang="en-US" dirty="0"/>
               <a:t>Click to edit Master subtitle style</a:t>
             </a:r>
             <a:endParaRPr lang="he-IL" dirty="0"/>
@@ -1139,13 +1173,6 @@
     <a:masterClrMapping/>
   </p:clrMapOvr>
   <p:transition/>
-  <p:timing>
-    <p:tnLst>
-      <p:par>
-        <p:cTn id="1" dur="indefinite" restart="never" nodeType="tmRoot"/>
-      </p:par>
-    </p:tnLst>
-  </p:timing>
 </p:sldLayout>
 </file>
 
@@ -1182,7 +1209,7 @@
           <a:lstStyle/>
           <a:p>
             <a:r>
-              <a:rPr lang="en-US" dirty="0" smtClean="0"/>
+              <a:rPr lang="en-US" dirty="0"/>
               <a:t>Click to edit Master title style</a:t>
             </a:r>
             <a:endParaRPr lang="he-IL" dirty="0"/>
@@ -1211,35 +1238,35 @@
           <a:p>
             <a:pPr lvl="0"/>
             <a:r>
-              <a:rPr lang="en-US" smtClean="0"/>
+              <a:rPr lang="en-US"/>
               <a:t>Click to edit Master text styles</a:t>
             </a:r>
           </a:p>
           <a:p>
             <a:pPr lvl="1"/>
             <a:r>
-              <a:rPr lang="en-US" smtClean="0"/>
+              <a:rPr lang="en-US"/>
               <a:t>Second level</a:t>
             </a:r>
           </a:p>
           <a:p>
             <a:pPr lvl="2"/>
             <a:r>
-              <a:rPr lang="en-US" smtClean="0"/>
+              <a:rPr lang="en-US"/>
               <a:t>Third level</a:t>
             </a:r>
           </a:p>
           <a:p>
             <a:pPr lvl="3"/>
             <a:r>
-              <a:rPr lang="en-US" smtClean="0"/>
+              <a:rPr lang="en-US"/>
               <a:t>Fourth level</a:t>
             </a:r>
           </a:p>
           <a:p>
             <a:pPr lvl="4"/>
             <a:r>
-              <a:rPr lang="en-US" smtClean="0"/>
+              <a:rPr lang="en-US"/>
               <a:t>Fifth level</a:t>
             </a:r>
             <a:endParaRPr lang="he-IL"/>
@@ -1323,13 +1350,6 @@
     <a:masterClrMapping/>
   </p:clrMapOvr>
   <p:transition/>
-  <p:timing>
-    <p:tnLst>
-      <p:par>
-        <p:cTn id="1" dur="indefinite" restart="never" nodeType="tmRoot"/>
-      </p:par>
-    </p:tnLst>
-  </p:timing>
 </p:sldLayout>
 </file>
 
@@ -1372,35 +1392,35 @@
           <a:p>
             <a:pPr lvl="0"/>
             <a:r>
-              <a:rPr lang="en-US" smtClean="0"/>
+              <a:rPr lang="en-US"/>
               <a:t>Click to edit Master text styles</a:t>
             </a:r>
           </a:p>
           <a:p>
             <a:pPr lvl="1"/>
             <a:r>
-              <a:rPr lang="en-US" smtClean="0"/>
+              <a:rPr lang="en-US"/>
               <a:t>Second level</a:t>
             </a:r>
           </a:p>
           <a:p>
             <a:pPr lvl="2"/>
             <a:r>
-              <a:rPr lang="en-US" smtClean="0"/>
+              <a:rPr lang="en-US"/>
               <a:t>Third level</a:t>
             </a:r>
           </a:p>
           <a:p>
             <a:pPr lvl="3"/>
             <a:r>
-              <a:rPr lang="en-US" smtClean="0"/>
+              <a:rPr lang="en-US"/>
               <a:t>Fourth level</a:t>
             </a:r>
           </a:p>
           <a:p>
             <a:pPr lvl="4"/>
             <a:r>
-              <a:rPr lang="en-US" smtClean="0"/>
+              <a:rPr lang="en-US"/>
               <a:t>Fifth level</a:t>
             </a:r>
             <a:endParaRPr lang="he-IL"/>
@@ -1719,10 +1739,9 @@
           <a:lstStyle/>
           <a:p>
             <a:r>
-              <a:rPr lang="en-US" dirty="0" smtClean="0"/>
+              <a:rPr lang="en-US" dirty="0"/>
               <a:t>Click to edit Master title style</a:t>
             </a:r>
-            <a:endParaRPr lang="en-US" dirty="0"/>
           </a:p>
         </p:txBody>
       </p:sp>
@@ -1737,13 +1756,6 @@
     <a:masterClrMapping/>
   </p:clrMapOvr>
   <p:transition/>
-  <p:timing>
-    <p:tnLst>
-      <p:par>
-        <p:cTn id="1" dur="indefinite" restart="never" nodeType="tmRoot"/>
-      </p:par>
-    </p:tnLst>
-  </p:timing>
 </p:sldLayout>
 </file>
 
@@ -1780,7 +1792,7 @@
           <a:lstStyle/>
           <a:p>
             <a:r>
-              <a:rPr lang="en-US" smtClean="0"/>
+              <a:rPr lang="en-US"/>
               <a:t>Click to edit Master title style</a:t>
             </a:r>
             <a:endParaRPr lang="he-IL"/>
@@ -2346,10 +2358,9 @@
           <a:lstStyle/>
           <a:p>
             <a:r>
-              <a:rPr lang="en-US" dirty="0" smtClean="0"/>
+              <a:rPr lang="en-US" dirty="0"/>
               <a:t>Click to edit Master title style</a:t>
             </a:r>
-            <a:endParaRPr lang="en-US" dirty="0"/>
           </a:p>
         </p:txBody>
       </p:sp>
@@ -2796,10 +2807,9 @@
           </a:lstStyle>
           <a:p>
             <a:r>
-              <a:rPr lang="en-US" dirty="0" smtClean="0"/>
+              <a:rPr lang="en-US" dirty="0"/>
               <a:t>Click to edit Master title style</a:t>
             </a:r>
-            <a:endParaRPr lang="en-US" dirty="0"/>
           </a:p>
         </p:txBody>
       </p:sp>
@@ -2993,10 +3003,10 @@
           <a:p>
             <a:pPr lvl="0"/>
             <a:r>
-              <a:rPr lang="en-US" altLang="he-IL" dirty="0" smtClean="0"/>
+              <a:rPr lang="en-US" altLang="he-IL" dirty="0"/>
               <a:t>Company presentation</a:t>
             </a:r>
-            <a:endParaRPr lang="en-US" dirty="0" smtClean="0"/>
+            <a:endParaRPr lang="en-US" dirty="0"/>
           </a:p>
         </p:txBody>
       </p:sp>
@@ -3036,41 +3046,41 @@
           <a:p>
             <a:pPr lvl="0"/>
             <a:r>
-              <a:rPr lang="en-US" altLang="he-IL" dirty="0" smtClean="0"/>
+              <a:rPr lang="en-US" altLang="he-IL" dirty="0"/>
               <a:t> Click to edit Master text styles</a:t>
             </a:r>
           </a:p>
           <a:p>
             <a:pPr lvl="1"/>
             <a:r>
-              <a:rPr lang="en-US" altLang="he-IL" dirty="0" smtClean="0"/>
+              <a:rPr lang="en-US" altLang="he-IL" dirty="0"/>
               <a:t>Second level</a:t>
             </a:r>
           </a:p>
           <a:p>
             <a:pPr lvl="2"/>
             <a:r>
-              <a:rPr lang="en-US" altLang="he-IL" dirty="0" smtClean="0"/>
+              <a:rPr lang="en-US" altLang="he-IL" dirty="0"/>
               <a:t>Third level</a:t>
             </a:r>
           </a:p>
           <a:p>
             <a:pPr lvl="3"/>
             <a:r>
-              <a:rPr lang="en-US" altLang="he-IL" dirty="0" smtClean="0"/>
+              <a:rPr lang="en-US" altLang="he-IL" dirty="0"/>
               <a:t>Fourth level</a:t>
             </a:r>
           </a:p>
           <a:p>
             <a:pPr lvl="4"/>
             <a:r>
-              <a:rPr lang="en-US" altLang="he-IL" dirty="0" smtClean="0"/>
+              <a:rPr lang="en-US" altLang="he-IL" dirty="0"/>
               <a:t>Fifth level</a:t>
             </a:r>
           </a:p>
           <a:p>
             <a:pPr lvl="4"/>
-            <a:endParaRPr lang="en-US" dirty="0" smtClean="0"/>
+            <a:endParaRPr lang="en-US" dirty="0"/>
           </a:p>
         </p:txBody>
       </p:sp>
@@ -3232,23 +3242,7 @@
                   <a:srgbClr val="FFFFFF"/>
                 </a:solidFill>
               </a:rPr>
-              <a:t>© </a:t>
-            </a:r>
-            <a:r>
-              <a:rPr lang="en-US" sz="800" b="1" dirty="0" smtClean="0">
-                <a:solidFill>
-                  <a:srgbClr val="FFFFFF"/>
-                </a:solidFill>
-              </a:rPr>
-              <a:t>2011 </a:t>
-            </a:r>
-            <a:r>
-              <a:rPr lang="en-US" sz="800" b="1" dirty="0">
-                <a:solidFill>
-                  <a:srgbClr val="FFFFFF"/>
-                </a:solidFill>
-              </a:rPr>
-              <a:t>by Elbit Systems | Elbit Systems Proprietary</a:t>
+              <a:t>© 2011 by Elbit Systems | Elbit Systems Proprietary</a:t>
             </a:r>
           </a:p>
         </p:txBody>
@@ -3368,29 +3362,7 @@
                     </a:srgbClr>
                   </a:solidFill>
                 </a:rPr>
-                <a:t>© </a:t>
-              </a:r>
-              <a:r>
-                <a:rPr lang="en-US" sz="800" b="1" dirty="0" smtClean="0">
-                  <a:solidFill>
-                    <a:srgbClr val="000000">
-                      <a:lumMod val="50000"/>
-                      <a:lumOff val="50000"/>
-                    </a:srgbClr>
-                  </a:solidFill>
-                </a:rPr>
-                <a:t>2015 </a:t>
-              </a:r>
-              <a:r>
-                <a:rPr lang="en-US" sz="800" b="1" dirty="0">
-                  <a:solidFill>
-                    <a:srgbClr val="000000">
-                      <a:lumMod val="50000"/>
-                      <a:lumOff val="50000"/>
-                    </a:srgbClr>
-                  </a:solidFill>
-                </a:rPr>
-                <a:t>by Elbit Systems | Elbit Systems Proprietary</a:t>
+                <a:t>© 2015 by Elbit Systems | Elbit Systems Proprietary</a:t>
               </a:r>
             </a:p>
           </p:txBody>
@@ -3754,13 +3726,6 @@
     <p:sldLayoutId id="2147483669" r:id="rId7"/>
   </p:sldLayoutIdLst>
   <p:transition/>
-  <p:timing>
-    <p:tnLst>
-      <p:par>
-        <p:cTn id="1" dur="indefinite" restart="never" nodeType="tmRoot"/>
-      </p:par>
-    </p:tnLst>
-  </p:timing>
   <p:txStyles>
     <p:titleStyle>
       <a:lvl1pPr algn="l" rtl="1" eaLnBrk="0" fontAlgn="base" hangingPunct="0">
@@ -4192,21 +4157,20 @@
           <a:p>
             <a:pPr rtl="0"/>
             <a:r>
-              <a:rPr lang="en-US" sz="5400" dirty="0" smtClean="0"/>
+              <a:rPr lang="en-US" sz="5400" dirty="0"/>
               <a:t>RT Telemetric (TLM) SW DR</a:t>
             </a:r>
             <a:br>
-              <a:rPr lang="en-US" sz="5400" dirty="0" smtClean="0"/>
+              <a:rPr lang="en-US" sz="5400" dirty="0"/>
             </a:br>
             <a:r>
-              <a:rPr lang="en-US" sz="5400" dirty="0" err="1" smtClean="0"/>
+              <a:rPr lang="en-US" sz="5400" dirty="0" err="1"/>
               <a:t>DR</a:t>
             </a:r>
             <a:r>
-              <a:rPr lang="en-US" sz="5400" dirty="0" smtClean="0"/>
+              <a:rPr lang="en-US" sz="5400" dirty="0"/>
               <a:t>: 1.02</a:t>
             </a:r>
-            <a:endParaRPr lang="en-US" sz="5400" dirty="0"/>
           </a:p>
         </p:txBody>
       </p:sp>
@@ -4226,10 +4190,9 @@
           <a:lstStyle/>
           <a:p>
             <a:r>
-              <a:rPr lang="en-US" dirty="0" smtClean="0"/>
+              <a:rPr lang="en-US" dirty="0"/>
               <a:t>26.08.18 </a:t>
             </a:r>
-            <a:endParaRPr lang="en-US" dirty="0"/>
           </a:p>
         </p:txBody>
       </p:sp>
@@ -4244,17 +4207,239 @@
     <a:masterClrMapping/>
   </p:clrMapOvr>
   <p:transition/>
-  <p:timing>
-    <p:tnLst>
-      <p:par>
-        <p:cTn id="1" dur="indefinite" restart="never" nodeType="tmRoot"/>
-      </p:par>
-    </p:tnLst>
-  </p:timing>
 </p:sld>
 </file>
 
 <file path=ppt/slides/slide10.xml><?xml version="1.0" encoding="utf-8"?>
+<p:sld xmlns:a="http://schemas.openxmlformats.org/drawingml/2006/main" xmlns:r="http://schemas.openxmlformats.org/officeDocument/2006/relationships" xmlns:p="http://schemas.openxmlformats.org/presentationml/2006/main">
+  <p:cSld>
+    <p:spTree>
+      <p:nvGrpSpPr>
+        <p:cNvPr id="1" name=""/>
+        <p:cNvGrpSpPr/>
+        <p:nvPr/>
+      </p:nvGrpSpPr>
+      <p:grpSpPr>
+        <a:xfrm>
+          <a:off x="0" y="0"/>
+          <a:ext cx="0" cy="0"/>
+          <a:chOff x="0" y="0"/>
+          <a:chExt cx="0" cy="0"/>
+        </a:xfrm>
+      </p:grpSpPr>
+      <p:sp>
+        <p:nvSpPr>
+          <p:cNvPr id="5" name="Title 4"/>
+          <p:cNvSpPr>
+            <a:spLocks noGrp="1"/>
+          </p:cNvSpPr>
+          <p:nvPr>
+            <p:ph type="title"/>
+          </p:nvPr>
+        </p:nvSpPr>
+        <p:spPr/>
+        <p:txBody>
+          <a:bodyPr/>
+          <a:lstStyle/>
+          <a:p>
+            <a:pPr algn="ctr" rtl="0"/>
+            <a:r>
+              <a:rPr lang="en-US" dirty="0"/>
+              <a:t>RT TLM </a:t>
+            </a:r>
+            <a:br>
+              <a:rPr lang="en-US" dirty="0"/>
+            </a:br>
+            <a:r>
+              <a:rPr lang="en-US" dirty="0"/>
+              <a:t>RT viewer - Presentation of table</a:t>
+            </a:r>
+          </a:p>
+        </p:txBody>
+      </p:sp>
+      <p:pic>
+        <p:nvPicPr>
+          <p:cNvPr id="6146" name="Picture 2"/>
+          <p:cNvPicPr>
+            <a:picLocks noChangeAspect="1" noChangeArrowheads="1"/>
+          </p:cNvPicPr>
+          <p:nvPr/>
+        </p:nvPicPr>
+        <p:blipFill>
+          <a:blip r:embed="rId2">
+            <a:extLst>
+              <a:ext uri="{28A0092B-C50C-407E-A947-70E740481C1C}">
+                <a14:useLocalDpi xmlns:a14="http://schemas.microsoft.com/office/drawing/2010/main" val="0"/>
+              </a:ext>
+            </a:extLst>
+          </a:blip>
+          <a:srcRect/>
+          <a:stretch>
+            <a:fillRect/>
+          </a:stretch>
+        </p:blipFill>
+        <p:spPr bwMode="auto">
+          <a:xfrm>
+            <a:off x="926910" y="1173705"/>
+            <a:ext cx="7583578" cy="5041355"/>
+          </a:xfrm>
+          <a:prstGeom prst="rect">
+            <a:avLst/>
+          </a:prstGeom>
+          <a:noFill/>
+          <a:ln>
+            <a:noFill/>
+          </a:ln>
+          <a:extLst>
+            <a:ext uri="{909E8E84-426E-40DD-AFC4-6F175D3DCCD1}">
+              <a14:hiddenFill xmlns:a14="http://schemas.microsoft.com/office/drawing/2010/main">
+                <a:solidFill>
+                  <a:schemeClr val="accent1"/>
+                </a:solidFill>
+              </a14:hiddenFill>
+            </a:ext>
+            <a:ext uri="{91240B29-F687-4F45-9708-019B960494DF}">
+              <a14:hiddenLine xmlns:a14="http://schemas.microsoft.com/office/drawing/2010/main" w="9525">
+                <a:solidFill>
+                  <a:schemeClr val="tx1"/>
+                </a:solidFill>
+                <a:miter lim="800000"/>
+                <a:headEnd/>
+                <a:tailEnd/>
+              </a14:hiddenLine>
+            </a:ext>
+          </a:extLst>
+        </p:spPr>
+      </p:pic>
+    </p:spTree>
+    <p:extLst>
+      <p:ext uri="{BB962C8B-B14F-4D97-AF65-F5344CB8AC3E}">
+        <p14:creationId xmlns:p14="http://schemas.microsoft.com/office/powerpoint/2010/main" val="1453379152"/>
+      </p:ext>
+    </p:extLst>
+  </p:cSld>
+  <p:clrMapOvr>
+    <a:masterClrMapping/>
+  </p:clrMapOvr>
+  <p:transition/>
+</p:sld>
+</file>
+
+<file path=ppt/slides/slide11.xml><?xml version="1.0" encoding="utf-8"?>
+<p:sld xmlns:a="http://schemas.openxmlformats.org/drawingml/2006/main" xmlns:r="http://schemas.openxmlformats.org/officeDocument/2006/relationships" xmlns:p="http://schemas.openxmlformats.org/presentationml/2006/main">
+  <p:cSld>
+    <p:spTree>
+      <p:nvGrpSpPr>
+        <p:cNvPr id="1" name=""/>
+        <p:cNvGrpSpPr/>
+        <p:nvPr/>
+      </p:nvGrpSpPr>
+      <p:grpSpPr>
+        <a:xfrm>
+          <a:off x="0" y="0"/>
+          <a:ext cx="0" cy="0"/>
+          <a:chOff x="0" y="0"/>
+          <a:chExt cx="0" cy="0"/>
+        </a:xfrm>
+      </p:grpSpPr>
+      <p:sp>
+        <p:nvSpPr>
+          <p:cNvPr id="6" name="Content Placeholder 5"/>
+          <p:cNvSpPr>
+            <a:spLocks noGrp="1"/>
+          </p:cNvSpPr>
+          <p:nvPr>
+            <p:ph idx="1"/>
+          </p:nvPr>
+        </p:nvSpPr>
+        <p:spPr>
+          <a:xfrm>
+            <a:off x="179388" y="1080000"/>
+            <a:ext cx="8713787" cy="2448060"/>
+          </a:xfrm>
+        </p:spPr>
+        <p:txBody>
+          <a:bodyPr/>
+          <a:lstStyle/>
+          <a:p>
+            <a:r>
+              <a:rPr lang="en-US" dirty="0"/>
+              <a:t> </a:t>
+            </a:r>
+            <a:r>
+              <a:rPr lang="en-US" sz="1400" dirty="0"/>
+              <a:t>Each telemetric plan will be in an ICD file format (.grep file).</a:t>
+            </a:r>
+          </a:p>
+          <a:p>
+            <a:r>
+              <a:rPr lang="en-US" sz="1400" dirty="0"/>
+              <a:t> The telemetric plan members will be build throw GDE application.</a:t>
+            </a:r>
+          </a:p>
+          <a:p>
+            <a:r>
+              <a:rPr lang="en-US" sz="1400" dirty="0"/>
+              <a:t> The ICD message will be form by system engineers.</a:t>
+            </a:r>
+            <a:endParaRPr lang="en-US" dirty="0"/>
+          </a:p>
+          <a:p>
+            <a:pPr marL="0" indent="0">
+              <a:buNone/>
+            </a:pPr>
+            <a:r>
+              <a:rPr lang="en-US" dirty="0"/>
+              <a:t>  </a:t>
+            </a:r>
+          </a:p>
+        </p:txBody>
+      </p:sp>
+      <p:sp>
+        <p:nvSpPr>
+          <p:cNvPr id="5" name="Title 4"/>
+          <p:cNvSpPr>
+            <a:spLocks noGrp="1"/>
+          </p:cNvSpPr>
+          <p:nvPr>
+            <p:ph type="title"/>
+          </p:nvPr>
+        </p:nvSpPr>
+        <p:spPr/>
+        <p:txBody>
+          <a:bodyPr/>
+          <a:lstStyle/>
+          <a:p>
+            <a:pPr algn="ctr" rtl="0"/>
+            <a:r>
+              <a:rPr lang="en-US" dirty="0"/>
+              <a:t>RT TLM parameters configuration</a:t>
+            </a:r>
+            <a:br>
+              <a:rPr lang="en-US" dirty="0"/>
+            </a:br>
+            <a:r>
+              <a:rPr lang="en-US" dirty="0"/>
+              <a:t>Solution A – ICD messages</a:t>
+            </a:r>
+          </a:p>
+        </p:txBody>
+      </p:sp>
+    </p:spTree>
+    <p:extLst>
+      <p:ext uri="{BB962C8B-B14F-4D97-AF65-F5344CB8AC3E}">
+        <p14:creationId xmlns:p14="http://schemas.microsoft.com/office/powerpoint/2010/main" val="1509595162"/>
+      </p:ext>
+    </p:extLst>
+  </p:cSld>
+  <p:clrMapOvr>
+    <a:masterClrMapping/>
+  </p:clrMapOvr>
+  <p:transition/>
+</p:sld>
+</file>
+
+<file path=ppt/slides/slide12.xml><?xml version="1.0" encoding="utf-8"?>
 <p:sld xmlns:a="http://schemas.openxmlformats.org/drawingml/2006/main" xmlns:r="http://schemas.openxmlformats.org/officeDocument/2006/relationships" xmlns:p="http://schemas.openxmlformats.org/presentationml/2006/main">
   <p:cSld>
     <p:spTree>
@@ -4292,22 +4477,501 @@
           <a:lstStyle/>
           <a:p>
             <a:r>
-              <a:rPr lang="en-US" dirty="0" smtClean="0"/>
-              <a:t>The tool actually edit the implementation data base files for the selected module.</a:t>
+              <a:rPr lang="en-US" dirty="0"/>
+              <a:t>Parameters configurator tool goal is to add ability to insert / remove / view parameters for a chosen RTC module.  </a:t>
             </a:r>
           </a:p>
           <a:p>
             <a:pPr marL="0" indent="0">
               <a:buNone/>
             </a:pPr>
-            <a:endParaRPr lang="en-US" dirty="0" smtClean="0"/>
+            <a:endParaRPr lang="en-US" dirty="0"/>
           </a:p>
           <a:p>
             <a:pPr marL="0" indent="0">
               <a:buNone/>
             </a:pPr>
             <a:r>
-              <a:rPr lang="en-US" dirty="0" smtClean="0"/>
+              <a:rPr lang="en-US" dirty="0"/>
+              <a:t>  </a:t>
+            </a:r>
+          </a:p>
+        </p:txBody>
+      </p:sp>
+      <p:sp>
+        <p:nvSpPr>
+          <p:cNvPr id="5" name="Title 4"/>
+          <p:cNvSpPr>
+            <a:spLocks noGrp="1"/>
+          </p:cNvSpPr>
+          <p:nvPr>
+            <p:ph type="title"/>
+          </p:nvPr>
+        </p:nvSpPr>
+        <p:spPr/>
+        <p:txBody>
+          <a:bodyPr/>
+          <a:lstStyle/>
+          <a:p>
+            <a:pPr algn="ctr" rtl="0"/>
+            <a:r>
+              <a:rPr lang="en-US" sz="2000" dirty="0"/>
+              <a:t>RT TLM parameters configuration</a:t>
+            </a:r>
+            <a:br>
+              <a:rPr lang="en-US" sz="2000" dirty="0"/>
+            </a:br>
+            <a:r>
+              <a:rPr lang="en-US" sz="2000" dirty="0"/>
+              <a:t>Solution B – Parameters configurator tool </a:t>
+            </a:r>
+          </a:p>
+        </p:txBody>
+      </p:sp>
+      <p:pic>
+        <p:nvPicPr>
+          <p:cNvPr id="2" name="Picture 2"/>
+          <p:cNvPicPr>
+            <a:picLocks noChangeAspect="1" noChangeArrowheads="1"/>
+          </p:cNvPicPr>
+          <p:nvPr/>
+        </p:nvPicPr>
+        <p:blipFill>
+          <a:blip r:embed="rId2">
+            <a:extLst>
+              <a:ext uri="{28A0092B-C50C-407E-A947-70E740481C1C}">
+                <a14:useLocalDpi xmlns:a14="http://schemas.microsoft.com/office/drawing/2010/main" val="0"/>
+              </a:ext>
+            </a:extLst>
+          </a:blip>
+          <a:srcRect/>
+          <a:stretch>
+            <a:fillRect/>
+          </a:stretch>
+        </p:blipFill>
+        <p:spPr bwMode="auto">
+          <a:xfrm>
+            <a:off x="556003" y="2148052"/>
+            <a:ext cx="3499788" cy="1120210"/>
+          </a:xfrm>
+          <a:prstGeom prst="rect">
+            <a:avLst/>
+          </a:prstGeom>
+          <a:noFill/>
+          <a:ln>
+            <a:noFill/>
+          </a:ln>
+          <a:effectLst/>
+          <a:extLst>
+            <a:ext uri="{909E8E84-426E-40DD-AFC4-6F175D3DCCD1}">
+              <a14:hiddenFill xmlns:a14="http://schemas.microsoft.com/office/drawing/2010/main">
+                <a:solidFill>
+                  <a:schemeClr val="accent1"/>
+                </a:solidFill>
+              </a14:hiddenFill>
+            </a:ext>
+            <a:ext uri="{91240B29-F687-4F45-9708-019B960494DF}">
+              <a14:hiddenLine xmlns:a14="http://schemas.microsoft.com/office/drawing/2010/main" w="9525">
+                <a:solidFill>
+                  <a:schemeClr val="tx1"/>
+                </a:solidFill>
+                <a:miter lim="800000"/>
+                <a:headEnd/>
+                <a:tailEnd/>
+              </a14:hiddenLine>
+            </a:ext>
+            <a:ext uri="{AF507438-7753-43E0-B8FC-AC1667EBCBE1}">
+              <a14:hiddenEffects xmlns:a14="http://schemas.microsoft.com/office/drawing/2010/main">
+                <a:effectLst>
+                  <a:outerShdw dist="35921" dir="2700000" algn="ctr" rotWithShape="0">
+                    <a:schemeClr val="bg2"/>
+                  </a:outerShdw>
+                </a:effectLst>
+              </a14:hiddenEffects>
+            </a:ext>
+          </a:extLst>
+        </p:spPr>
+      </p:pic>
+      <p:sp>
+        <p:nvSpPr>
+          <p:cNvPr id="3" name="TextBox 2"/>
+          <p:cNvSpPr txBox="1"/>
+          <p:nvPr/>
+        </p:nvSpPr>
+        <p:spPr>
+          <a:xfrm>
+            <a:off x="528452" y="1778720"/>
+            <a:ext cx="3650358" cy="338554"/>
+          </a:xfrm>
+          <a:prstGeom prst="rect">
+            <a:avLst/>
+          </a:prstGeom>
+          <a:noFill/>
+        </p:spPr>
+        <p:txBody>
+          <a:bodyPr wrap="none" rtlCol="0">
+            <a:spAutoFit/>
+          </a:bodyPr>
+          <a:lstStyle/>
+          <a:p>
+            <a:pPr algn="l" rtl="0"/>
+            <a:r>
+              <a:rPr lang="en-US" sz="1600" dirty="0"/>
+              <a:t>Configure path to DB files and module</a:t>
+            </a:r>
+          </a:p>
+        </p:txBody>
+      </p:sp>
+      <p:pic>
+        <p:nvPicPr>
+          <p:cNvPr id="4" name="Picture 3"/>
+          <p:cNvPicPr>
+            <a:picLocks noChangeAspect="1" noChangeArrowheads="1"/>
+          </p:cNvPicPr>
+          <p:nvPr/>
+        </p:nvPicPr>
+        <p:blipFill>
+          <a:blip r:embed="rId3">
+            <a:extLst>
+              <a:ext uri="{28A0092B-C50C-407E-A947-70E740481C1C}">
+                <a14:useLocalDpi xmlns:a14="http://schemas.microsoft.com/office/drawing/2010/main" val="0"/>
+              </a:ext>
+            </a:extLst>
+          </a:blip>
+          <a:srcRect/>
+          <a:stretch>
+            <a:fillRect/>
+          </a:stretch>
+        </p:blipFill>
+        <p:spPr bwMode="auto">
+          <a:xfrm>
+            <a:off x="571069" y="3834147"/>
+            <a:ext cx="3565124" cy="1826233"/>
+          </a:xfrm>
+          <a:prstGeom prst="rect">
+            <a:avLst/>
+          </a:prstGeom>
+          <a:noFill/>
+          <a:ln>
+            <a:noFill/>
+          </a:ln>
+          <a:effectLst/>
+          <a:extLst>
+            <a:ext uri="{909E8E84-426E-40DD-AFC4-6F175D3DCCD1}">
+              <a14:hiddenFill xmlns:a14="http://schemas.microsoft.com/office/drawing/2010/main">
+                <a:solidFill>
+                  <a:schemeClr val="accent1"/>
+                </a:solidFill>
+              </a14:hiddenFill>
+            </a:ext>
+            <a:ext uri="{91240B29-F687-4F45-9708-019B960494DF}">
+              <a14:hiddenLine xmlns:a14="http://schemas.microsoft.com/office/drawing/2010/main" w="9525">
+                <a:solidFill>
+                  <a:schemeClr val="tx1"/>
+                </a:solidFill>
+                <a:miter lim="800000"/>
+                <a:headEnd/>
+                <a:tailEnd/>
+              </a14:hiddenLine>
+            </a:ext>
+            <a:ext uri="{AF507438-7753-43E0-B8FC-AC1667EBCBE1}">
+              <a14:hiddenEffects xmlns:a14="http://schemas.microsoft.com/office/drawing/2010/main">
+                <a:effectLst>
+                  <a:outerShdw dist="35921" dir="2700000" algn="ctr" rotWithShape="0">
+                    <a:schemeClr val="bg2"/>
+                  </a:outerShdw>
+                </a:effectLst>
+              </a14:hiddenEffects>
+            </a:ext>
+          </a:extLst>
+        </p:spPr>
+      </p:pic>
+      <p:sp>
+        <p:nvSpPr>
+          <p:cNvPr id="9" name="TextBox 8"/>
+          <p:cNvSpPr txBox="1"/>
+          <p:nvPr/>
+        </p:nvSpPr>
+        <p:spPr>
+          <a:xfrm>
+            <a:off x="556003" y="3434643"/>
+            <a:ext cx="2364750" cy="369332"/>
+          </a:xfrm>
+          <a:prstGeom prst="rect">
+            <a:avLst/>
+          </a:prstGeom>
+          <a:noFill/>
+        </p:spPr>
+        <p:txBody>
+          <a:bodyPr wrap="none" rtlCol="0">
+            <a:spAutoFit/>
+          </a:bodyPr>
+          <a:lstStyle/>
+          <a:p>
+            <a:pPr algn="l" rtl="0"/>
+            <a:r>
+              <a:rPr lang="en-US" dirty="0"/>
+              <a:t>Insert new parameter</a:t>
+            </a:r>
+          </a:p>
+        </p:txBody>
+      </p:sp>
+      <p:pic>
+        <p:nvPicPr>
+          <p:cNvPr id="1028" name="Picture 4"/>
+          <p:cNvPicPr>
+            <a:picLocks noChangeAspect="1" noChangeArrowheads="1"/>
+          </p:cNvPicPr>
+          <p:nvPr/>
+        </p:nvPicPr>
+        <p:blipFill>
+          <a:blip r:embed="rId4">
+            <a:extLst>
+              <a:ext uri="{28A0092B-C50C-407E-A947-70E740481C1C}">
+                <a14:useLocalDpi xmlns:a14="http://schemas.microsoft.com/office/drawing/2010/main" val="0"/>
+              </a:ext>
+            </a:extLst>
+          </a:blip>
+          <a:srcRect/>
+          <a:stretch>
+            <a:fillRect/>
+          </a:stretch>
+        </p:blipFill>
+        <p:spPr bwMode="auto">
+          <a:xfrm>
+            <a:off x="4594762" y="2158893"/>
+            <a:ext cx="3426215" cy="1109369"/>
+          </a:xfrm>
+          <a:prstGeom prst="rect">
+            <a:avLst/>
+          </a:prstGeom>
+          <a:noFill/>
+          <a:ln>
+            <a:noFill/>
+          </a:ln>
+          <a:effectLst/>
+          <a:extLst>
+            <a:ext uri="{909E8E84-426E-40DD-AFC4-6F175D3DCCD1}">
+              <a14:hiddenFill xmlns:a14="http://schemas.microsoft.com/office/drawing/2010/main">
+                <a:solidFill>
+                  <a:schemeClr val="accent1"/>
+                </a:solidFill>
+              </a14:hiddenFill>
+            </a:ext>
+            <a:ext uri="{91240B29-F687-4F45-9708-019B960494DF}">
+              <a14:hiddenLine xmlns:a14="http://schemas.microsoft.com/office/drawing/2010/main" w="9525">
+                <a:solidFill>
+                  <a:schemeClr val="tx1"/>
+                </a:solidFill>
+                <a:miter lim="800000"/>
+                <a:headEnd/>
+                <a:tailEnd/>
+              </a14:hiddenLine>
+            </a:ext>
+            <a:ext uri="{AF507438-7753-43E0-B8FC-AC1667EBCBE1}">
+              <a14:hiddenEffects xmlns:a14="http://schemas.microsoft.com/office/drawing/2010/main">
+                <a:effectLst>
+                  <a:outerShdw dist="35921" dir="2700000" algn="ctr" rotWithShape="0">
+                    <a:schemeClr val="bg2"/>
+                  </a:outerShdw>
+                </a:effectLst>
+              </a14:hiddenEffects>
+            </a:ext>
+          </a:extLst>
+        </p:spPr>
+      </p:pic>
+      <p:sp>
+        <p:nvSpPr>
+          <p:cNvPr id="11" name="TextBox 10"/>
+          <p:cNvSpPr txBox="1"/>
+          <p:nvPr/>
+        </p:nvSpPr>
+        <p:spPr>
+          <a:xfrm>
+            <a:off x="4506264" y="1747942"/>
+            <a:ext cx="3890809" cy="369332"/>
+          </a:xfrm>
+          <a:prstGeom prst="rect">
+            <a:avLst/>
+          </a:prstGeom>
+          <a:noFill/>
+        </p:spPr>
+        <p:txBody>
+          <a:bodyPr wrap="none" rtlCol="0">
+            <a:spAutoFit/>
+          </a:bodyPr>
+          <a:lstStyle/>
+          <a:p>
+            <a:pPr algn="l" rtl="0"/>
+            <a:r>
+              <a:rPr lang="en-US" dirty="0"/>
+              <a:t>Remove parameter from module DB</a:t>
+            </a:r>
+          </a:p>
+        </p:txBody>
+      </p:sp>
+      <p:pic>
+        <p:nvPicPr>
+          <p:cNvPr id="1029" name="Picture 5"/>
+          <p:cNvPicPr>
+            <a:picLocks noChangeAspect="1" noChangeArrowheads="1"/>
+          </p:cNvPicPr>
+          <p:nvPr/>
+        </p:nvPicPr>
+        <p:blipFill>
+          <a:blip r:embed="rId5">
+            <a:extLst>
+              <a:ext uri="{28A0092B-C50C-407E-A947-70E740481C1C}">
+                <a14:useLocalDpi xmlns:a14="http://schemas.microsoft.com/office/drawing/2010/main" val="0"/>
+              </a:ext>
+            </a:extLst>
+          </a:blip>
+          <a:srcRect/>
+          <a:stretch>
+            <a:fillRect/>
+          </a:stretch>
+        </p:blipFill>
+        <p:spPr bwMode="auto">
+          <a:xfrm>
+            <a:off x="4594762" y="3834147"/>
+            <a:ext cx="3509205" cy="2280273"/>
+          </a:xfrm>
+          <a:prstGeom prst="rect">
+            <a:avLst/>
+          </a:prstGeom>
+          <a:noFill/>
+          <a:ln>
+            <a:noFill/>
+          </a:ln>
+          <a:effectLst/>
+          <a:extLst>
+            <a:ext uri="{909E8E84-426E-40DD-AFC4-6F175D3DCCD1}">
+              <a14:hiddenFill xmlns:a14="http://schemas.microsoft.com/office/drawing/2010/main">
+                <a:solidFill>
+                  <a:schemeClr val="accent1"/>
+                </a:solidFill>
+              </a14:hiddenFill>
+            </a:ext>
+            <a:ext uri="{91240B29-F687-4F45-9708-019B960494DF}">
+              <a14:hiddenLine xmlns:a14="http://schemas.microsoft.com/office/drawing/2010/main" w="9525">
+                <a:solidFill>
+                  <a:schemeClr val="tx1"/>
+                </a:solidFill>
+                <a:miter lim="800000"/>
+                <a:headEnd/>
+                <a:tailEnd/>
+              </a14:hiddenLine>
+            </a:ext>
+            <a:ext uri="{AF507438-7753-43E0-B8FC-AC1667EBCBE1}">
+              <a14:hiddenEffects xmlns:a14="http://schemas.microsoft.com/office/drawing/2010/main">
+                <a:effectLst>
+                  <a:outerShdw dist="35921" dir="2700000" algn="ctr" rotWithShape="0">
+                    <a:schemeClr val="bg2"/>
+                  </a:outerShdw>
+                </a:effectLst>
+              </a14:hiddenEffects>
+            </a:ext>
+          </a:extLst>
+        </p:spPr>
+      </p:pic>
+      <p:sp>
+        <p:nvSpPr>
+          <p:cNvPr id="13" name="TextBox 12"/>
+          <p:cNvSpPr txBox="1"/>
+          <p:nvPr/>
+        </p:nvSpPr>
+        <p:spPr>
+          <a:xfrm>
+            <a:off x="4933650" y="3434643"/>
+            <a:ext cx="2732479" cy="369332"/>
+          </a:xfrm>
+          <a:prstGeom prst="rect">
+            <a:avLst/>
+          </a:prstGeom>
+          <a:noFill/>
+        </p:spPr>
+        <p:txBody>
+          <a:bodyPr wrap="none" rtlCol="0">
+            <a:spAutoFit/>
+          </a:bodyPr>
+          <a:lstStyle/>
+          <a:p>
+            <a:pPr algn="l" rtl="0"/>
+            <a:r>
+              <a:rPr lang="en-US" dirty="0"/>
+              <a:t>View module parameters</a:t>
+            </a:r>
+          </a:p>
+        </p:txBody>
+      </p:sp>
+    </p:spTree>
+    <p:extLst>
+      <p:ext uri="{BB962C8B-B14F-4D97-AF65-F5344CB8AC3E}">
+        <p14:creationId xmlns:p14="http://schemas.microsoft.com/office/powerpoint/2010/main" val="2557997767"/>
+      </p:ext>
+    </p:extLst>
+  </p:cSld>
+  <p:clrMapOvr>
+    <a:masterClrMapping/>
+  </p:clrMapOvr>
+  <p:transition/>
+</p:sld>
+</file>
+
+<file path=ppt/slides/slide13.xml><?xml version="1.0" encoding="utf-8"?>
+<p:sld xmlns:a="http://schemas.openxmlformats.org/drawingml/2006/main" xmlns:r="http://schemas.openxmlformats.org/officeDocument/2006/relationships" xmlns:p="http://schemas.openxmlformats.org/presentationml/2006/main">
+  <p:cSld>
+    <p:spTree>
+      <p:nvGrpSpPr>
+        <p:cNvPr id="1" name=""/>
+        <p:cNvGrpSpPr/>
+        <p:nvPr/>
+      </p:nvGrpSpPr>
+      <p:grpSpPr>
+        <a:xfrm>
+          <a:off x="0" y="0"/>
+          <a:ext cx="0" cy="0"/>
+          <a:chOff x="0" y="0"/>
+          <a:chExt cx="0" cy="0"/>
+        </a:xfrm>
+      </p:grpSpPr>
+      <p:sp>
+        <p:nvSpPr>
+          <p:cNvPr id="6" name="Content Placeholder 5"/>
+          <p:cNvSpPr>
+            <a:spLocks noGrp="1"/>
+          </p:cNvSpPr>
+          <p:nvPr>
+            <p:ph idx="1"/>
+          </p:nvPr>
+        </p:nvSpPr>
+        <p:spPr>
+          <a:xfrm>
+            <a:off x="179388" y="1080001"/>
+            <a:ext cx="8713787" cy="651146"/>
+          </a:xfrm>
+        </p:spPr>
+        <p:txBody>
+          <a:bodyPr/>
+          <a:lstStyle/>
+          <a:p>
+            <a:r>
+              <a:rPr lang="en-US" dirty="0"/>
+              <a:t>The tool actually edit the implementation data base files for the selected module.</a:t>
+            </a:r>
+          </a:p>
+          <a:p>
+            <a:pPr marL="0" indent="0">
+              <a:buNone/>
+            </a:pPr>
+            <a:endParaRPr lang="en-US" dirty="0"/>
+          </a:p>
+          <a:p>
+            <a:pPr marL="0" indent="0">
+              <a:buNone/>
+            </a:pPr>
+            <a:r>
+              <a:rPr lang="en-US" dirty="0"/>
               <a:t>  </a:t>
             </a:r>
           </a:p>
@@ -4437,10 +5101,9 @@
           <a:p>
             <a:pPr algn="l" rtl="0"/>
             <a:r>
-              <a:rPr lang="en-US" sz="1200" dirty="0" smtClean="0"/>
+              <a:rPr lang="en-US" sz="1200" dirty="0"/>
               <a:t>Create Telemetric object (in *.h file) with the given name (e.g. “TEST_FLAG”).</a:t>
             </a:r>
-            <a:endParaRPr lang="en-US" sz="1200" dirty="0"/>
           </a:p>
         </p:txBody>
       </p:sp>
@@ -4474,10 +5137,9 @@
           <a:p>
             <a:pPr algn="l" rtl="0"/>
             <a:r>
-              <a:rPr lang="en-US" sz="1200" dirty="0" smtClean="0"/>
+              <a:rPr lang="en-US" sz="1200" dirty="0"/>
               <a:t>Create configuration function for the new parameter</a:t>
             </a:r>
-            <a:endParaRPr lang="en-US" sz="1200" dirty="0"/>
           </a:p>
         </p:txBody>
       </p:sp>
@@ -4511,17 +5173,16 @@
           <a:p>
             <a:pPr algn="l" rtl="0"/>
             <a:r>
-              <a:rPr lang="en-US" sz="1200" dirty="0" smtClean="0"/>
+              <a:rPr lang="en-US" sz="1200" dirty="0"/>
               <a:t>Add the parameter function configuration </a:t>
             </a:r>
           </a:p>
           <a:p>
             <a:pPr algn="l" rtl="0"/>
             <a:r>
-              <a:rPr lang="en-US" sz="1200" dirty="0" smtClean="0"/>
+              <a:rPr lang="en-US" sz="1200" dirty="0"/>
               <a:t>to module initialization procedure.</a:t>
             </a:r>
-            <a:endParaRPr lang="en-US" sz="1200" dirty="0"/>
           </a:p>
         </p:txBody>
       </p:sp>
@@ -4619,10 +5280,9 @@
           <a:p>
             <a:pPr algn="l" rtl="0"/>
             <a:r>
-              <a:rPr lang="en-US" sz="1200" dirty="0" smtClean="0"/>
+              <a:rPr lang="en-US" sz="1200" dirty="0"/>
               <a:t>Update parameters module counter with amount of objects</a:t>
             </a:r>
-            <a:endParaRPr lang="en-US" sz="1200" dirty="0"/>
           </a:p>
         </p:txBody>
       </p:sp>
@@ -4765,17 +5425,10 @@
     <a:masterClrMapping/>
   </p:clrMapOvr>
   <p:transition/>
-  <p:timing>
-    <p:tnLst>
-      <p:par>
-        <p:cTn id="1" dur="indefinite" restart="never" nodeType="tmRoot"/>
-      </p:par>
-    </p:tnLst>
-  </p:timing>
 </p:sld>
 </file>
 
-<file path=ppt/slides/slide11.xml><?xml version="1.0" encoding="utf-8"?>
+<file path=ppt/slides/slide14.xml><?xml version="1.0" encoding="utf-8"?>
 <p:sld xmlns:a="http://schemas.openxmlformats.org/drawingml/2006/main" xmlns:r="http://schemas.openxmlformats.org/officeDocument/2006/relationships" xmlns:p="http://schemas.openxmlformats.org/presentationml/2006/main">
   <p:cSld>
     <p:spTree>
@@ -4809,17 +5462,16 @@
           <a:p>
             <a:pPr algn="ctr" rtl="0"/>
             <a:r>
-              <a:rPr lang="en-US" sz="1400" dirty="0" smtClean="0"/>
+              <a:rPr lang="en-US" sz="1400" dirty="0"/>
               <a:t>Telemetric SW flow</a:t>
             </a:r>
             <a:br>
-              <a:rPr lang="en-US" sz="1400" dirty="0" smtClean="0"/>
+              <a:rPr lang="en-US" sz="1400" dirty="0"/>
             </a:br>
             <a:r>
-              <a:rPr lang="en-US" sz="1400" dirty="0" smtClean="0"/>
+              <a:rPr lang="en-US" sz="1400" dirty="0"/>
               <a:t>Write process</a:t>
             </a:r>
-            <a:endParaRPr lang="en-US" sz="1400" dirty="0"/>
           </a:p>
         </p:txBody>
       </p:sp>
@@ -4875,17 +5527,10 @@
     <a:masterClrMapping/>
   </p:clrMapOvr>
   <p:transition/>
-  <p:timing>
-    <p:tnLst>
-      <p:par>
-        <p:cTn id="1" dur="indefinite" restart="never" nodeType="tmRoot"/>
-      </p:par>
-    </p:tnLst>
-  </p:timing>
 </p:sld>
 </file>
 
-<file path=ppt/slides/slide12.xml><?xml version="1.0" encoding="utf-8"?>
+<file path=ppt/slides/slide15.xml><?xml version="1.0" encoding="utf-8"?>
 <p:sld xmlns:a="http://schemas.openxmlformats.org/drawingml/2006/main" xmlns:r="http://schemas.openxmlformats.org/officeDocument/2006/relationships" xmlns:p="http://schemas.openxmlformats.org/presentationml/2006/main">
   <p:cSld>
     <p:spTree>
@@ -4919,17 +5564,16 @@
           <a:p>
             <a:pPr algn="ctr" rtl="0"/>
             <a:r>
-              <a:rPr lang="en-US" sz="1400" dirty="0" smtClean="0"/>
+              <a:rPr lang="en-US" sz="1400" dirty="0"/>
               <a:t>Telemetric SW flow</a:t>
             </a:r>
             <a:br>
-              <a:rPr lang="en-US" sz="1400" dirty="0" smtClean="0"/>
+              <a:rPr lang="en-US" sz="1400" dirty="0"/>
             </a:br>
             <a:r>
-              <a:rPr lang="en-US" sz="1400" dirty="0" smtClean="0"/>
+              <a:rPr lang="en-US" sz="1400" dirty="0"/>
               <a:t>Flash write task, initialize process</a:t>
             </a:r>
-            <a:endParaRPr lang="en-US" sz="1400" dirty="0"/>
           </a:p>
         </p:txBody>
       </p:sp>
@@ -4985,17 +5629,10 @@
     <a:masterClrMapping/>
   </p:clrMapOvr>
   <p:transition/>
-  <p:timing>
-    <p:tnLst>
-      <p:par>
-        <p:cTn id="1" dur="indefinite" restart="never" nodeType="tmRoot"/>
-      </p:par>
-    </p:tnLst>
-  </p:timing>
 </p:sld>
 </file>
 
-<file path=ppt/slides/slide13.xml><?xml version="1.0" encoding="utf-8"?>
+<file path=ppt/slides/slide16.xml><?xml version="1.0" encoding="utf-8"?>
 <p:sld xmlns:a="http://schemas.openxmlformats.org/drawingml/2006/main" xmlns:r="http://schemas.openxmlformats.org/officeDocument/2006/relationships" xmlns:p="http://schemas.openxmlformats.org/presentationml/2006/main">
   <p:cSld>
     <p:spTree>
@@ -5037,10 +5674,9 @@
               <a:defRPr/>
             </a:pPr>
             <a:r>
-              <a:rPr lang="en-US" sz="6600" dirty="0" smtClean="0"/>
+              <a:rPr lang="en-US" sz="6600" dirty="0"/>
               <a:t>The End.</a:t>
             </a:r>
-            <a:endParaRPr lang="en-US" sz="6600" dirty="0"/>
           </a:p>
           <a:p>
             <a:pPr marL="360000" lvl="1" indent="0">
@@ -5206,9 +5842,9 @@
                 </a:solidFill>
               </a:rPr>
               <a:pPr eaLnBrk="1" hangingPunct="1"/>
-              <a:t>13</a:t>
+              <a:t>16</a:t>
             </a:fld>
-            <a:endParaRPr lang="en-US" smtClean="0">
+            <a:endParaRPr lang="en-US">
               <a:solidFill>
                 <a:schemeClr val="bg1"/>
               </a:solidFill>
@@ -5288,13 +5924,6 @@
     <a:masterClrMapping/>
   </p:clrMapOvr>
   <p:transition/>
-  <p:timing>
-    <p:tnLst>
-      <p:par>
-        <p:cTn id="1" dur="indefinite" restart="never" nodeType="tmRoot"/>
-      </p:par>
-    </p:tnLst>
-  </p:timing>
 </p:sld>
 </file>
 
@@ -5332,187 +5961,105 @@
           <a:p>
             <a:r>
               <a:rPr lang="en-US" sz="1100" dirty="0"/>
-              <a:t>RTC shall record system status and events </a:t>
-            </a:r>
-            <a:r>
-              <a:rPr lang="en-US" sz="1100" dirty="0" smtClean="0"/>
-              <a:t>from RTC SW modules and export them to RT viewer using UDP connection.</a:t>
-            </a:r>
-            <a:endParaRPr lang="en-US" sz="1100" dirty="0"/>
-          </a:p>
-          <a:p>
-            <a:r>
-              <a:rPr lang="en-US" sz="1100" dirty="0" smtClean="0"/>
-              <a:t>The telemetric module will consist data base </a:t>
-            </a:r>
+              <a:t>RTC shall record system status and events from RTC SW modules and export them to RT viewer using UDP connection.</a:t>
+            </a:r>
+          </a:p>
+          <a:p>
             <a:r>
               <a:rPr lang="en-US" sz="1100" dirty="0"/>
-              <a:t>files (*.c, *,h</a:t>
-            </a:r>
-            <a:r>
-              <a:rPr lang="en-US" sz="1100" dirty="0" smtClean="0"/>
-              <a:t>) for each RTC module. This files will consist all the data members that need to be sample throw the telemetric procedure. </a:t>
-            </a:r>
-          </a:p>
-          <a:p>
-            <a:r>
-              <a:rPr lang="en-US" sz="1100" dirty="0" smtClean="0"/>
-              <a:t>Each telemetric data member will consist the following information fields:</a:t>
+              <a:t>The telemetric module will consist data base files (*.c, *,h) for each RTC module. This files will consist all the data members that need to be sample throw the telemetric procedure. </a:t>
+            </a:r>
+          </a:p>
+          <a:p>
+            <a:r>
+              <a:rPr lang="en-US" sz="1100" dirty="0"/>
+              <a:t>Each telemetric member will consist the following information fields:</a:t>
             </a:r>
           </a:p>
           <a:p>
             <a:pPr lvl="1"/>
             <a:r>
-              <a:rPr lang="en-US" sz="1050" dirty="0" smtClean="0"/>
-              <a:t>Group: the RTC module that the data member belong to (e.g. PFD, UAV, etc.…) [up to 32 groups].</a:t>
+              <a:rPr lang="en-US" sz="1050" dirty="0"/>
+              <a:t>Module: the RTC module that the data member belong to (e.g. PFD, UAV, etc.…) [up to 32 groups].</a:t>
             </a:r>
           </a:p>
           <a:p>
             <a:pPr lvl="1"/>
             <a:r>
-              <a:rPr lang="en-US" sz="1050" dirty="0" smtClean="0"/>
+              <a:rPr lang="en-US" sz="1050" dirty="0"/>
               <a:t>Data index: The member location at the telemetric RTC module structure [ up to 255 parameters in module].</a:t>
             </a:r>
           </a:p>
           <a:p>
             <a:pPr lvl="1"/>
             <a:r>
-              <a:rPr lang="en-US" sz="1050" dirty="0" smtClean="0"/>
-              <a:t>Offset </a:t>
-            </a:r>
-            <a:r>
               <a:rPr lang="en-US" sz="1050" dirty="0"/>
-              <a:t>[void*]: </a:t>
-            </a:r>
-            <a:r>
-              <a:rPr lang="en-US" sz="1050" dirty="0" smtClean="0"/>
-              <a:t>memory address </a:t>
-            </a:r>
+              <a:t>Offset [void*]: memory address of the data at the RTC module.</a:t>
+            </a:r>
+          </a:p>
+          <a:p>
+            <a:pPr lvl="1"/>
             <a:r>
               <a:rPr lang="en-US" sz="1050" dirty="0"/>
-              <a:t>of the </a:t>
-            </a:r>
-            <a:r>
-              <a:rPr lang="en-US" sz="1050" dirty="0" smtClean="0"/>
-              <a:t>data at </a:t>
-            </a:r>
+              <a:t>Data type: Data type of the data [INT8, UINT8, INT16, UINT16, INT32, UINT32, INT64, UINT64 FLOAT_DOUBLE ].</a:t>
+            </a:r>
+          </a:p>
+          <a:p>
+            <a:pPr lvl="1"/>
             <a:r>
               <a:rPr lang="en-US" sz="1050" dirty="0"/>
-              <a:t>the </a:t>
-            </a:r>
-            <a:r>
-              <a:rPr lang="en-US" sz="1050" dirty="0" smtClean="0"/>
-              <a:t>RTC module.</a:t>
-            </a:r>
+              <a:t>Visually: Indicate that the data will be show in RT viewer application (visually = true).</a:t>
+            </a:r>
+            <a:endParaRPr lang="he-IL" sz="1050" dirty="0"/>
           </a:p>
           <a:p>
             <a:pPr lvl="1"/>
             <a:r>
-              <a:rPr lang="en-US" sz="1050" dirty="0" smtClean="0"/>
-              <a:t>Data type: Data type of the </a:t>
-            </a:r>
-            <a:r>
               <a:rPr lang="en-US" sz="1050" dirty="0"/>
-              <a:t>data [INT1_INT8, INT16, INT32, </a:t>
-            </a:r>
-            <a:r>
-              <a:rPr lang="en-US" sz="1050" dirty="0" smtClean="0"/>
-              <a:t>INT64, FLOAT_DOUBLE ].</a:t>
-            </a:r>
+              <a:t>Flash: Indicate that the data will be saved at Flash. (Flash = true).</a:t>
+            </a:r>
+            <a:endParaRPr lang="he-IL" sz="1050" dirty="0"/>
           </a:p>
           <a:p>
             <a:pPr lvl="1"/>
             <a:r>
-              <a:rPr lang="en-US" sz="1050" dirty="0" smtClean="0"/>
-              <a:t>Data sign: polarity of the data [sign, unsinged].</a:t>
-            </a:r>
-            <a:endParaRPr lang="en-US" sz="1050" dirty="0"/>
+              <a:rPr lang="en-US" sz="1050" dirty="0"/>
+              <a:t>Group number: Indicate the rate sample in </a:t>
+            </a:r>
+            <a:r>
+              <a:rPr lang="en-US" sz="1050" dirty="0" err="1"/>
+              <a:t>mSec</a:t>
+            </a:r>
+            <a:r>
+              <a:rPr lang="en-US" sz="1050" dirty="0"/>
+              <a:t> (up to 10 possible groups) (Each group rate speed can configure throw “offline parameters”).</a:t>
+            </a:r>
           </a:p>
           <a:p>
             <a:pPr lvl="1"/>
             <a:r>
-              <a:rPr lang="en-US" sz="1050" dirty="0" smtClean="0"/>
-              <a:t>Visually: Indicate that the data </a:t>
-            </a:r>
-            <a:r>
               <a:rPr lang="en-US" sz="1050" dirty="0"/>
-              <a:t>will be show in RT viewer </a:t>
-            </a:r>
-            <a:r>
-              <a:rPr lang="en-US" sz="1050" dirty="0" smtClean="0"/>
-              <a:t>application (visually = true).</a:t>
-            </a:r>
-            <a:endParaRPr lang="he-IL" sz="1050" dirty="0"/>
+              <a:t>CRC8 – Each data member will store CRC-8 for data traceability. </a:t>
+            </a:r>
+            <a:endParaRPr lang="en-US" sz="1300" dirty="0"/>
+          </a:p>
+          <a:p>
+            <a:r>
+              <a:rPr lang="en-US" sz="1100" dirty="0"/>
+              <a:t>Each telemetric data member that will saved to Flash / Current structure will be saved at the following form:</a:t>
+            </a:r>
           </a:p>
           <a:p>
             <a:pPr lvl="1"/>
             <a:r>
-              <a:rPr lang="en-US" sz="1050" dirty="0" smtClean="0"/>
-              <a:t>Flash: </a:t>
-            </a:r>
-            <a:r>
-              <a:rPr lang="en-US" sz="1050" dirty="0"/>
-              <a:t>Indicate that the data will be </a:t>
-            </a:r>
-            <a:r>
-              <a:rPr lang="en-US" sz="1050" dirty="0" smtClean="0"/>
-              <a:t>saved at Flash. (Flash </a:t>
-            </a:r>
-            <a:r>
-              <a:rPr lang="en-US" sz="1050" dirty="0"/>
-              <a:t>= true).</a:t>
-            </a:r>
-            <a:endParaRPr lang="he-IL" sz="1050" dirty="0"/>
+              <a:rPr lang="en-US" sz="900" dirty="0"/>
+              <a:t>Data: The member data will be convert to bytes.</a:t>
+            </a:r>
           </a:p>
           <a:p>
             <a:pPr lvl="1"/>
             <a:r>
-              <a:rPr lang="en-US" sz="1050" dirty="0" smtClean="0"/>
-              <a:t>Rate level: Rate sample of the data member [fast</a:t>
-            </a:r>
-            <a:r>
-              <a:rPr lang="en-US" sz="1050" dirty="0"/>
-              <a:t>, normal, </a:t>
-            </a:r>
-            <a:r>
-              <a:rPr lang="en-US" sz="1050" dirty="0" smtClean="0"/>
-              <a:t>slow] (can be configured throw “offline parameters”).</a:t>
-            </a:r>
-            <a:endParaRPr lang="en-US" sz="1100" dirty="0" smtClean="0"/>
-          </a:p>
-          <a:p>
-            <a:r>
-              <a:rPr lang="en-US" sz="1100" dirty="0" smtClean="0"/>
-              <a:t>Each telemetric data member that will saved to Flash / Current structure will be saved at the following form:</a:t>
-            </a:r>
-          </a:p>
-          <a:p>
-            <a:pPr lvl="1"/>
-            <a:r>
-              <a:rPr lang="en-US" sz="900" dirty="0" smtClean="0"/>
-              <a:t>Data: The member data will be </a:t>
-            </a:r>
-            <a:r>
               <a:rPr lang="en-US" sz="900" dirty="0"/>
-              <a:t>convert </a:t>
-            </a:r>
-            <a:r>
-              <a:rPr lang="en-US" sz="900" dirty="0" smtClean="0"/>
-              <a:t>and compress to bytes </a:t>
-            </a:r>
-            <a:r>
-              <a:rPr lang="en-US" sz="900" dirty="0"/>
-              <a:t>(bytes without leading spaces</a:t>
-            </a:r>
-            <a:r>
-              <a:rPr lang="en-US" sz="900" dirty="0" smtClean="0"/>
-              <a:t>).</a:t>
-            </a:r>
-          </a:p>
-          <a:p>
-            <a:pPr lvl="1"/>
-            <a:r>
-              <a:rPr lang="en-US" sz="900" dirty="0" smtClean="0"/>
               <a:t>Information bytes (3 bytes): This bytes consist the telemetric member information by bit fields at the following order:</a:t>
             </a:r>
           </a:p>
@@ -5522,7 +6069,7 @@
           </a:p>
           <a:p>
             <a:pPr lvl="1"/>
-            <a:endParaRPr lang="en-US" sz="900" dirty="0" smtClean="0"/>
+            <a:endParaRPr lang="en-US" sz="900" dirty="0"/>
           </a:p>
           <a:p>
             <a:pPr marL="457200" lvl="1" indent="0">
@@ -5535,13 +6082,13 @@
             <a:endParaRPr lang="en-US" sz="1100" dirty="0"/>
           </a:p>
           <a:p>
-            <a:endParaRPr lang="en-US" sz="1100" dirty="0" smtClean="0"/>
+            <a:endParaRPr lang="en-US" sz="1100" dirty="0"/>
           </a:p>
           <a:p>
             <a:pPr marL="0" indent="0">
               <a:buNone/>
             </a:pPr>
-            <a:endParaRPr lang="en-US" sz="1100" dirty="0" smtClean="0"/>
+            <a:endParaRPr lang="en-US" sz="1100" dirty="0"/>
           </a:p>
         </p:txBody>
       </p:sp>
@@ -5562,25 +6109,30 @@
           <a:p>
             <a:pPr algn="ctr" rtl="0"/>
             <a:r>
-              <a:rPr lang="en-US" dirty="0" smtClean="0"/>
+              <a:rPr lang="en-US" dirty="0"/>
               <a:t>RT TLM </a:t>
             </a:r>
             <a:br>
-              <a:rPr lang="en-US" dirty="0" smtClean="0"/>
+              <a:rPr lang="en-US" dirty="0"/>
             </a:br>
             <a:r>
-              <a:rPr lang="en-US" dirty="0" smtClean="0"/>
+              <a:rPr lang="en-US" dirty="0"/>
               <a:t>General Requirements</a:t>
             </a:r>
-            <a:endParaRPr lang="en-US" dirty="0"/>
           </a:p>
         </p:txBody>
       </p:sp>
       <p:pic>
         <p:nvPicPr>
-          <p:cNvPr id="1026" name="Picture 2" descr="C:\Software_projects\Elbit\ElbitMalat\Telemetric\DR\Flow charts\bits order.jpg"/>
+          <p:cNvPr id="7" name="Picture 6">
+            <a:extLst>
+              <a:ext uri="{FF2B5EF4-FFF2-40B4-BE49-F238E27FC236}">
+                <a16:creationId xmlns:a16="http://schemas.microsoft.com/office/drawing/2014/main" id="{7F5A8996-0B93-44DF-B322-B2EA417282AD}"/>
+              </a:ext>
+            </a:extLst>
+          </p:cNvPr>
           <p:cNvPicPr>
-            <a:picLocks noChangeAspect="1" noChangeArrowheads="1"/>
+            <a:picLocks noChangeAspect="1"/>
           </p:cNvPicPr>
           <p:nvPr/>
         </p:nvPicPr>
@@ -5592,29 +6144,18 @@
               </a:ext>
             </a:extLst>
           </a:blip>
-          <a:srcRect/>
           <a:stretch>
             <a:fillRect/>
           </a:stretch>
         </p:blipFill>
-        <p:spPr bwMode="auto">
+        <p:spPr>
           <a:xfrm>
-            <a:off x="464817" y="4493278"/>
-            <a:ext cx="8202371" cy="901682"/>
+            <a:off x="423221" y="4639330"/>
+            <a:ext cx="8297557" cy="1360403"/>
           </a:xfrm>
           <a:prstGeom prst="rect">
             <a:avLst/>
           </a:prstGeom>
-          <a:noFill/>
-          <a:extLst>
-            <a:ext uri="{909E8E84-426E-40DD-AFC4-6F175D3DCCD1}">
-              <a14:hiddenFill xmlns:a14="http://schemas.microsoft.com/office/drawing/2010/main">
-                <a:solidFill>
-                  <a:srgbClr val="FFFFFF"/>
-                </a:solidFill>
-              </a14:hiddenFill>
-            </a:ext>
-          </a:extLst>
         </p:spPr>
       </p:pic>
     </p:spTree>
@@ -5628,13 +6169,6 @@
     <a:masterClrMapping/>
   </p:clrMapOvr>
   <p:transition/>
-  <p:timing>
-    <p:tnLst>
-      <p:par>
-        <p:cTn id="1" dur="indefinite" restart="never" nodeType="tmRoot"/>
-      </p:par>
-    </p:tnLst>
-  </p:timing>
 </p:sld>
 </file>
 
@@ -5671,10 +6205,9 @@
           <a:lstStyle/>
           <a:p>
             <a:r>
-              <a:rPr lang="en-US" sz="2000" dirty="0" smtClean="0"/>
+              <a:rPr lang="en-US" sz="2000" dirty="0"/>
               <a:t>RT telemetric – high level module diagram</a:t>
             </a:r>
-            <a:endParaRPr lang="en-US" sz="2000" dirty="0"/>
           </a:p>
         </p:txBody>
       </p:sp>
@@ -6971,7 +7504,7 @@
               <a:buNone/>
               <a:tabLst/>
             </a:pPr>
-            <a:endParaRPr kumimoji="0" lang="en-US" sz="1800" b="0" i="0" u="none" strike="noStrike" cap="none" normalizeH="0" baseline="0" smtClean="0">
+            <a:endParaRPr kumimoji="0" lang="en-US" sz="1800" b="0" i="0" u="none" strike="noStrike" cap="none" normalizeH="0" baseline="0">
               <a:ln>
                 <a:noFill/>
               </a:ln>
@@ -6996,13 +7529,6 @@
     <a:masterClrMapping/>
   </p:clrMapOvr>
   <p:transition/>
-  <p:timing>
-    <p:tnLst>
-      <p:par>
-        <p:cTn id="1" dur="indefinite" restart="never" nodeType="tmRoot"/>
-      </p:par>
-    </p:tnLst>
-  </p:timing>
 </p:sld>
 </file>
 
@@ -7023,8 +7549,168 @@
           <a:chExt cx="0" cy="0"/>
         </a:xfrm>
       </p:grpSpPr>
-      <mc:AlternateContent xmlns:mc="http://schemas.openxmlformats.org/markup-compatibility/2006" xmlns:a14="http://schemas.microsoft.com/office/drawing/2010/main">
-        <mc:Choice Requires="a14">
+      <p:sp>
+        <p:nvSpPr>
+          <p:cNvPr id="6" name="Content Placeholder 5"/>
+          <p:cNvSpPr>
+            <a:spLocks noGrp="1"/>
+          </p:cNvSpPr>
+          <p:nvPr>
+            <p:ph idx="1"/>
+          </p:nvPr>
+        </p:nvSpPr>
+        <p:spPr>
+          <a:xfrm>
+            <a:off x="179388" y="1080000"/>
+            <a:ext cx="8713787" cy="3613919"/>
+          </a:xfrm>
+        </p:spPr>
+        <p:txBody>
+          <a:bodyPr/>
+          <a:lstStyle/>
+          <a:p>
+            <a:endParaRPr lang="en-US" sz="1100" dirty="0"/>
+          </a:p>
+          <a:p>
+            <a:r>
+              <a:rPr lang="en-US" sz="1100" dirty="0"/>
+              <a:t>RTC shall record system status and events using read / write to internal FLASH memory in the following conditions:</a:t>
+            </a:r>
+          </a:p>
+          <a:p>
+            <a:pPr lvl="1"/>
+            <a:r>
+              <a:rPr lang="en-US" sz="1100" dirty="0"/>
+              <a:t>Each telemetric data shell be belong to one of 10 possible programs. This program will contain all the telemetric members that belong to him.</a:t>
+            </a:r>
+          </a:p>
+          <a:p>
+            <a:pPr lvl="1"/>
+            <a:r>
+              <a:rPr lang="en-US" sz="1100" dirty="0"/>
+              <a:t>Each program (1 – 10 possible groups) will have Flash section (memory space) to store all the telemetric members that belong to this program. </a:t>
+            </a:r>
+          </a:p>
+          <a:p>
+            <a:pPr lvl="1"/>
+            <a:r>
+              <a:rPr lang="en-US" sz="1100" dirty="0"/>
+              <a:t>The Flash address limits for each program define once by calculation at a boot time process.</a:t>
+            </a:r>
+          </a:p>
+          <a:p>
+            <a:pPr lvl="1"/>
+            <a:r>
+              <a:rPr lang="en-US" sz="1100" dirty="0"/>
+              <a:t>The System Engineer will have the available memory space for each program on Flash. With this information the System Engineer shell supply the number of iterations for each program to save.  </a:t>
+            </a:r>
+            <a:endParaRPr lang="en-US" sz="1050" dirty="0"/>
+          </a:p>
+          <a:p>
+            <a:pPr lvl="1"/>
+            <a:r>
+              <a:rPr lang="en-US" sz="1100" dirty="0"/>
+              <a:t>Program header bytes: This header will be a part for each program section on the Flash. This header consist:</a:t>
+            </a:r>
+          </a:p>
+          <a:p>
+            <a:pPr lvl="2"/>
+            <a:r>
+              <a:rPr lang="en-US" sz="700" dirty="0"/>
+              <a:t> </a:t>
+            </a:r>
+            <a:r>
+              <a:rPr lang="en-US" sz="1100" dirty="0"/>
+              <a:t>Time stamp: Will indicate the latest write to Flash.</a:t>
+            </a:r>
+          </a:p>
+          <a:p>
+            <a:pPr lvl="2"/>
+            <a:r>
+              <a:rPr lang="en-US" sz="1100" dirty="0"/>
+              <a:t>Address of the last buffer to write to Flash.</a:t>
+            </a:r>
+          </a:p>
+          <a:p>
+            <a:pPr marL="0" indent="0">
+              <a:buNone/>
+            </a:pPr>
+            <a:endParaRPr lang="en-US" sz="1100" dirty="0"/>
+          </a:p>
+          <a:p>
+            <a:pPr marL="0" indent="0">
+              <a:buNone/>
+            </a:pPr>
+            <a:r>
+              <a:rPr lang="en-US" dirty="0"/>
+              <a:t>  </a:t>
+            </a:r>
+          </a:p>
+        </p:txBody>
+      </p:sp>
+      <p:sp>
+        <p:nvSpPr>
+          <p:cNvPr id="5" name="Title 4"/>
+          <p:cNvSpPr>
+            <a:spLocks noGrp="1"/>
+          </p:cNvSpPr>
+          <p:nvPr>
+            <p:ph type="title"/>
+          </p:nvPr>
+        </p:nvSpPr>
+        <p:spPr/>
+        <p:txBody>
+          <a:bodyPr/>
+          <a:lstStyle/>
+          <a:p>
+            <a:pPr algn="ctr" rtl="0"/>
+            <a:r>
+              <a:rPr lang="en-US" dirty="0"/>
+              <a:t>RT TLM </a:t>
+            </a:r>
+            <a:br>
+              <a:rPr lang="en-US" dirty="0"/>
+            </a:br>
+            <a:r>
+              <a:rPr lang="en-US" dirty="0"/>
+              <a:t>Flash – general requirements</a:t>
+            </a:r>
+          </a:p>
+        </p:txBody>
+      </p:sp>
+    </p:spTree>
+    <p:extLst>
+      <p:ext uri="{BB962C8B-B14F-4D97-AF65-F5344CB8AC3E}">
+        <p14:creationId xmlns:p14="http://schemas.microsoft.com/office/powerpoint/2010/main" val="555503669"/>
+      </p:ext>
+    </p:extLst>
+  </p:cSld>
+  <p:clrMapOvr>
+    <a:masterClrMapping/>
+  </p:clrMapOvr>
+  <p:transition/>
+</p:sld>
+</file>
+
+<file path=ppt/slides/slide5.xml><?xml version="1.0" encoding="utf-8"?>
+<p:sld xmlns:a="http://schemas.openxmlformats.org/drawingml/2006/main" xmlns:r="http://schemas.openxmlformats.org/officeDocument/2006/relationships" xmlns:p="http://schemas.openxmlformats.org/presentationml/2006/main">
+  <p:cSld>
+    <p:spTree>
+      <p:nvGrpSpPr>
+        <p:cNvPr id="1" name=""/>
+        <p:cNvGrpSpPr/>
+        <p:nvPr/>
+      </p:nvGrpSpPr>
+      <p:grpSpPr>
+        <a:xfrm>
+          <a:off x="0" y="0"/>
+          <a:ext cx="0" cy="0"/>
+          <a:chOff x="0" y="0"/>
+          <a:chExt cx="0" cy="0"/>
+        </a:xfrm>
+      </p:grpSpPr>
+      <mc:AlternateContent xmlns:mc="http://schemas.openxmlformats.org/markup-compatibility/2006">
+        <mc:Choice xmlns:a14="http://schemas.microsoft.com/office/drawing/2010/main" Requires="a14">
           <p:sp>
             <p:nvSpPr>
               <p:cNvPr id="6" name="Content Placeholder 5"/>
@@ -7037,273 +7723,31 @@
             </p:nvSpPr>
             <p:spPr>
               <a:xfrm>
-                <a:off x="179388" y="1080000"/>
-                <a:ext cx="8713787" cy="3613919"/>
+                <a:off x="179388" y="1080001"/>
+                <a:ext cx="8713787" cy="1898092"/>
               </a:xfrm>
             </p:spPr>
             <p:txBody>
               <a:bodyPr/>
               <a:lstStyle/>
               <a:p>
-                <a:endParaRPr lang="en-US" sz="1100" dirty="0" smtClean="0"/>
-              </a:p>
-              <a:p>
-                <a:r>
-                  <a:rPr lang="en-US" sz="1100" dirty="0" smtClean="0"/>
-                  <a:t>RTC shall record system status and events using read / write to internal FLASH memory in the following conditions:</a:t>
-                </a:r>
-              </a:p>
-              <a:p>
-                <a:pPr lvl="1"/>
-                <a:r>
-                  <a:rPr lang="en-US" sz="1100" dirty="0" smtClean="0"/>
-                  <a:t>Write to Flash: </a:t>
-                </a:r>
-              </a:p>
-              <a:p>
-                <a:pPr lvl="2"/>
-                <a:r>
-                  <a:rPr lang="en-US" sz="1050" dirty="0" smtClean="0"/>
-                  <a:t>Member update rate: Each telemetric member (that have Flash enable flag) will be updated and store to Flash local structure according to his rate speed.  </a:t>
-                </a:r>
-              </a:p>
-              <a:p>
-                <a:pPr lvl="2"/>
-                <a:r>
-                  <a:rPr lang="en-US" sz="1050" dirty="0" smtClean="0"/>
-                  <a:t>Block update rate: The local Flash data base will </a:t>
-                </a:r>
-                <a:r>
-                  <a:rPr lang="en-US" sz="1050" dirty="0"/>
-                  <a:t>be saved at the flash memory every </a:t>
-                </a:r>
-                <a:r>
-                  <a:rPr lang="en-US" sz="1050" dirty="0" smtClean="0"/>
-                  <a:t>t sec (where t </a:t>
-                </a:r>
-                <a:r>
-                  <a:rPr lang="en-US" sz="1050" dirty="0"/>
-                  <a:t>= time factor that is a part of the “offline parameters</a:t>
-                </a:r>
-                <a:r>
-                  <a:rPr lang="en-US" sz="1050" dirty="0" smtClean="0"/>
-                  <a:t>”) in Flash data blocks in order to read data history from Flash.</a:t>
-                </a:r>
+                <a:endParaRPr lang="en-US" sz="1100" dirty="0"/>
               </a:p>
               <a:p>
                 <a:pPr marL="914400" lvl="2" indent="0">
                   <a:buNone/>
                 </a:pPr>
-                <a14:m>
-                  <m:oMath xmlns:m="http://schemas.openxmlformats.org/officeDocument/2006/math">
-                    <m:r>
-                      <a:rPr lang="en-US" sz="1050" i="1">
-                        <a:latin typeface="Cambria Math"/>
-                      </a:rPr>
-                      <m:t>𝑛𝑢𝑚𝑏𝑒𝑟</m:t>
-                    </m:r>
-                    <m:r>
-                      <a:rPr lang="en-US" sz="1050" i="1">
-                        <a:latin typeface="Cambria Math"/>
-                      </a:rPr>
-                      <m:t> </m:t>
-                    </m:r>
-                    <m:r>
-                      <a:rPr lang="en-US" sz="1050" i="1">
-                        <a:latin typeface="Cambria Math"/>
-                      </a:rPr>
-                      <m:t>𝑜𝑓</m:t>
-                    </m:r>
-                    <m:r>
-                      <a:rPr lang="en-US" sz="1050" i="1">
-                        <a:latin typeface="Cambria Math"/>
-                      </a:rPr>
-                      <m:t> </m:t>
-                    </m:r>
-                    <m:r>
-                      <a:rPr lang="en-US" sz="1050" i="1">
-                        <a:latin typeface="Cambria Math"/>
-                      </a:rPr>
-                      <m:t>𝐹𝑙𝑎𝑠</m:t>
-                    </m:r>
-                    <m:r>
-                      <a:rPr lang="en-US" sz="1050" i="1">
-                        <a:latin typeface="Cambria Math"/>
-                      </a:rPr>
-                      <m:t>h</m:t>
-                    </m:r>
-                    <m:r>
-                      <a:rPr lang="en-US" sz="1050" i="1">
-                        <a:latin typeface="Cambria Math"/>
-                      </a:rPr>
-                      <m:t> </m:t>
-                    </m:r>
-                    <m:r>
-                      <a:rPr lang="en-US" sz="1050" i="1">
-                        <a:latin typeface="Cambria Math"/>
-                      </a:rPr>
-                      <m:t>𝑏𝑙𝑜𝑐𝑘𝑠</m:t>
-                    </m:r>
-                    <m:r>
-                      <a:rPr lang="en-US" sz="1050" i="1">
-                        <a:latin typeface="Cambria Math"/>
-                      </a:rPr>
-                      <m:t>= </m:t>
-                    </m:r>
-                    <m:f>
-                      <m:fPr>
-                        <m:ctrlPr>
-                          <a:rPr lang="en-US" sz="1050" i="1">
-                            <a:latin typeface="Cambria Math"/>
-                          </a:rPr>
-                        </m:ctrlPr>
-                      </m:fPr>
-                      <m:num>
-                        <m:r>
-                          <a:rPr lang="en-US" sz="1050" i="1">
-                            <a:latin typeface="Cambria Math"/>
-                          </a:rPr>
-                          <m:t>𝐹𝑙𝑎𝑠</m:t>
-                        </m:r>
-                        <m:r>
-                          <a:rPr lang="en-US" sz="1050" i="1">
-                            <a:latin typeface="Cambria Math"/>
-                          </a:rPr>
-                          <m:t>h</m:t>
-                        </m:r>
-                        <m:r>
-                          <a:rPr lang="en-US" sz="1050" i="1">
-                            <a:latin typeface="Cambria Math"/>
-                          </a:rPr>
-                          <m:t> </m:t>
-                        </m:r>
-                        <m:r>
-                          <a:rPr lang="en-US" sz="1050" i="1">
-                            <a:latin typeface="Cambria Math"/>
-                          </a:rPr>
-                          <m:t>𝑡𝑜𝑡𝑎𝑙</m:t>
-                        </m:r>
-                        <m:r>
-                          <a:rPr lang="en-US" sz="1050" i="1">
-                            <a:latin typeface="Cambria Math"/>
-                          </a:rPr>
-                          <m:t> </m:t>
-                        </m:r>
-                        <m:r>
-                          <a:rPr lang="en-US" sz="1050" i="1">
-                            <a:latin typeface="Cambria Math"/>
-                          </a:rPr>
-                          <m:t>𝑚𝑒𝑚𝑜𝑟𝑦</m:t>
-                        </m:r>
-                        <m:r>
-                          <a:rPr lang="en-US" sz="1050" i="1">
-                            <a:latin typeface="Cambria Math"/>
-                          </a:rPr>
-                          <m:t> </m:t>
-                        </m:r>
-                        <m:r>
-                          <a:rPr lang="en-US" sz="1050" i="1">
-                            <a:latin typeface="Cambria Math"/>
-                          </a:rPr>
-                          <m:t>𝑠𝑝𝑎𝑐𝑒</m:t>
-                        </m:r>
-                        <m:r>
-                          <a:rPr lang="en-US" sz="1050" i="1">
-                            <a:latin typeface="Cambria Math"/>
-                          </a:rPr>
-                          <m:t> </m:t>
-                        </m:r>
-                        <m:r>
-                          <a:rPr lang="en-US" sz="1050" i="1">
-                            <a:latin typeface="Cambria Math"/>
-                          </a:rPr>
-                          <m:t>𝑎𝑡</m:t>
-                        </m:r>
-                        <m:r>
-                          <a:rPr lang="en-US" sz="1050" i="1">
-                            <a:latin typeface="Cambria Math"/>
-                          </a:rPr>
-                          <m:t> </m:t>
-                        </m:r>
-                        <m:r>
-                          <a:rPr lang="en-US" sz="1050" i="1">
-                            <a:latin typeface="Cambria Math"/>
-                          </a:rPr>
-                          <m:t>𝑅𝑇𝐶</m:t>
-                        </m:r>
-                        <m:r>
-                          <a:rPr lang="en-US" sz="1050" i="1">
-                            <a:latin typeface="Cambria Math"/>
-                          </a:rPr>
-                          <m:t>.</m:t>
-                        </m:r>
-                      </m:num>
-                      <m:den>
-                        <m:r>
-                          <a:rPr lang="en-US" sz="1050" i="1">
-                            <a:latin typeface="Cambria Math"/>
-                          </a:rPr>
-                          <m:t>𝑠𝑖𝑧𝑒</m:t>
-                        </m:r>
-                        <m:r>
-                          <a:rPr lang="en-US" sz="1050" i="1">
-                            <a:latin typeface="Cambria Math"/>
-                          </a:rPr>
-                          <m:t> </m:t>
-                        </m:r>
-                        <m:r>
-                          <a:rPr lang="en-US" sz="1050" i="1">
-                            <a:latin typeface="Cambria Math"/>
-                          </a:rPr>
-                          <m:t>𝑜𝑓</m:t>
-                        </m:r>
-                        <m:r>
-                          <a:rPr lang="en-US" sz="1050" i="1">
-                            <a:latin typeface="Cambria Math"/>
-                          </a:rPr>
-                          <m:t>  </m:t>
-                        </m:r>
-                        <m:r>
-                          <a:rPr lang="en-US" sz="1050" i="1">
-                            <a:latin typeface="Cambria Math"/>
-                          </a:rPr>
-                          <m:t>𝑡𝑒𝑙𝑒𝑚𝑒𝑡𝑟𝑖𝑐</m:t>
-                        </m:r>
-                        <m:r>
-                          <a:rPr lang="en-US" sz="1050" i="1">
-                            <a:latin typeface="Cambria Math"/>
-                          </a:rPr>
-                          <m:t> </m:t>
-                        </m:r>
-                        <m:r>
-                          <a:rPr lang="en-US" sz="1050" i="1">
-                            <a:latin typeface="Cambria Math"/>
-                          </a:rPr>
-                          <m:t>𝑑𝑎𝑡𝑎</m:t>
-                        </m:r>
-                        <m:r>
-                          <a:rPr lang="en-US" sz="1050" i="1">
-                            <a:latin typeface="Cambria Math"/>
-                          </a:rPr>
-                          <m:t> </m:t>
-                        </m:r>
-                        <m:r>
-                          <a:rPr lang="en-US" sz="1050" i="1">
-                            <a:latin typeface="Cambria Math"/>
-                          </a:rPr>
-                          <m:t>𝑏𝑎𝑠𝑒</m:t>
-                        </m:r>
-                      </m:den>
-                    </m:f>
-                  </m:oMath>
-                </a14:m>
+                <a:endParaRPr lang="en-US" sz="1050" dirty="0"/>
+              </a:p>
+              <a:p>
+                <a:pPr lvl="1"/>
                 <a:r>
-                  <a:rPr lang="en-US" sz="1050" dirty="0"/>
-                  <a:t>  </a:t>
+                  <a:rPr lang="en-US" sz="1100" dirty="0"/>
+                  <a:t>Flash write speed: each telemetric groups will manage local buffer to store all the telemetric members that belong to him.  When the size of this buffer shell be:</a:t>
                 </a:r>
               </a:p>
               <a:p>
-                <a:pPr marL="914400" lvl="2" indent="0">
+                <a:pPr marL="457200" lvl="1" indent="0">
                   <a:buNone/>
                 </a:pPr>
                 <a14:m>
@@ -7313,339 +7757,157 @@
                     </m:oMathParaPr>
                     <m:oMath xmlns:m="http://schemas.openxmlformats.org/officeDocument/2006/math">
                       <m:r>
-                        <a:rPr lang="en-US" sz="1050" i="1">
-                          <a:latin typeface="Cambria Math"/>
-                        </a:rPr>
+                        <a:rPr lang="en-US" sz="1100"/>
                         <m:t>𝑆𝑖𝑧𝑒</m:t>
                       </m:r>
                       <m:r>
-                        <a:rPr lang="en-US" sz="1050" i="1">
-                          <a:latin typeface="Cambria Math"/>
-                        </a:rPr>
+                        <a:rPr lang="en-US" sz="1100"/>
+                        <m:t>=</m:t>
+                      </m:r>
+                      <m:r>
+                        <a:rPr lang="en-US" sz="1100"/>
+                        <m:t>𝑁𝑢𝑚𝑏𝑒𝑟</m:t>
+                      </m:r>
+                      <m:r>
+                        <a:rPr lang="en-US" sz="1100"/>
                         <m:t> </m:t>
                       </m:r>
                       <m:r>
-                        <a:rPr lang="en-US" sz="1050" i="1">
-                          <a:latin typeface="Cambria Math"/>
-                        </a:rPr>
+                        <a:rPr lang="en-US" sz="1100"/>
                         <m:t>𝑜𝑓</m:t>
                       </m:r>
                       <m:r>
-                        <a:rPr lang="en-US" sz="1050" i="1">
-                          <a:latin typeface="Cambria Math"/>
-                        </a:rPr>
+                        <a:rPr lang="en-US" sz="1100"/>
                         <m:t> </m:t>
                       </m:r>
                       <m:r>
-                        <a:rPr lang="en-US" sz="1050" i="1">
-                          <a:latin typeface="Cambria Math"/>
-                        </a:rPr>
-                        <m:t>𝑡𝑒𝑙𝑒𝑚𝑡𝑟𝑖𝑐</m:t>
+                        <a:rPr lang="en-US" sz="1100"/>
+                        <m:t>𝑝𝑎𝑟𝑎𝑚𝑡𝑒𝑟𝑠</m:t>
                       </m:r>
                       <m:r>
-                        <a:rPr lang="en-US" sz="1050" i="1">
-                          <a:latin typeface="Cambria Math"/>
-                        </a:rPr>
+                        <a:rPr lang="en-US" sz="1100"/>
                         <m:t> </m:t>
                       </m:r>
                       <m:r>
-                        <a:rPr lang="en-US" sz="1050" i="1">
-                          <a:latin typeface="Cambria Math"/>
-                        </a:rPr>
+                        <a:rPr lang="en-US" sz="1100"/>
+                        <m:t>𝑏𝑒𝑙𝑜𝑛𝑔</m:t>
+                      </m:r>
+                      <m:r>
+                        <a:rPr lang="en-US" sz="1100"/>
+                        <m:t> </m:t>
+                      </m:r>
+                      <m:r>
+                        <a:rPr lang="en-US" sz="1100"/>
+                        <m:t>𝑡𝑜</m:t>
+                      </m:r>
+                      <m:r>
+                        <a:rPr lang="en-US" sz="1100"/>
+                        <m:t> </m:t>
+                      </m:r>
+                      <m:r>
+                        <a:rPr lang="en-US" sz="1100"/>
+                        <m:t>𝑡</m:t>
+                      </m:r>
+                      <m:r>
+                        <a:rPr lang="en-US" sz="1100"/>
+                        <m:t>h</m:t>
+                      </m:r>
+                      <m:r>
+                        <a:rPr lang="en-US" sz="1100"/>
+                        <m:t>𝑖𝑠</m:t>
+                      </m:r>
+                      <m:r>
+                        <a:rPr lang="en-US" sz="1100"/>
+                        <m:t> </m:t>
+                      </m:r>
+                      <m:r>
+                        <a:rPr lang="en-US" sz="1100"/>
+                        <m:t>𝑝𝑟𝑜𝑔𝑟𝑎𝑚</m:t>
+                      </m:r>
+                      <m:r>
+                        <a:rPr lang="en-US" sz="1100"/>
+                        <m:t> ∗</m:t>
+                      </m:r>
+                      <m:r>
+                        <a:rPr lang="en-US" sz="1100"/>
+                        <m:t>𝐿𝑎𝑟𝑔𝑒𝑠𝑡</m:t>
+                      </m:r>
+                      <m:r>
+                        <a:rPr lang="en-US" sz="1100"/>
+                        <m:t> </m:t>
+                      </m:r>
+                      <m:r>
+                        <a:rPr lang="en-US" sz="1100"/>
                         <m:t>𝑑𝑎𝑡𝑎</m:t>
                       </m:r>
                       <m:r>
-                        <a:rPr lang="en-US" sz="1050" i="1">
-                          <a:latin typeface="Cambria Math"/>
-                        </a:rPr>
+                        <a:rPr lang="en-US" sz="1100"/>
                         <m:t> </m:t>
                       </m:r>
                       <m:r>
-                        <a:rPr lang="en-US" sz="1050" i="1">
-                          <a:latin typeface="Cambria Math"/>
-                        </a:rPr>
-                        <m:t>𝑏𝑎𝑠𝑒</m:t>
+                        <a:rPr lang="en-US" sz="1100"/>
+                        <m:t>𝑡𝑦𝑝𝑒</m:t>
                       </m:r>
                       <m:r>
-                        <a:rPr lang="en-US" sz="1050" i="1">
-                          <a:latin typeface="Cambria Math"/>
-                        </a:rPr>
-                        <m:t>≅</m:t>
-                      </m:r>
-                      <m:d>
-                        <m:dPr>
-                          <m:ctrlPr>
-                            <a:rPr lang="en-US" sz="1050" i="1">
-                              <a:latin typeface="Cambria Math"/>
-                            </a:rPr>
-                          </m:ctrlPr>
-                        </m:dPr>
-                        <m:e>
-                          <m:r>
-                            <a:rPr lang="en-US" sz="1050" i="1">
-                              <a:latin typeface="Cambria Math"/>
-                            </a:rPr>
-                            <m:t>𝑒𝑣𝑒𝑟𝑎𝑔𝑒</m:t>
-                          </m:r>
-                          <m:r>
-                            <a:rPr lang="en-US" sz="1050" i="1">
-                              <a:latin typeface="Cambria Math"/>
-                            </a:rPr>
-                            <m:t> </m:t>
-                          </m:r>
-                          <m:r>
-                            <a:rPr lang="en-US" sz="1050" i="1">
-                              <a:latin typeface="Cambria Math"/>
-                            </a:rPr>
-                            <m:t>𝑎𝑚𝑜𝑢𝑛𝑡</m:t>
-                          </m:r>
-                          <m:r>
-                            <a:rPr lang="en-US" sz="1050" i="1">
-                              <a:latin typeface="Cambria Math"/>
-                            </a:rPr>
-                            <m:t> </m:t>
-                          </m:r>
-                          <m:r>
-                            <a:rPr lang="en-US" sz="1050" i="1">
-                              <a:latin typeface="Cambria Math"/>
-                            </a:rPr>
-                            <m:t>𝑜𝑓</m:t>
-                          </m:r>
-                          <m:r>
-                            <a:rPr lang="en-US" sz="1050" i="1">
-                              <a:latin typeface="Cambria Math"/>
-                            </a:rPr>
-                            <m:t> </m:t>
-                          </m:r>
-                          <m:r>
-                            <a:rPr lang="en-US" sz="1050" i="1">
-                              <a:latin typeface="Cambria Math"/>
-                            </a:rPr>
-                            <m:t>𝑏𝑦𝑡𝑒𝑠</m:t>
-                          </m:r>
-                          <m:r>
-                            <a:rPr lang="en-US" sz="1050" i="1">
-                              <a:latin typeface="Cambria Math"/>
-                            </a:rPr>
-                            <m:t> </m:t>
-                          </m:r>
-                          <m:r>
-                            <a:rPr lang="en-US" sz="1050" i="1">
-                              <a:latin typeface="Cambria Math"/>
-                            </a:rPr>
-                            <m:t>𝑖𝑛</m:t>
-                          </m:r>
-                          <m:r>
-                            <a:rPr lang="en-US" sz="1050" i="1">
-                              <a:latin typeface="Cambria Math"/>
-                            </a:rPr>
-                            <m:t> </m:t>
-                          </m:r>
-                          <m:r>
-                            <a:rPr lang="en-US" sz="1050" i="1">
-                              <a:latin typeface="Cambria Math"/>
-                            </a:rPr>
-                            <m:t>1</m:t>
-                          </m:r>
-                          <m:r>
-                            <a:rPr lang="en-US" sz="1050" i="1">
-                              <a:latin typeface="Cambria Math"/>
-                            </a:rPr>
-                            <m:t> </m:t>
-                          </m:r>
-                          <m:r>
-                            <a:rPr lang="en-US" sz="1050" i="1">
-                              <a:latin typeface="Cambria Math"/>
-                            </a:rPr>
-                            <m:t>𝑑𝑎𝑡𝑎</m:t>
-                          </m:r>
-                          <m:r>
-                            <a:rPr lang="en-US" sz="1050" i="1">
-                              <a:latin typeface="Cambria Math"/>
-                            </a:rPr>
-                            <m:t> </m:t>
-                          </m:r>
-                          <m:r>
-                            <a:rPr lang="en-US" sz="1050" i="1">
-                              <a:latin typeface="Cambria Math"/>
-                            </a:rPr>
-                            <m:t>𝑚𝑒𝑚𝑏𝑒𝑟</m:t>
-                          </m:r>
-                          <m:r>
-                            <a:rPr lang="en-US" sz="1050" i="1">
-                              <a:latin typeface="Cambria Math"/>
-                            </a:rPr>
-                            <m:t>+</m:t>
-                          </m:r>
-                          <m:r>
-                            <a:rPr lang="en-US" sz="1050" i="1">
-                              <a:latin typeface="Cambria Math"/>
-                            </a:rPr>
-                            <m:t>3</m:t>
-                          </m:r>
-                          <m:r>
-                            <a:rPr lang="en-US" sz="1050" i="1">
-                              <a:latin typeface="Cambria Math"/>
-                            </a:rPr>
-                            <m:t> </m:t>
-                          </m:r>
-                          <m:r>
-                            <a:rPr lang="en-US" sz="1050" i="1">
-                              <a:latin typeface="Cambria Math"/>
-                            </a:rPr>
-                            <m:t>𝑐𝑜𝑛𝑓𝑖𝑔𝑢𝑟𝑎𝑡𝑖𝑜𝑛</m:t>
-                          </m:r>
-                          <m:r>
-                            <a:rPr lang="en-US" sz="1050" i="1">
-                              <a:latin typeface="Cambria Math"/>
-                            </a:rPr>
-                            <m:t> </m:t>
-                          </m:r>
-                          <m:r>
-                            <a:rPr lang="en-US" sz="1050" i="1">
-                              <a:latin typeface="Cambria Math"/>
-                            </a:rPr>
-                            <m:t>𝑏𝑦𝑡𝑒𝑠</m:t>
-                          </m:r>
-                        </m:e>
-                      </m:d>
-                      <m:r>
-                        <a:rPr lang="en-US" sz="1050" i="1">
-                          <a:latin typeface="Cambria Math"/>
-                        </a:rPr>
-                        <m:t>∗</m:t>
-                      </m:r>
-                      <m:r>
-                        <a:rPr lang="en-US" sz="1050" i="1">
-                          <a:latin typeface="Cambria Math"/>
-                        </a:rPr>
-                        <m:t>𝑛𝑢𝑚𝑏𝑒𝑟</m:t>
-                      </m:r>
-                      <m:r>
-                        <a:rPr lang="en-US" sz="1050" i="1">
-                          <a:latin typeface="Cambria Math"/>
-                        </a:rPr>
+                        <a:rPr lang="en-US" sz="1100"/>
                         <m:t> </m:t>
                       </m:r>
                       <m:r>
-                        <a:rPr lang="en-US" sz="1050" i="1">
-                          <a:latin typeface="Cambria Math"/>
-                        </a:rPr>
-                        <m:t>𝑜𝑓</m:t>
+                        <a:rPr lang="en-US" sz="1100"/>
+                        <m:t>𝑖𝑛</m:t>
                       </m:r>
                       <m:r>
-                        <a:rPr lang="en-US" sz="1050" i="1">
-                          <a:latin typeface="Cambria Math"/>
-                        </a:rPr>
+                        <a:rPr lang="en-US" sz="1100"/>
                         <m:t> </m:t>
                       </m:r>
                       <m:r>
-                        <a:rPr lang="en-US" sz="1050" i="1">
-                          <a:latin typeface="Cambria Math"/>
-                        </a:rPr>
-                        <m:t>𝑚𝑒𝑚𝑏𝑒𝑟𝑠</m:t>
+                        <a:rPr lang="en-US" sz="1100"/>
+                        <m:t>𝑏𝑦𝑡𝑒𝑠</m:t>
                       </m:r>
                       <m:r>
-                        <a:rPr lang="en-US" sz="1050" i="1">
-                          <a:latin typeface="Cambria Math"/>
-                        </a:rPr>
-                        <m:t>. </m:t>
+                        <a:rPr lang="en-US" sz="1100"/>
+                        <m:t>.</m:t>
                       </m:r>
                     </m:oMath>
                   </m:oMathPara>
                 </a14:m>
-                <a:endParaRPr lang="en-US" sz="1050" dirty="0"/>
-              </a:p>
-              <a:p>
-                <a:pPr marL="914400" lvl="2" indent="0">
-                  <a:buNone/>
-                </a:pPr>
-                <a:endParaRPr lang="en-US" sz="1050" dirty="0" smtClean="0"/>
-              </a:p>
-              <a:p>
-                <a:pPr lvl="2"/>
-                <a:r>
-                  <a:rPr lang="en-US" sz="1050" dirty="0" smtClean="0"/>
-                  <a:t>Flash block header: This header will be added to each Flash block that will write be to Flash. This header consist: number of members in the block.</a:t>
-                </a:r>
-                <a:endParaRPr lang="en-US" sz="1000" dirty="0"/>
+                <a:endParaRPr lang="en-US" sz="1100" dirty="0"/>
               </a:p>
               <a:p>
                 <a:pPr lvl="1"/>
                 <a:r>
-                  <a:rPr lang="en-US" sz="1100" dirty="0" smtClean="0"/>
-                  <a:t>Read from Flash: The RT viewer will be able to read and present data from Flash at any given time and if the user checked the option to read data from Flash at the RT viewer interface.</a:t>
+                  <a:rPr lang="en-US" sz="1100" dirty="0"/>
+                  <a:t>Flash write rate: This rate will indicate the time interval to store the entire programs contents to Flash. This time will be configurable throw the offline parameters.</a:t>
                 </a:r>
               </a:p>
               <a:p>
                 <a:pPr lvl="1"/>
                 <a:r>
-                  <a:rPr lang="en-US" sz="1100" dirty="0" smtClean="0"/>
-                  <a:t>The </a:t>
+                  <a:rPr lang="en-US" sz="1100" dirty="0"/>
+                  <a:t>Write to Flash HBS API: the methods that will handle write to Flash shall be: </a:t>
                 </a:r>
                 <a:r>
-                  <a:rPr lang="en-US" sz="1100" dirty="0"/>
-                  <a:t>write </a:t>
-                </a:r>
-                <a:r>
-                  <a:rPr lang="en-US" sz="1100" dirty="0" smtClean="0"/>
-                  <a:t> to flash operations </a:t>
-                </a:r>
-                <a:r>
-                  <a:rPr lang="en-US" sz="1100" dirty="0"/>
-                  <a:t>will </a:t>
-                </a:r>
-                <a:r>
-                  <a:rPr lang="en-US" sz="1100" dirty="0" smtClean="0"/>
-                  <a:t>be protected in thread safe (this protection will be a handle by HBS SW layer).</a:t>
-                </a:r>
-              </a:p>
-              <a:p>
-                <a:pPr lvl="1"/>
-                <a:r>
-                  <a:rPr lang="en-US" sz="1100" dirty="0" smtClean="0"/>
-                  <a:t>HBS methods that will handle read / write from Flash are: </a:t>
-                </a:r>
-                <a:r>
-                  <a:rPr lang="en-US" sz="1100" dirty="0" err="1" smtClean="0"/>
+                  <a:rPr lang="en-US" sz="1100" dirty="0" err="1"/>
                   <a:t>p_CDS_write</a:t>
-                </a:r>
-                <a:r>
-                  <a:rPr lang="en-US" sz="1100" dirty="0" smtClean="0"/>
-                  <a:t>, </a:t>
-                </a:r>
-                <a:r>
-                  <a:rPr lang="en-US" sz="1100" dirty="0" err="1" smtClean="0"/>
-                  <a:t>p_CDS_read</a:t>
                 </a:r>
                 <a:r>
                   <a:rPr lang="en-US" sz="1100" dirty="0"/>
                   <a:t>.</a:t>
-                </a:r>
-                <a:r>
-                  <a:rPr lang="en-US" sz="1100" dirty="0" smtClean="0"/>
-                  <a:t> </a:t>
                 </a:r>
               </a:p>
               <a:p>
                 <a:pPr marL="0" indent="0">
                   <a:buNone/>
                 </a:pPr>
-                <a:endParaRPr lang="en-US" sz="1100" dirty="0" smtClean="0"/>
-              </a:p>
-              <a:p>
-                <a:pPr marL="0" indent="0">
-                  <a:buNone/>
-                </a:pPr>
                 <a:r>
-                  <a:rPr lang="en-US" dirty="0" smtClean="0"/>
+                  <a:rPr lang="en-US" dirty="0"/>
                   <a:t>  </a:t>
                 </a:r>
               </a:p>
             </p:txBody>
           </p:sp>
         </mc:Choice>
-        <mc:Fallback xmlns="">
+        <mc:Fallback>
           <p:sp>
             <p:nvSpPr>
               <p:cNvPr id="6" name="Content Placeholder 5"/>
@@ -7658,10 +7920,10 @@
             </p:nvSpPr>
             <p:spPr>
               <a:xfrm>
-                <a:off x="179388" y="1080000"/>
-                <a:ext cx="8713787" cy="3613919"/>
+                <a:off x="179388" y="1080001"/>
+                <a:ext cx="8713787" cy="1898092"/>
               </a:xfrm>
-              <a:blipFill rotWithShape="1">
+              <a:blipFill>
                 <a:blip r:embed="rId2"/>
                 <a:stretch>
                   <a:fillRect/>
@@ -7700,17 +7962,16 @@
           <a:p>
             <a:pPr algn="ctr" rtl="0"/>
             <a:r>
-              <a:rPr lang="en-US" dirty="0" smtClean="0"/>
+              <a:rPr lang="en-US" dirty="0"/>
               <a:t>RT TLM </a:t>
             </a:r>
             <a:br>
-              <a:rPr lang="en-US" dirty="0" smtClean="0"/>
+              <a:rPr lang="en-US" dirty="0"/>
             </a:br>
             <a:r>
-              <a:rPr lang="en-US" dirty="0" smtClean="0"/>
-              <a:t>Flash / current data requirements</a:t>
-            </a:r>
-            <a:endParaRPr lang="en-US" dirty="0"/>
+              <a:rPr lang="en-US" dirty="0"/>
+              <a:t>Flash – Read / write requirements</a:t>
+            </a:r>
           </a:p>
         </p:txBody>
       </p:sp>
@@ -7722,8 +7983,8 @@
         </p:nvSpPr>
         <p:spPr>
           <a:xfrm>
-            <a:off x="4140692" y="1013460"/>
-            <a:ext cx="928459" cy="369332"/>
+            <a:off x="3401066" y="1013460"/>
+            <a:ext cx="1668085" cy="369332"/>
           </a:xfrm>
           <a:prstGeom prst="rect">
             <a:avLst/>
@@ -7737,24 +7998,25 @@
           <a:lstStyle/>
           <a:p>
             <a:r>
-              <a:rPr lang="en-US" dirty="0" smtClean="0">
+              <a:rPr lang="en-US" dirty="0">
                 <a:solidFill>
                   <a:schemeClr val="accent6"/>
                 </a:solidFill>
               </a:rPr>
-              <a:t>FLASH</a:t>
-            </a:r>
-            <a:endParaRPr lang="en-US" dirty="0">
-              <a:solidFill>
-                <a:schemeClr val="accent6"/>
-              </a:solidFill>
-            </a:endParaRPr>
+              <a:t>FLASH - Write</a:t>
+            </a:r>
           </a:p>
         </p:txBody>
       </p:sp>
       <p:sp>
         <p:nvSpPr>
-          <p:cNvPr id="7" name="Content Placeholder 5"/>
+          <p:cNvPr id="9" name="Content Placeholder 5">
+            <a:extLst>
+              <a:ext uri="{FF2B5EF4-FFF2-40B4-BE49-F238E27FC236}">
+                <a16:creationId xmlns:a16="http://schemas.microsoft.com/office/drawing/2014/main" id="{2C9EF6B2-6107-4C59-9419-487492911BF1}"/>
+              </a:ext>
+            </a:extLst>
+          </p:cNvPr>
           <p:cNvSpPr txBox="1">
             <a:spLocks/>
           </p:cNvSpPr>
@@ -7762,8 +8024,8 @@
         </p:nvSpPr>
         <p:spPr bwMode="auto">
           <a:xfrm>
-            <a:off x="248027" y="4968239"/>
-            <a:ext cx="8713787" cy="1584961"/>
+            <a:off x="215106" y="3413966"/>
+            <a:ext cx="8713787" cy="1898092"/>
           </a:xfrm>
           <a:prstGeom prst="rect">
             <a:avLst/>
@@ -7942,43 +8204,48 @@
             </a:lvl9pPr>
           </a:lstStyle>
           <a:p>
-            <a:endParaRPr lang="en-US" sz="1100" kern="0" dirty="0" smtClean="0"/>
-          </a:p>
-          <a:p>
-            <a:r>
-              <a:rPr lang="en-US" sz="1050" b="0" dirty="0"/>
-              <a:t>RTC shall save current condition of the telemetric data base to be able to read upon user request from the RT viewer interface at any given time. The members that will be save have to be visually enable flag.</a:t>
-            </a:r>
-          </a:p>
-          <a:p>
-            <a:pPr marL="285750" lvl="1">
-              <a:buFontTx/>
-              <a:buBlip>
-                <a:blip r:embed="rId3"/>
-              </a:buBlip>
-            </a:pPr>
-            <a:r>
-              <a:rPr lang="en-US" sz="1050" dirty="0"/>
-              <a:t>Read current data: The RT viewer will be able to read and present current data at any given time and if the user checked the option to read current data at the RT viewer interface.</a:t>
-            </a:r>
-          </a:p>
-          <a:p>
-            <a:pPr marL="285750" lvl="1">
-              <a:buFontTx/>
-              <a:buBlip>
-                <a:blip r:embed="rId3"/>
-              </a:buBlip>
-            </a:pPr>
-            <a:endParaRPr lang="en-US" sz="1100" b="1" kern="0" dirty="0" smtClean="0">
-              <a:ea typeface="+mn-ea"/>
-            </a:endParaRPr>
+            <a:pPr lvl="1"/>
+            <a:endParaRPr lang="en-US" sz="1100" kern="0" dirty="0"/>
+          </a:p>
+          <a:p>
+            <a:pPr lvl="1"/>
+            <a:endParaRPr lang="en-US" sz="1100" kern="0" dirty="0"/>
+          </a:p>
+          <a:p>
+            <a:pPr lvl="1"/>
+            <a:r>
+              <a:rPr lang="en-US" sz="1100" kern="0" dirty="0"/>
+              <a:t>Read from Flash: The RT viewer shall be read all programs contents upon user request from RT viewer. The user shall define to read contents from Flash by select this options throw RT Viewer</a:t>
+            </a:r>
+          </a:p>
+          <a:p>
+            <a:pPr lvl="1"/>
+            <a:r>
+              <a:rPr lang="en-US" sz="1100" kern="0" dirty="0"/>
+              <a:t>The write  to flash operations will be protected in thread safe (this protection will be a handle by HBS SW layer).</a:t>
+            </a:r>
+          </a:p>
+          <a:p>
+            <a:pPr lvl="1"/>
+            <a:r>
+              <a:rPr lang="en-US" sz="1100" dirty="0"/>
+              <a:t>Read from Flash HBS API: the methods that will handle read from Flash shall be: </a:t>
+            </a:r>
+            <a:r>
+              <a:rPr lang="en-US" sz="1100" dirty="0" err="1"/>
+              <a:t>p_CDS_read</a:t>
+            </a:r>
+            <a:r>
+              <a:rPr lang="en-US" sz="1100" dirty="0"/>
+              <a:t>.</a:t>
+            </a:r>
           </a:p>
           <a:p>
             <a:pPr marL="0" indent="0">
               <a:buFontTx/>
               <a:buNone/>
             </a:pPr>
-            <a:endParaRPr lang="en-US" sz="1100" kern="0" dirty="0" smtClean="0"/>
+            <a:endParaRPr lang="en-US" sz="1100" kern="0" dirty="0"/>
           </a:p>
           <a:p>
             <a:pPr marL="0" indent="0">
@@ -7986,7 +8253,7 @@
               <a:buNone/>
             </a:pPr>
             <a:r>
-              <a:rPr lang="en-US" kern="0" dirty="0" smtClean="0"/>
+              <a:rPr lang="en-US" kern="0" dirty="0"/>
               <a:t>  </a:t>
             </a:r>
           </a:p>
@@ -7994,14 +8261,20 @@
       </p:sp>
       <p:sp>
         <p:nvSpPr>
-          <p:cNvPr id="8" name="TextBox 7"/>
+          <p:cNvPr id="10" name="TextBox 9">
+            <a:extLst>
+              <a:ext uri="{FF2B5EF4-FFF2-40B4-BE49-F238E27FC236}">
+                <a16:creationId xmlns:a16="http://schemas.microsoft.com/office/drawing/2014/main" id="{37FA1E4B-C19E-4B77-BB79-41DEDC2FDA98}"/>
+              </a:ext>
+            </a:extLst>
+          </p:cNvPr>
           <p:cNvSpPr txBox="1"/>
           <p:nvPr/>
         </p:nvSpPr>
         <p:spPr>
           <a:xfrm>
-            <a:off x="3871387" y="4783573"/>
-            <a:ext cx="1467068" cy="369332"/>
+            <a:off x="3401066" y="3514417"/>
+            <a:ext cx="1685078" cy="369332"/>
           </a:xfrm>
           <a:prstGeom prst="rect">
             <a:avLst/>
@@ -8014,27 +8287,21 @@
           </a:bodyPr>
           <a:lstStyle/>
           <a:p>
-            <a:pPr algn="r" rtl="0"/>
-            <a:r>
-              <a:rPr lang="en-US" dirty="0" smtClean="0">
+            <a:r>
+              <a:rPr lang="en-US" dirty="0">
                 <a:solidFill>
                   <a:schemeClr val="accent6"/>
                 </a:solidFill>
               </a:rPr>
-              <a:t>Current data</a:t>
-            </a:r>
-            <a:endParaRPr lang="en-US" dirty="0">
-              <a:solidFill>
-                <a:schemeClr val="accent6"/>
-              </a:solidFill>
-            </a:endParaRPr>
+              <a:t>FLASH - Read</a:t>
+            </a:r>
           </a:p>
         </p:txBody>
       </p:sp>
     </p:spTree>
     <p:extLst>
       <p:ext uri="{BB962C8B-B14F-4D97-AF65-F5344CB8AC3E}">
-        <p14:creationId xmlns:p14="http://schemas.microsoft.com/office/powerpoint/2010/main" val="555503669"/>
+        <p14:creationId xmlns:p14="http://schemas.microsoft.com/office/powerpoint/2010/main" val="483978099"/>
       </p:ext>
     </p:extLst>
   </p:cSld>
@@ -8042,234 +8309,6 @@
     <a:masterClrMapping/>
   </p:clrMapOvr>
   <p:transition/>
-  <p:timing>
-    <p:tnLst>
-      <p:par>
-        <p:cTn id="1" dur="indefinite" restart="never" nodeType="tmRoot"/>
-      </p:par>
-    </p:tnLst>
-  </p:timing>
-</p:sld>
-</file>
-
-<file path=ppt/slides/slide5.xml><?xml version="1.0" encoding="utf-8"?>
-<p:sld xmlns:a="http://schemas.openxmlformats.org/drawingml/2006/main" xmlns:r="http://schemas.openxmlformats.org/officeDocument/2006/relationships" xmlns:p="http://schemas.openxmlformats.org/presentationml/2006/main">
-  <p:cSld>
-    <p:spTree>
-      <p:nvGrpSpPr>
-        <p:cNvPr id="1" name=""/>
-        <p:cNvGrpSpPr/>
-        <p:nvPr/>
-      </p:nvGrpSpPr>
-      <p:grpSpPr>
-        <a:xfrm>
-          <a:off x="0" y="0"/>
-          <a:ext cx="0" cy="0"/>
-          <a:chOff x="0" y="0"/>
-          <a:chExt cx="0" cy="0"/>
-        </a:xfrm>
-      </p:grpSpPr>
-      <p:sp>
-        <p:nvSpPr>
-          <p:cNvPr id="5" name="Title 4"/>
-          <p:cNvSpPr>
-            <a:spLocks noGrp="1"/>
-          </p:cNvSpPr>
-          <p:nvPr>
-            <p:ph type="title"/>
-          </p:nvPr>
-        </p:nvSpPr>
-        <p:spPr/>
-        <p:txBody>
-          <a:bodyPr/>
-          <a:lstStyle/>
-          <a:p>
-            <a:pPr algn="ctr" rtl="0"/>
-            <a:r>
-              <a:rPr lang="en-US" dirty="0" smtClean="0"/>
-              <a:t>RT TLM </a:t>
-            </a:r>
-            <a:br>
-              <a:rPr lang="en-US" dirty="0" smtClean="0"/>
-            </a:br>
-            <a:r>
-              <a:rPr lang="en-US" dirty="0" smtClean="0"/>
-              <a:t>RT viewer requirements</a:t>
-            </a:r>
-            <a:endParaRPr lang="en-US" dirty="0"/>
-          </a:p>
-        </p:txBody>
-      </p:sp>
-      <p:sp>
-        <p:nvSpPr>
-          <p:cNvPr id="2" name="Content Placeholder 1"/>
-          <p:cNvSpPr>
-            <a:spLocks noGrp="1"/>
-          </p:cNvSpPr>
-          <p:nvPr>
-            <p:ph idx="1"/>
-          </p:nvPr>
-        </p:nvSpPr>
-        <p:spPr/>
-        <p:txBody>
-          <a:bodyPr/>
-          <a:lstStyle/>
-          <a:p>
-            <a:r>
-              <a:rPr lang="en-US" sz="1300" dirty="0" smtClean="0"/>
-              <a:t>The RT viewer shell present telemetric data from upon user request at any given time from 3 different sources:</a:t>
-            </a:r>
-          </a:p>
-          <a:p>
-            <a:pPr lvl="1"/>
-            <a:r>
-              <a:rPr lang="en-US" sz="1050" dirty="0" smtClean="0"/>
-              <a:t>Current data:  Current condition of the RTC telemetric members. </a:t>
-            </a:r>
-          </a:p>
-          <a:p>
-            <a:pPr lvl="1"/>
-            <a:r>
-              <a:rPr lang="en-US" sz="1050" dirty="0" smtClean="0"/>
-              <a:t>Flash data: All Flash blocks that had been written to Flash (from latest to oldest).</a:t>
-            </a:r>
-          </a:p>
-          <a:p>
-            <a:pPr lvl="1"/>
-            <a:r>
-              <a:rPr lang="en-US" sz="1050" dirty="0" smtClean="0"/>
-              <a:t>File: raw data that had been previous stored (format of text file).</a:t>
-            </a:r>
-          </a:p>
-          <a:p>
-            <a:r>
-              <a:rPr lang="en-US" dirty="0"/>
-              <a:t> </a:t>
-            </a:r>
-            <a:r>
-              <a:rPr lang="en-US" sz="1300" dirty="0" smtClean="0"/>
-              <a:t>The RT viewer shell present the telemetric data at the following way:</a:t>
-            </a:r>
-          </a:p>
-          <a:p>
-            <a:pPr lvl="1"/>
-            <a:r>
-              <a:rPr lang="en-US" sz="1050" dirty="0" smtClean="0"/>
-              <a:t>Table of all members: This table will consist all telemetric members information one after one. This data can be view at:</a:t>
-            </a:r>
-          </a:p>
-          <a:p>
-            <a:pPr lvl="2"/>
-            <a:r>
-              <a:rPr lang="en-US" sz="1050" dirty="0" smtClean="0"/>
-              <a:t>Sort values: The user will be able to sort those data from low to high, low to high or group them by RTC module.</a:t>
-            </a:r>
-          </a:p>
-          <a:p>
-            <a:pPr lvl="2"/>
-            <a:r>
-              <a:rPr lang="en-US" sz="1050" dirty="0" smtClean="0"/>
-              <a:t>Data view: The user will be able to view members data by bytes or by original data values.</a:t>
-            </a:r>
-          </a:p>
-          <a:p>
-            <a:pPr lvl="1"/>
-            <a:r>
-              <a:rPr lang="en-US" sz="1050" dirty="0" smtClean="0"/>
-              <a:t>Visual way: The user will able to search after data member by his name or index and by his group. Then the RT viewer shell present for this selected member a 2D figure and  table of results by time stamp.</a:t>
-            </a:r>
-          </a:p>
-          <a:p>
-            <a:r>
-              <a:rPr lang="en-US" sz="1300" b="1" dirty="0" smtClean="0">
-                <a:ea typeface="+mn-ea"/>
-              </a:rPr>
-              <a:t> The </a:t>
-            </a:r>
-            <a:r>
-              <a:rPr lang="en-US" sz="1300" b="1" dirty="0">
-                <a:ea typeface="+mn-ea"/>
-              </a:rPr>
-              <a:t>RT viewer shall present telemetric members by his names:</a:t>
-            </a:r>
-          </a:p>
-          <a:p>
-            <a:pPr lvl="1"/>
-            <a:r>
-              <a:rPr lang="en-US" sz="1050" dirty="0" smtClean="0"/>
-              <a:t>The telemetric members names will be read from generated file. This file generate by 3d application. </a:t>
-            </a:r>
-          </a:p>
-          <a:p>
-            <a:r>
-              <a:rPr lang="en-US" sz="1250" dirty="0"/>
-              <a:t> </a:t>
-            </a:r>
-            <a:r>
-              <a:rPr lang="en-US" sz="1250" dirty="0" smtClean="0"/>
-              <a:t>The RT viewer shall saved output files:</a:t>
-            </a:r>
-          </a:p>
-          <a:p>
-            <a:pPr lvl="1"/>
-            <a:r>
-              <a:rPr lang="en-US" sz="1050" dirty="0" smtClean="0"/>
-              <a:t>Upon user request the RT viewer shell generate the following output files:</a:t>
-            </a:r>
-          </a:p>
-          <a:p>
-            <a:pPr lvl="2"/>
-            <a:r>
-              <a:rPr lang="en-US" sz="1050" dirty="0"/>
-              <a:t>Table of all </a:t>
-            </a:r>
-            <a:r>
-              <a:rPr lang="en-US" sz="1050" dirty="0" smtClean="0"/>
-              <a:t>members – At text file.</a:t>
-            </a:r>
-          </a:p>
-          <a:p>
-            <a:pPr lvl="2"/>
-            <a:r>
-              <a:rPr lang="en-US" sz="1050" dirty="0" smtClean="0"/>
-              <a:t>Raw data of the incoming data.</a:t>
-            </a:r>
-          </a:p>
-          <a:p>
-            <a:pPr lvl="2"/>
-            <a:r>
-              <a:rPr lang="en-US" sz="1050" dirty="0" smtClean="0"/>
-              <a:t>Picture (format *.jpg) of the 2D figure.  </a:t>
-            </a:r>
-            <a:endParaRPr lang="en-US" sz="1050" dirty="0"/>
-          </a:p>
-          <a:p>
-            <a:pPr lvl="1"/>
-            <a:endParaRPr lang="en-US" dirty="0" smtClean="0"/>
-          </a:p>
-          <a:p>
-            <a:endParaRPr lang="en-US" dirty="0"/>
-          </a:p>
-        </p:txBody>
-      </p:sp>
-    </p:spTree>
-    <p:extLst>
-      <p:ext uri="{BB962C8B-B14F-4D97-AF65-F5344CB8AC3E}">
-        <p14:creationId xmlns:p14="http://schemas.microsoft.com/office/powerpoint/2010/main" val="2212492260"/>
-      </p:ext>
-    </p:extLst>
-  </p:cSld>
-  <p:clrMapOvr>
-    <a:masterClrMapping/>
-  </p:clrMapOvr>
-  <p:transition/>
-  <p:timing>
-    <p:tnLst>
-      <p:par>
-        <p:cTn id="1" dur="indefinite" restart="never" nodeType="tmRoot"/>
-      </p:par>
-    </p:tnLst>
-  </p:timing>
 </p:sld>
 </file>
 
@@ -8307,17 +8346,436 @@
           <a:p>
             <a:pPr algn="ctr" rtl="0"/>
             <a:r>
-              <a:rPr lang="en-US" dirty="0" smtClean="0"/>
+              <a:rPr lang="en-US" sz="1400" dirty="0"/>
+              <a:t>Telemetric SW flow</a:t>
+            </a:r>
+            <a:br>
+              <a:rPr lang="en-US" sz="1400" dirty="0"/>
+            </a:br>
+            <a:r>
+              <a:rPr lang="en-US" sz="1400" dirty="0"/>
+              <a:t>Flash write process</a:t>
+            </a:r>
+          </a:p>
+        </p:txBody>
+      </p:sp>
+      <p:pic>
+        <p:nvPicPr>
+          <p:cNvPr id="2051" name="Picture 3" descr="C:\Software_projects\Elbit\ElbitMalat\Telemetric\DR\Flow charts\Write process.jpg"/>
+          <p:cNvPicPr>
+            <a:picLocks noChangeAspect="1" noChangeArrowheads="1"/>
+          </p:cNvPicPr>
+          <p:nvPr/>
+        </p:nvPicPr>
+        <p:blipFill>
+          <a:blip r:embed="rId2">
+            <a:extLst>
+              <a:ext uri="{28A0092B-C50C-407E-A947-70E740481C1C}">
+                <a14:useLocalDpi xmlns:a14="http://schemas.microsoft.com/office/drawing/2010/main" val="0"/>
+              </a:ext>
+            </a:extLst>
+          </a:blip>
+          <a:srcRect/>
+          <a:stretch>
+            <a:fillRect/>
+          </a:stretch>
+        </p:blipFill>
+        <p:spPr bwMode="auto">
+          <a:xfrm>
+            <a:off x="-18694" y="993485"/>
+            <a:ext cx="9162694" cy="5475553"/>
+          </a:xfrm>
+          <a:prstGeom prst="rect">
+            <a:avLst/>
+          </a:prstGeom>
+          <a:noFill/>
+          <a:extLst>
+            <a:ext uri="{909E8E84-426E-40DD-AFC4-6F175D3DCCD1}">
+              <a14:hiddenFill xmlns:a14="http://schemas.microsoft.com/office/drawing/2010/main">
+                <a:solidFill>
+                  <a:srgbClr val="FFFFFF"/>
+                </a:solidFill>
+              </a14:hiddenFill>
+            </a:ext>
+          </a:extLst>
+        </p:spPr>
+      </p:pic>
+    </p:spTree>
+    <p:extLst>
+      <p:ext uri="{BB962C8B-B14F-4D97-AF65-F5344CB8AC3E}">
+        <p14:creationId xmlns:p14="http://schemas.microsoft.com/office/powerpoint/2010/main" val="1614533741"/>
+      </p:ext>
+    </p:extLst>
+  </p:cSld>
+  <p:clrMapOvr>
+    <a:masterClrMapping/>
+  </p:clrMapOvr>
+  <p:transition/>
+</p:sld>
+</file>
+
+<file path=ppt/slides/slide7.xml><?xml version="1.0" encoding="utf-8"?>
+<p:sld xmlns:a="http://schemas.openxmlformats.org/drawingml/2006/main" xmlns:r="http://schemas.openxmlformats.org/officeDocument/2006/relationships" xmlns:p="http://schemas.openxmlformats.org/presentationml/2006/main">
+  <p:cSld>
+    <p:spTree>
+      <p:nvGrpSpPr>
+        <p:cNvPr id="1" name=""/>
+        <p:cNvGrpSpPr/>
+        <p:nvPr/>
+      </p:nvGrpSpPr>
+      <p:grpSpPr>
+        <a:xfrm>
+          <a:off x="0" y="0"/>
+          <a:ext cx="0" cy="0"/>
+          <a:chOff x="0" y="0"/>
+          <a:chExt cx="0" cy="0"/>
+        </a:xfrm>
+      </p:grpSpPr>
+      <p:sp>
+        <p:nvSpPr>
+          <p:cNvPr id="6" name="Content Placeholder 5"/>
+          <p:cNvSpPr>
+            <a:spLocks noGrp="1"/>
+          </p:cNvSpPr>
+          <p:nvPr>
+            <p:ph idx="1"/>
+          </p:nvPr>
+        </p:nvSpPr>
+        <p:spPr>
+          <a:xfrm>
+            <a:off x="179388" y="1080001"/>
+            <a:ext cx="8713787" cy="1168250"/>
+          </a:xfrm>
+        </p:spPr>
+        <p:txBody>
+          <a:bodyPr/>
+          <a:lstStyle/>
+          <a:p>
+            <a:endParaRPr lang="en-US" sz="1100" dirty="0"/>
+          </a:p>
+          <a:p>
+            <a:r>
+              <a:rPr lang="en-US" sz="1100" dirty="0"/>
+              <a:t>RTC shall record current system data and present it in RT viewer upon user request and based on the following conditions:</a:t>
+            </a:r>
+          </a:p>
+          <a:p>
+            <a:pPr lvl="1"/>
+            <a:r>
+              <a:rPr lang="en-US" sz="1100" dirty="0"/>
+              <a:t>The local buffers that shall be use by the Flash mechanism shall be able to present via the RT viewer upon user selection on any given time. The user shall select this option on the RT viewer. </a:t>
+            </a:r>
+          </a:p>
+          <a:p>
+            <a:pPr lvl="1"/>
+            <a:r>
+              <a:rPr lang="en-US" sz="1100" dirty="0"/>
+              <a:t>Upon any given read the telemetric data the timestamp shall be read as well . </a:t>
+            </a:r>
+          </a:p>
+          <a:p>
+            <a:pPr marL="0" indent="0">
+              <a:buNone/>
+            </a:pPr>
+            <a:endParaRPr lang="en-US" sz="1100" dirty="0"/>
+          </a:p>
+          <a:p>
+            <a:pPr marL="0" indent="0">
+              <a:buNone/>
+            </a:pPr>
+            <a:r>
+              <a:rPr lang="en-US" dirty="0"/>
+              <a:t>  </a:t>
+            </a:r>
+          </a:p>
+        </p:txBody>
+      </p:sp>
+      <p:sp>
+        <p:nvSpPr>
+          <p:cNvPr id="5" name="Title 4"/>
+          <p:cNvSpPr>
+            <a:spLocks noGrp="1"/>
+          </p:cNvSpPr>
+          <p:nvPr>
+            <p:ph type="title"/>
+          </p:nvPr>
+        </p:nvSpPr>
+        <p:spPr/>
+        <p:txBody>
+          <a:bodyPr/>
+          <a:lstStyle/>
+          <a:p>
+            <a:pPr algn="ctr" rtl="0"/>
+            <a:r>
+              <a:rPr lang="en-US" dirty="0"/>
               <a:t>RT TLM </a:t>
             </a:r>
             <a:br>
-              <a:rPr lang="en-US" dirty="0" smtClean="0"/>
+              <a:rPr lang="en-US" dirty="0"/>
             </a:br>
             <a:r>
-              <a:rPr lang="en-US" dirty="0" smtClean="0"/>
+              <a:rPr lang="en-US" sz="2100" dirty="0"/>
+              <a:t>Telemetric current state - requirements</a:t>
+            </a:r>
+          </a:p>
+        </p:txBody>
+      </p:sp>
+    </p:spTree>
+    <p:extLst>
+      <p:ext uri="{BB962C8B-B14F-4D97-AF65-F5344CB8AC3E}">
+        <p14:creationId xmlns:p14="http://schemas.microsoft.com/office/powerpoint/2010/main" val="1488263557"/>
+      </p:ext>
+    </p:extLst>
+  </p:cSld>
+  <p:clrMapOvr>
+    <a:masterClrMapping/>
+  </p:clrMapOvr>
+  <p:transition/>
+</p:sld>
+</file>
+
+<file path=ppt/slides/slide8.xml><?xml version="1.0" encoding="utf-8"?>
+<p:sld xmlns:a="http://schemas.openxmlformats.org/drawingml/2006/main" xmlns:r="http://schemas.openxmlformats.org/officeDocument/2006/relationships" xmlns:p="http://schemas.openxmlformats.org/presentationml/2006/main">
+  <p:cSld>
+    <p:spTree>
+      <p:nvGrpSpPr>
+        <p:cNvPr id="1" name=""/>
+        <p:cNvGrpSpPr/>
+        <p:nvPr/>
+      </p:nvGrpSpPr>
+      <p:grpSpPr>
+        <a:xfrm>
+          <a:off x="0" y="0"/>
+          <a:ext cx="0" cy="0"/>
+          <a:chOff x="0" y="0"/>
+          <a:chExt cx="0" cy="0"/>
+        </a:xfrm>
+      </p:grpSpPr>
+      <p:sp>
+        <p:nvSpPr>
+          <p:cNvPr id="5" name="Title 4"/>
+          <p:cNvSpPr>
+            <a:spLocks noGrp="1"/>
+          </p:cNvSpPr>
+          <p:nvPr>
+            <p:ph type="title"/>
+          </p:nvPr>
+        </p:nvSpPr>
+        <p:spPr/>
+        <p:txBody>
+          <a:bodyPr/>
+          <a:lstStyle/>
+          <a:p>
+            <a:pPr algn="ctr" rtl="0"/>
+            <a:r>
+              <a:rPr lang="en-US" dirty="0"/>
+              <a:t>RT TLM </a:t>
+            </a:r>
+            <a:br>
+              <a:rPr lang="en-US" dirty="0"/>
+            </a:br>
+            <a:r>
+              <a:rPr lang="en-US" dirty="0"/>
+              <a:t>RT viewer requirements</a:t>
+            </a:r>
+          </a:p>
+        </p:txBody>
+      </p:sp>
+      <p:sp>
+        <p:nvSpPr>
+          <p:cNvPr id="2" name="Content Placeholder 1"/>
+          <p:cNvSpPr>
+            <a:spLocks noGrp="1"/>
+          </p:cNvSpPr>
+          <p:nvPr>
+            <p:ph idx="1"/>
+          </p:nvPr>
+        </p:nvSpPr>
+        <p:spPr/>
+        <p:txBody>
+          <a:bodyPr/>
+          <a:lstStyle/>
+          <a:p>
+            <a:r>
+              <a:rPr lang="en-US" sz="1300" dirty="0"/>
+              <a:t>The RT viewer shell present telemetric data from upon user request at any given time from 3 different sources:</a:t>
+            </a:r>
+          </a:p>
+          <a:p>
+            <a:pPr lvl="1"/>
+            <a:r>
+              <a:rPr lang="en-US" sz="1050" dirty="0"/>
+              <a:t>Current data:  Current condition of the RTC telemetric members. </a:t>
+            </a:r>
+          </a:p>
+          <a:p>
+            <a:pPr lvl="1"/>
+            <a:r>
+              <a:rPr lang="en-US" sz="1050" dirty="0"/>
+              <a:t>Flash data: All Flash blocks that had been written to Flash (from latest to oldest).</a:t>
+            </a:r>
+          </a:p>
+          <a:p>
+            <a:pPr lvl="1"/>
+            <a:r>
+              <a:rPr lang="en-US" sz="1050" dirty="0"/>
+              <a:t>File: raw data that had been previous stored (format of text file).</a:t>
+            </a:r>
+          </a:p>
+          <a:p>
+            <a:r>
+              <a:rPr lang="en-US" dirty="0"/>
+              <a:t> </a:t>
+            </a:r>
+            <a:r>
+              <a:rPr lang="en-US" sz="1300" dirty="0"/>
+              <a:t>The RT viewer shell present the telemetric data at the following way:</a:t>
+            </a:r>
+          </a:p>
+          <a:p>
+            <a:pPr lvl="1"/>
+            <a:r>
+              <a:rPr lang="en-US" sz="1050" dirty="0"/>
+              <a:t>Table of all members: This table will consist all telemetric members information one after one. This data can be view at:</a:t>
+            </a:r>
+          </a:p>
+          <a:p>
+            <a:pPr lvl="2"/>
+            <a:r>
+              <a:rPr lang="en-US" sz="1050" dirty="0"/>
+              <a:t>Sort values: The user will be able to sort those data from low to high, low to high or group them by RTC module.</a:t>
+            </a:r>
+          </a:p>
+          <a:p>
+            <a:pPr lvl="2"/>
+            <a:r>
+              <a:rPr lang="en-US" sz="1050" dirty="0"/>
+              <a:t>Data view: The user will be able to view members data by bytes or by original data values.</a:t>
+            </a:r>
+          </a:p>
+          <a:p>
+            <a:pPr lvl="1"/>
+            <a:r>
+              <a:rPr lang="en-US" sz="1050" dirty="0"/>
+              <a:t>Visual way: The user will able to search after data member by his name or index and by his group. Then the RT viewer shell present for this selected member a 2D figure and  table of results by time stamp.</a:t>
+            </a:r>
+          </a:p>
+          <a:p>
+            <a:r>
+              <a:rPr lang="en-US" sz="1300" b="1" dirty="0">
+                <a:ea typeface="+mn-ea"/>
+              </a:rPr>
+              <a:t> The RT viewer shall present telemetric members by his names:</a:t>
+            </a:r>
+          </a:p>
+          <a:p>
+            <a:pPr lvl="1"/>
+            <a:r>
+              <a:rPr lang="en-US" sz="1050" dirty="0"/>
+              <a:t>The telemetric members names will be read from generated file. This file generate by 3d application. </a:t>
+            </a:r>
+          </a:p>
+          <a:p>
+            <a:r>
+              <a:rPr lang="en-US" sz="1250" dirty="0"/>
+              <a:t> The RT viewer shall saved output files:</a:t>
+            </a:r>
+          </a:p>
+          <a:p>
+            <a:pPr lvl="1"/>
+            <a:r>
+              <a:rPr lang="en-US" sz="1050" dirty="0"/>
+              <a:t>Upon user request the RT viewer shell generate the following output files:</a:t>
+            </a:r>
+          </a:p>
+          <a:p>
+            <a:pPr lvl="2"/>
+            <a:r>
+              <a:rPr lang="en-US" sz="1050" dirty="0"/>
+              <a:t>Table of all members – At text file.</a:t>
+            </a:r>
+          </a:p>
+          <a:p>
+            <a:pPr lvl="2"/>
+            <a:r>
+              <a:rPr lang="en-US" sz="1050" dirty="0"/>
+              <a:t>Raw data of the incoming data.</a:t>
+            </a:r>
+          </a:p>
+          <a:p>
+            <a:pPr lvl="2"/>
+            <a:r>
+              <a:rPr lang="en-US" sz="1050" dirty="0"/>
+              <a:t>Picture (format *.jpg) of the 2D figure.  </a:t>
+            </a:r>
+          </a:p>
+          <a:p>
+            <a:pPr lvl="1"/>
+            <a:endParaRPr lang="en-US" dirty="0"/>
+          </a:p>
+          <a:p>
+            <a:endParaRPr lang="en-US" dirty="0"/>
+          </a:p>
+        </p:txBody>
+      </p:sp>
+    </p:spTree>
+    <p:extLst>
+      <p:ext uri="{BB962C8B-B14F-4D97-AF65-F5344CB8AC3E}">
+        <p14:creationId xmlns:p14="http://schemas.microsoft.com/office/powerpoint/2010/main" val="2212492260"/>
+      </p:ext>
+    </p:extLst>
+  </p:cSld>
+  <p:clrMapOvr>
+    <a:masterClrMapping/>
+  </p:clrMapOvr>
+  <p:transition/>
+</p:sld>
+</file>
+
+<file path=ppt/slides/slide9.xml><?xml version="1.0" encoding="utf-8"?>
+<p:sld xmlns:a="http://schemas.openxmlformats.org/drawingml/2006/main" xmlns:r="http://schemas.openxmlformats.org/officeDocument/2006/relationships" xmlns:p="http://schemas.openxmlformats.org/presentationml/2006/main">
+  <p:cSld>
+    <p:spTree>
+      <p:nvGrpSpPr>
+        <p:cNvPr id="1" name=""/>
+        <p:cNvGrpSpPr/>
+        <p:nvPr/>
+      </p:nvGrpSpPr>
+      <p:grpSpPr>
+        <a:xfrm>
+          <a:off x="0" y="0"/>
+          <a:ext cx="0" cy="0"/>
+          <a:chOff x="0" y="0"/>
+          <a:chExt cx="0" cy="0"/>
+        </a:xfrm>
+      </p:grpSpPr>
+      <p:sp>
+        <p:nvSpPr>
+          <p:cNvPr id="5" name="Title 4"/>
+          <p:cNvSpPr>
+            <a:spLocks noGrp="1"/>
+          </p:cNvSpPr>
+          <p:nvPr>
+            <p:ph type="title"/>
+          </p:nvPr>
+        </p:nvSpPr>
+        <p:spPr/>
+        <p:txBody>
+          <a:bodyPr/>
+          <a:lstStyle/>
+          <a:p>
+            <a:pPr algn="ctr" rtl="0"/>
+            <a:r>
+              <a:rPr lang="en-US" dirty="0"/>
+              <a:t>RT TLM </a:t>
+            </a:r>
+            <a:br>
+              <a:rPr lang="en-US" dirty="0"/>
+            </a:br>
+            <a:r>
+              <a:rPr lang="en-US" dirty="0"/>
               <a:t>RT viewer - Presentation of table</a:t>
             </a:r>
-            <a:endParaRPr lang="en-US" dirty="0"/>
           </a:p>
         </p:txBody>
       </p:sp>
@@ -8386,766 +8844,6 @@
     <a:masterClrMapping/>
   </p:clrMapOvr>
   <p:transition/>
-  <p:timing>
-    <p:tnLst>
-      <p:par>
-        <p:cTn id="1" dur="indefinite" restart="never" nodeType="tmRoot"/>
-      </p:par>
-    </p:tnLst>
-  </p:timing>
-</p:sld>
-</file>
-
-<file path=ppt/slides/slide7.xml><?xml version="1.0" encoding="utf-8"?>
-<p:sld xmlns:a="http://schemas.openxmlformats.org/drawingml/2006/main" xmlns:r="http://schemas.openxmlformats.org/officeDocument/2006/relationships" xmlns:p="http://schemas.openxmlformats.org/presentationml/2006/main">
-  <p:cSld>
-    <p:spTree>
-      <p:nvGrpSpPr>
-        <p:cNvPr id="1" name=""/>
-        <p:cNvGrpSpPr/>
-        <p:nvPr/>
-      </p:nvGrpSpPr>
-      <p:grpSpPr>
-        <a:xfrm>
-          <a:off x="0" y="0"/>
-          <a:ext cx="0" cy="0"/>
-          <a:chOff x="0" y="0"/>
-          <a:chExt cx="0" cy="0"/>
-        </a:xfrm>
-      </p:grpSpPr>
-      <p:sp>
-        <p:nvSpPr>
-          <p:cNvPr id="5" name="Title 4"/>
-          <p:cNvSpPr>
-            <a:spLocks noGrp="1"/>
-          </p:cNvSpPr>
-          <p:nvPr>
-            <p:ph type="title"/>
-          </p:nvPr>
-        </p:nvSpPr>
-        <p:spPr/>
-        <p:txBody>
-          <a:bodyPr/>
-          <a:lstStyle/>
-          <a:p>
-            <a:pPr algn="ctr" rtl="0"/>
-            <a:r>
-              <a:rPr lang="en-US" dirty="0" smtClean="0"/>
-              <a:t>RT TLM </a:t>
-            </a:r>
-            <a:br>
-              <a:rPr lang="en-US" dirty="0" smtClean="0"/>
-            </a:br>
-            <a:r>
-              <a:rPr lang="en-US" dirty="0" smtClean="0"/>
-              <a:t>RT viewer - Presentation of table</a:t>
-            </a:r>
-            <a:endParaRPr lang="en-US" dirty="0"/>
-          </a:p>
-        </p:txBody>
-      </p:sp>
-      <p:pic>
-        <p:nvPicPr>
-          <p:cNvPr id="6146" name="Picture 2"/>
-          <p:cNvPicPr>
-            <a:picLocks noChangeAspect="1" noChangeArrowheads="1"/>
-          </p:cNvPicPr>
-          <p:nvPr/>
-        </p:nvPicPr>
-        <p:blipFill>
-          <a:blip r:embed="rId2">
-            <a:extLst>
-              <a:ext uri="{28A0092B-C50C-407E-A947-70E740481C1C}">
-                <a14:useLocalDpi xmlns:a14="http://schemas.microsoft.com/office/drawing/2010/main" val="0"/>
-              </a:ext>
-            </a:extLst>
-          </a:blip>
-          <a:srcRect/>
-          <a:stretch>
-            <a:fillRect/>
-          </a:stretch>
-        </p:blipFill>
-        <p:spPr bwMode="auto">
-          <a:xfrm>
-            <a:off x="926910" y="1173705"/>
-            <a:ext cx="7583578" cy="5041355"/>
-          </a:xfrm>
-          <a:prstGeom prst="rect">
-            <a:avLst/>
-          </a:prstGeom>
-          <a:noFill/>
-          <a:ln>
-            <a:noFill/>
-          </a:ln>
-          <a:extLst>
-            <a:ext uri="{909E8E84-426E-40DD-AFC4-6F175D3DCCD1}">
-              <a14:hiddenFill xmlns:a14="http://schemas.microsoft.com/office/drawing/2010/main">
-                <a:solidFill>
-                  <a:schemeClr val="accent1"/>
-                </a:solidFill>
-              </a14:hiddenFill>
-            </a:ext>
-            <a:ext uri="{91240B29-F687-4F45-9708-019B960494DF}">
-              <a14:hiddenLine xmlns:a14="http://schemas.microsoft.com/office/drawing/2010/main" w="9525">
-                <a:solidFill>
-                  <a:schemeClr val="tx1"/>
-                </a:solidFill>
-                <a:miter lim="800000"/>
-                <a:headEnd/>
-                <a:tailEnd/>
-              </a14:hiddenLine>
-            </a:ext>
-          </a:extLst>
-        </p:spPr>
-      </p:pic>
-    </p:spTree>
-    <p:extLst>
-      <p:ext uri="{BB962C8B-B14F-4D97-AF65-F5344CB8AC3E}">
-        <p14:creationId xmlns:p14="http://schemas.microsoft.com/office/powerpoint/2010/main" val="1453379152"/>
-      </p:ext>
-    </p:extLst>
-  </p:cSld>
-  <p:clrMapOvr>
-    <a:masterClrMapping/>
-  </p:clrMapOvr>
-  <p:transition/>
-  <p:timing>
-    <p:tnLst>
-      <p:par>
-        <p:cTn id="1" dur="indefinite" restart="never" nodeType="tmRoot"/>
-      </p:par>
-    </p:tnLst>
-  </p:timing>
-</p:sld>
-</file>
-
-<file path=ppt/slides/slide8.xml><?xml version="1.0" encoding="utf-8"?>
-<p:sld xmlns:a="http://schemas.openxmlformats.org/drawingml/2006/main" xmlns:r="http://schemas.openxmlformats.org/officeDocument/2006/relationships" xmlns:p="http://schemas.openxmlformats.org/presentationml/2006/main">
-  <p:cSld>
-    <p:spTree>
-      <p:nvGrpSpPr>
-        <p:cNvPr id="1" name=""/>
-        <p:cNvGrpSpPr/>
-        <p:nvPr/>
-      </p:nvGrpSpPr>
-      <p:grpSpPr>
-        <a:xfrm>
-          <a:off x="0" y="0"/>
-          <a:ext cx="0" cy="0"/>
-          <a:chOff x="0" y="0"/>
-          <a:chExt cx="0" cy="0"/>
-        </a:xfrm>
-      </p:grpSpPr>
-      <p:sp>
-        <p:nvSpPr>
-          <p:cNvPr id="6" name="Content Placeholder 5"/>
-          <p:cNvSpPr>
-            <a:spLocks noGrp="1"/>
-          </p:cNvSpPr>
-          <p:nvPr>
-            <p:ph idx="1"/>
-          </p:nvPr>
-        </p:nvSpPr>
-        <p:spPr>
-          <a:xfrm>
-            <a:off x="179388" y="1080000"/>
-            <a:ext cx="8713787" cy="2448060"/>
-          </a:xfrm>
-        </p:spPr>
-        <p:txBody>
-          <a:bodyPr/>
-          <a:lstStyle/>
-          <a:p>
-            <a:r>
-              <a:rPr lang="en-US" dirty="0"/>
-              <a:t> </a:t>
-            </a:r>
-            <a:r>
-              <a:rPr lang="en-US" sz="1400" dirty="0" smtClean="0"/>
-              <a:t>Each telemetric plan will be in an ICD file format (.grep file).</a:t>
-            </a:r>
-          </a:p>
-          <a:p>
-            <a:r>
-              <a:rPr lang="en-US" sz="1400" dirty="0" smtClean="0"/>
-              <a:t> The </a:t>
-            </a:r>
-            <a:r>
-              <a:rPr lang="en-US" sz="1400" dirty="0"/>
-              <a:t>telemetric plan members will be build throw GDE application.</a:t>
-            </a:r>
-            <a:endParaRPr lang="en-US" sz="1400" dirty="0" smtClean="0"/>
-          </a:p>
-          <a:p>
-            <a:r>
-              <a:rPr lang="en-US" sz="1400" dirty="0"/>
-              <a:t> </a:t>
-            </a:r>
-            <a:r>
-              <a:rPr lang="en-US" sz="1400" dirty="0" smtClean="0"/>
-              <a:t>The ICD message will be form by system engineers.</a:t>
-            </a:r>
-            <a:endParaRPr lang="en-US" dirty="0" smtClean="0"/>
-          </a:p>
-          <a:p>
-            <a:pPr marL="0" indent="0">
-              <a:buNone/>
-            </a:pPr>
-            <a:r>
-              <a:rPr lang="en-US" dirty="0" smtClean="0"/>
-              <a:t>  </a:t>
-            </a:r>
-          </a:p>
-        </p:txBody>
-      </p:sp>
-      <p:sp>
-        <p:nvSpPr>
-          <p:cNvPr id="5" name="Title 4"/>
-          <p:cNvSpPr>
-            <a:spLocks noGrp="1"/>
-          </p:cNvSpPr>
-          <p:nvPr>
-            <p:ph type="title"/>
-          </p:nvPr>
-        </p:nvSpPr>
-        <p:spPr/>
-        <p:txBody>
-          <a:bodyPr/>
-          <a:lstStyle/>
-          <a:p>
-            <a:pPr algn="ctr" rtl="0"/>
-            <a:r>
-              <a:rPr lang="en-US" dirty="0"/>
-              <a:t>RT TLM parameters configuration</a:t>
-            </a:r>
-            <a:br>
-              <a:rPr lang="en-US" dirty="0"/>
-            </a:br>
-            <a:r>
-              <a:rPr lang="en-US" dirty="0"/>
-              <a:t>Solution </a:t>
-            </a:r>
-            <a:r>
-              <a:rPr lang="en-US" dirty="0" smtClean="0"/>
-              <a:t>A – ICD messages</a:t>
-            </a:r>
-            <a:endParaRPr lang="en-US" dirty="0"/>
-          </a:p>
-        </p:txBody>
-      </p:sp>
-    </p:spTree>
-    <p:extLst>
-      <p:ext uri="{BB962C8B-B14F-4D97-AF65-F5344CB8AC3E}">
-        <p14:creationId xmlns:p14="http://schemas.microsoft.com/office/powerpoint/2010/main" val="1509595162"/>
-      </p:ext>
-    </p:extLst>
-  </p:cSld>
-  <p:clrMapOvr>
-    <a:masterClrMapping/>
-  </p:clrMapOvr>
-  <p:transition/>
-  <p:timing>
-    <p:tnLst>
-      <p:par>
-        <p:cTn id="1" dur="indefinite" restart="never" nodeType="tmRoot"/>
-      </p:par>
-    </p:tnLst>
-  </p:timing>
-</p:sld>
-</file>
-
-<file path=ppt/slides/slide9.xml><?xml version="1.0" encoding="utf-8"?>
-<p:sld xmlns:a="http://schemas.openxmlformats.org/drawingml/2006/main" xmlns:r="http://schemas.openxmlformats.org/officeDocument/2006/relationships" xmlns:p="http://schemas.openxmlformats.org/presentationml/2006/main">
-  <p:cSld>
-    <p:spTree>
-      <p:nvGrpSpPr>
-        <p:cNvPr id="1" name=""/>
-        <p:cNvGrpSpPr/>
-        <p:nvPr/>
-      </p:nvGrpSpPr>
-      <p:grpSpPr>
-        <a:xfrm>
-          <a:off x="0" y="0"/>
-          <a:ext cx="0" cy="0"/>
-          <a:chOff x="0" y="0"/>
-          <a:chExt cx="0" cy="0"/>
-        </a:xfrm>
-      </p:grpSpPr>
-      <p:sp>
-        <p:nvSpPr>
-          <p:cNvPr id="6" name="Content Placeholder 5"/>
-          <p:cNvSpPr>
-            <a:spLocks noGrp="1"/>
-          </p:cNvSpPr>
-          <p:nvPr>
-            <p:ph idx="1"/>
-          </p:nvPr>
-        </p:nvSpPr>
-        <p:spPr>
-          <a:xfrm>
-            <a:off x="179388" y="1080001"/>
-            <a:ext cx="8713787" cy="651146"/>
-          </a:xfrm>
-        </p:spPr>
-        <p:txBody>
-          <a:bodyPr/>
-          <a:lstStyle/>
-          <a:p>
-            <a:r>
-              <a:rPr lang="en-US" dirty="0" smtClean="0"/>
-              <a:t>Parameters configurator tool goal is to add ability to insert / remove / view parameters for a chosen RTC module.  </a:t>
-            </a:r>
-          </a:p>
-          <a:p>
-            <a:pPr marL="0" indent="0">
-              <a:buNone/>
-            </a:pPr>
-            <a:endParaRPr lang="en-US" dirty="0" smtClean="0"/>
-          </a:p>
-          <a:p>
-            <a:pPr marL="0" indent="0">
-              <a:buNone/>
-            </a:pPr>
-            <a:r>
-              <a:rPr lang="en-US" dirty="0" smtClean="0"/>
-              <a:t>  </a:t>
-            </a:r>
-          </a:p>
-        </p:txBody>
-      </p:sp>
-      <p:sp>
-        <p:nvSpPr>
-          <p:cNvPr id="5" name="Title 4"/>
-          <p:cNvSpPr>
-            <a:spLocks noGrp="1"/>
-          </p:cNvSpPr>
-          <p:nvPr>
-            <p:ph type="title"/>
-          </p:nvPr>
-        </p:nvSpPr>
-        <p:spPr/>
-        <p:txBody>
-          <a:bodyPr/>
-          <a:lstStyle/>
-          <a:p>
-            <a:pPr algn="ctr" rtl="0"/>
-            <a:r>
-              <a:rPr lang="en-US" sz="2000" dirty="0"/>
-              <a:t>RT TLM parameters configuration</a:t>
-            </a:r>
-            <a:br>
-              <a:rPr lang="en-US" sz="2000" dirty="0"/>
-            </a:br>
-            <a:r>
-              <a:rPr lang="en-US" sz="2000" dirty="0"/>
-              <a:t>Solution </a:t>
-            </a:r>
-            <a:r>
-              <a:rPr lang="en-US" sz="2000" dirty="0" smtClean="0"/>
-              <a:t>B – Parameters configurator tool </a:t>
-            </a:r>
-            <a:endParaRPr lang="en-US" sz="2000" dirty="0"/>
-          </a:p>
-        </p:txBody>
-      </p:sp>
-      <p:pic>
-        <p:nvPicPr>
-          <p:cNvPr id="2" name="Picture 2"/>
-          <p:cNvPicPr>
-            <a:picLocks noChangeAspect="1" noChangeArrowheads="1"/>
-          </p:cNvPicPr>
-          <p:nvPr/>
-        </p:nvPicPr>
-        <p:blipFill>
-          <a:blip r:embed="rId2">
-            <a:extLst>
-              <a:ext uri="{28A0092B-C50C-407E-A947-70E740481C1C}">
-                <a14:useLocalDpi xmlns:a14="http://schemas.microsoft.com/office/drawing/2010/main" val="0"/>
-              </a:ext>
-            </a:extLst>
-          </a:blip>
-          <a:srcRect/>
-          <a:stretch>
-            <a:fillRect/>
-          </a:stretch>
-        </p:blipFill>
-        <p:spPr bwMode="auto">
-          <a:xfrm>
-            <a:off x="556003" y="2148052"/>
-            <a:ext cx="3499788" cy="1120210"/>
-          </a:xfrm>
-          <a:prstGeom prst="rect">
-            <a:avLst/>
-          </a:prstGeom>
-          <a:noFill/>
-          <a:ln>
-            <a:noFill/>
-          </a:ln>
-          <a:effectLst/>
-          <a:extLst>
-            <a:ext uri="{909E8E84-426E-40DD-AFC4-6F175D3DCCD1}">
-              <a14:hiddenFill xmlns:a14="http://schemas.microsoft.com/office/drawing/2010/main">
-                <a:solidFill>
-                  <a:schemeClr val="accent1"/>
-                </a:solidFill>
-              </a14:hiddenFill>
-            </a:ext>
-            <a:ext uri="{91240B29-F687-4F45-9708-019B960494DF}">
-              <a14:hiddenLine xmlns:a14="http://schemas.microsoft.com/office/drawing/2010/main" w="9525">
-                <a:solidFill>
-                  <a:schemeClr val="tx1"/>
-                </a:solidFill>
-                <a:miter lim="800000"/>
-                <a:headEnd/>
-                <a:tailEnd/>
-              </a14:hiddenLine>
-            </a:ext>
-            <a:ext uri="{AF507438-7753-43E0-B8FC-AC1667EBCBE1}">
-              <a14:hiddenEffects xmlns:a14="http://schemas.microsoft.com/office/drawing/2010/main">
-                <a:effectLst>
-                  <a:outerShdw dist="35921" dir="2700000" algn="ctr" rotWithShape="0">
-                    <a:schemeClr val="bg2"/>
-                  </a:outerShdw>
-                </a:effectLst>
-              </a14:hiddenEffects>
-            </a:ext>
-          </a:extLst>
-        </p:spPr>
-      </p:pic>
-      <p:sp>
-        <p:nvSpPr>
-          <p:cNvPr id="3" name="TextBox 2"/>
-          <p:cNvSpPr txBox="1"/>
-          <p:nvPr/>
-        </p:nvSpPr>
-        <p:spPr>
-          <a:xfrm>
-            <a:off x="528452" y="1778720"/>
-            <a:ext cx="3650358" cy="338554"/>
-          </a:xfrm>
-          <a:prstGeom prst="rect">
-            <a:avLst/>
-          </a:prstGeom>
-          <a:noFill/>
-        </p:spPr>
-        <p:txBody>
-          <a:bodyPr wrap="none" rtlCol="0">
-            <a:spAutoFit/>
-          </a:bodyPr>
-          <a:lstStyle/>
-          <a:p>
-            <a:pPr algn="l" rtl="0"/>
-            <a:r>
-              <a:rPr lang="en-US" sz="1600" dirty="0" smtClean="0"/>
-              <a:t>Configure path to DB files and module</a:t>
-            </a:r>
-            <a:endParaRPr lang="en-US" sz="1600" dirty="0"/>
-          </a:p>
-        </p:txBody>
-      </p:sp>
-      <p:pic>
-        <p:nvPicPr>
-          <p:cNvPr id="4" name="Picture 3"/>
-          <p:cNvPicPr>
-            <a:picLocks noChangeAspect="1" noChangeArrowheads="1"/>
-          </p:cNvPicPr>
-          <p:nvPr/>
-        </p:nvPicPr>
-        <p:blipFill>
-          <a:blip r:embed="rId3">
-            <a:extLst>
-              <a:ext uri="{28A0092B-C50C-407E-A947-70E740481C1C}">
-                <a14:useLocalDpi xmlns:a14="http://schemas.microsoft.com/office/drawing/2010/main" val="0"/>
-              </a:ext>
-            </a:extLst>
-          </a:blip>
-          <a:srcRect/>
-          <a:stretch>
-            <a:fillRect/>
-          </a:stretch>
-        </p:blipFill>
-        <p:spPr bwMode="auto">
-          <a:xfrm>
-            <a:off x="571069" y="3834147"/>
-            <a:ext cx="3565124" cy="1826233"/>
-          </a:xfrm>
-          <a:prstGeom prst="rect">
-            <a:avLst/>
-          </a:prstGeom>
-          <a:noFill/>
-          <a:ln>
-            <a:noFill/>
-          </a:ln>
-          <a:effectLst/>
-          <a:extLst>
-            <a:ext uri="{909E8E84-426E-40DD-AFC4-6F175D3DCCD1}">
-              <a14:hiddenFill xmlns:a14="http://schemas.microsoft.com/office/drawing/2010/main">
-                <a:solidFill>
-                  <a:schemeClr val="accent1"/>
-                </a:solidFill>
-              </a14:hiddenFill>
-            </a:ext>
-            <a:ext uri="{91240B29-F687-4F45-9708-019B960494DF}">
-              <a14:hiddenLine xmlns:a14="http://schemas.microsoft.com/office/drawing/2010/main" w="9525">
-                <a:solidFill>
-                  <a:schemeClr val="tx1"/>
-                </a:solidFill>
-                <a:miter lim="800000"/>
-                <a:headEnd/>
-                <a:tailEnd/>
-              </a14:hiddenLine>
-            </a:ext>
-            <a:ext uri="{AF507438-7753-43E0-B8FC-AC1667EBCBE1}">
-              <a14:hiddenEffects xmlns:a14="http://schemas.microsoft.com/office/drawing/2010/main">
-                <a:effectLst>
-                  <a:outerShdw dist="35921" dir="2700000" algn="ctr" rotWithShape="0">
-                    <a:schemeClr val="bg2"/>
-                  </a:outerShdw>
-                </a:effectLst>
-              </a14:hiddenEffects>
-            </a:ext>
-          </a:extLst>
-        </p:spPr>
-      </p:pic>
-      <p:sp>
-        <p:nvSpPr>
-          <p:cNvPr id="9" name="TextBox 8"/>
-          <p:cNvSpPr txBox="1"/>
-          <p:nvPr/>
-        </p:nvSpPr>
-        <p:spPr>
-          <a:xfrm>
-            <a:off x="556003" y="3434643"/>
-            <a:ext cx="2364750" cy="369332"/>
-          </a:xfrm>
-          <a:prstGeom prst="rect">
-            <a:avLst/>
-          </a:prstGeom>
-          <a:noFill/>
-        </p:spPr>
-        <p:txBody>
-          <a:bodyPr wrap="none" rtlCol="0">
-            <a:spAutoFit/>
-          </a:bodyPr>
-          <a:lstStyle/>
-          <a:p>
-            <a:pPr algn="l" rtl="0"/>
-            <a:r>
-              <a:rPr lang="en-US" dirty="0" smtClean="0"/>
-              <a:t>Insert new parameter</a:t>
-            </a:r>
-            <a:endParaRPr lang="en-US" dirty="0"/>
-          </a:p>
-        </p:txBody>
-      </p:sp>
-      <p:pic>
-        <p:nvPicPr>
-          <p:cNvPr id="1028" name="Picture 4"/>
-          <p:cNvPicPr>
-            <a:picLocks noChangeAspect="1" noChangeArrowheads="1"/>
-          </p:cNvPicPr>
-          <p:nvPr/>
-        </p:nvPicPr>
-        <p:blipFill>
-          <a:blip r:embed="rId4">
-            <a:extLst>
-              <a:ext uri="{28A0092B-C50C-407E-A947-70E740481C1C}">
-                <a14:useLocalDpi xmlns:a14="http://schemas.microsoft.com/office/drawing/2010/main" val="0"/>
-              </a:ext>
-            </a:extLst>
-          </a:blip>
-          <a:srcRect/>
-          <a:stretch>
-            <a:fillRect/>
-          </a:stretch>
-        </p:blipFill>
-        <p:spPr bwMode="auto">
-          <a:xfrm>
-            <a:off x="4594762" y="2158893"/>
-            <a:ext cx="3426215" cy="1109369"/>
-          </a:xfrm>
-          <a:prstGeom prst="rect">
-            <a:avLst/>
-          </a:prstGeom>
-          <a:noFill/>
-          <a:ln>
-            <a:noFill/>
-          </a:ln>
-          <a:effectLst/>
-          <a:extLst>
-            <a:ext uri="{909E8E84-426E-40DD-AFC4-6F175D3DCCD1}">
-              <a14:hiddenFill xmlns:a14="http://schemas.microsoft.com/office/drawing/2010/main">
-                <a:solidFill>
-                  <a:schemeClr val="accent1"/>
-                </a:solidFill>
-              </a14:hiddenFill>
-            </a:ext>
-            <a:ext uri="{91240B29-F687-4F45-9708-019B960494DF}">
-              <a14:hiddenLine xmlns:a14="http://schemas.microsoft.com/office/drawing/2010/main" w="9525">
-                <a:solidFill>
-                  <a:schemeClr val="tx1"/>
-                </a:solidFill>
-                <a:miter lim="800000"/>
-                <a:headEnd/>
-                <a:tailEnd/>
-              </a14:hiddenLine>
-            </a:ext>
-            <a:ext uri="{AF507438-7753-43E0-B8FC-AC1667EBCBE1}">
-              <a14:hiddenEffects xmlns:a14="http://schemas.microsoft.com/office/drawing/2010/main">
-                <a:effectLst>
-                  <a:outerShdw dist="35921" dir="2700000" algn="ctr" rotWithShape="0">
-                    <a:schemeClr val="bg2"/>
-                  </a:outerShdw>
-                </a:effectLst>
-              </a14:hiddenEffects>
-            </a:ext>
-          </a:extLst>
-        </p:spPr>
-      </p:pic>
-      <p:sp>
-        <p:nvSpPr>
-          <p:cNvPr id="11" name="TextBox 10"/>
-          <p:cNvSpPr txBox="1"/>
-          <p:nvPr/>
-        </p:nvSpPr>
-        <p:spPr>
-          <a:xfrm>
-            <a:off x="4506264" y="1747942"/>
-            <a:ext cx="3890809" cy="369332"/>
-          </a:xfrm>
-          <a:prstGeom prst="rect">
-            <a:avLst/>
-          </a:prstGeom>
-          <a:noFill/>
-        </p:spPr>
-        <p:txBody>
-          <a:bodyPr wrap="none" rtlCol="0">
-            <a:spAutoFit/>
-          </a:bodyPr>
-          <a:lstStyle/>
-          <a:p>
-            <a:pPr algn="l" rtl="0"/>
-            <a:r>
-              <a:rPr lang="en-US" dirty="0" smtClean="0"/>
-              <a:t>Remove parameter from module DB</a:t>
-            </a:r>
-            <a:endParaRPr lang="en-US" dirty="0"/>
-          </a:p>
-        </p:txBody>
-      </p:sp>
-      <p:pic>
-        <p:nvPicPr>
-          <p:cNvPr id="1029" name="Picture 5"/>
-          <p:cNvPicPr>
-            <a:picLocks noChangeAspect="1" noChangeArrowheads="1"/>
-          </p:cNvPicPr>
-          <p:nvPr/>
-        </p:nvPicPr>
-        <p:blipFill>
-          <a:blip r:embed="rId5">
-            <a:extLst>
-              <a:ext uri="{28A0092B-C50C-407E-A947-70E740481C1C}">
-                <a14:useLocalDpi xmlns:a14="http://schemas.microsoft.com/office/drawing/2010/main" val="0"/>
-              </a:ext>
-            </a:extLst>
-          </a:blip>
-          <a:srcRect/>
-          <a:stretch>
-            <a:fillRect/>
-          </a:stretch>
-        </p:blipFill>
-        <p:spPr bwMode="auto">
-          <a:xfrm>
-            <a:off x="4594762" y="3834147"/>
-            <a:ext cx="3509205" cy="2280273"/>
-          </a:xfrm>
-          <a:prstGeom prst="rect">
-            <a:avLst/>
-          </a:prstGeom>
-          <a:noFill/>
-          <a:ln>
-            <a:noFill/>
-          </a:ln>
-          <a:effectLst/>
-          <a:extLst>
-            <a:ext uri="{909E8E84-426E-40DD-AFC4-6F175D3DCCD1}">
-              <a14:hiddenFill xmlns:a14="http://schemas.microsoft.com/office/drawing/2010/main">
-                <a:solidFill>
-                  <a:schemeClr val="accent1"/>
-                </a:solidFill>
-              </a14:hiddenFill>
-            </a:ext>
-            <a:ext uri="{91240B29-F687-4F45-9708-019B960494DF}">
-              <a14:hiddenLine xmlns:a14="http://schemas.microsoft.com/office/drawing/2010/main" w="9525">
-                <a:solidFill>
-                  <a:schemeClr val="tx1"/>
-                </a:solidFill>
-                <a:miter lim="800000"/>
-                <a:headEnd/>
-                <a:tailEnd/>
-              </a14:hiddenLine>
-            </a:ext>
-            <a:ext uri="{AF507438-7753-43E0-B8FC-AC1667EBCBE1}">
-              <a14:hiddenEffects xmlns:a14="http://schemas.microsoft.com/office/drawing/2010/main">
-                <a:effectLst>
-                  <a:outerShdw dist="35921" dir="2700000" algn="ctr" rotWithShape="0">
-                    <a:schemeClr val="bg2"/>
-                  </a:outerShdw>
-                </a:effectLst>
-              </a14:hiddenEffects>
-            </a:ext>
-          </a:extLst>
-        </p:spPr>
-      </p:pic>
-      <p:sp>
-        <p:nvSpPr>
-          <p:cNvPr id="13" name="TextBox 12"/>
-          <p:cNvSpPr txBox="1"/>
-          <p:nvPr/>
-        </p:nvSpPr>
-        <p:spPr>
-          <a:xfrm>
-            <a:off x="4933650" y="3434643"/>
-            <a:ext cx="2732479" cy="369332"/>
-          </a:xfrm>
-          <a:prstGeom prst="rect">
-            <a:avLst/>
-          </a:prstGeom>
-          <a:noFill/>
-        </p:spPr>
-        <p:txBody>
-          <a:bodyPr wrap="none" rtlCol="0">
-            <a:spAutoFit/>
-          </a:bodyPr>
-          <a:lstStyle/>
-          <a:p>
-            <a:pPr algn="l" rtl="0"/>
-            <a:r>
-              <a:rPr lang="en-US" dirty="0" smtClean="0"/>
-              <a:t>View module parameters</a:t>
-            </a:r>
-            <a:endParaRPr lang="en-US" dirty="0"/>
-          </a:p>
-        </p:txBody>
-      </p:sp>
-    </p:spTree>
-    <p:extLst>
-      <p:ext uri="{BB962C8B-B14F-4D97-AF65-F5344CB8AC3E}">
-        <p14:creationId xmlns:p14="http://schemas.microsoft.com/office/powerpoint/2010/main" val="2557997767"/>
-      </p:ext>
-    </p:extLst>
-  </p:cSld>
-  <p:clrMapOvr>
-    <a:masterClrMapping/>
-  </p:clrMapOvr>
-  <p:transition/>
-  <p:timing>
-    <p:tnLst>
-      <p:par>
-        <p:cTn id="1" dur="indefinite" restart="never" nodeType="tmRoot"/>
-      </p:par>
-    </p:tnLst>
-  </p:timing>
 </p:sld>
 </file>
 
@@ -10449,15 +10147,6 @@
 </file>
 
 <file path=customXml/item2.xml><?xml version="1.0" encoding="utf-8"?>
-<?mso-contentType ?>
-<FormTemplates xmlns="http://schemas.microsoft.com/sharepoint/v3/contenttype/forms">
-  <Display>DocumentLibraryForm</Display>
-  <Edit>DocumentLibraryForm</Edit>
-  <New>DocumentLibraryForm</New>
-</FormTemplates>
-</file>
-
-<file path=customXml/item3.xml><?xml version="1.0" encoding="utf-8"?>
 <ct:contentTypeSchema xmlns:ct="http://schemas.microsoft.com/office/2006/metadata/contentType" xmlns:ma="http://schemas.microsoft.com/office/2006/metadata/properties/metaAttributes" ct:_="" ma:_="" ma:contentTypeName="Document" ma:contentTypeID="0x01010026E16916E631B848A501381DD8EEAED7" ma:contentTypeVersion="6" ma:contentTypeDescription="Create a new document." ma:contentTypeScope="" ma:versionID="7df0c0be0b8d97f49516200f286f52d8">
   <xsd:schema xmlns:xsd="http://www.w3.org/2001/XMLSchema" xmlns:xs="http://www.w3.org/2001/XMLSchema" xmlns:p="http://schemas.microsoft.com/office/2006/metadata/properties" xmlns:ns1="http://schemas.microsoft.com/sharepoint/v3" xmlns:ns2="985891ea-cc2b-426e-89e8-b7f21e8d7005" xmlns:ns3="54f95060-3a06-49bc-a45d-760f455d169f" targetNamespace="http://schemas.microsoft.com/office/2006/metadata/properties" ma:root="true" ma:fieldsID="aeccfae96436f93cdc7abaadb9e42baa" ns1:_="" ns2:_="" ns3:_="">
     <xsd:import namespace="http://schemas.microsoft.com/sharepoint/v3"/>
@@ -10625,6 +10314,15 @@
 </ct:contentTypeSchema>
 </file>
 
+<file path=customXml/item3.xml><?xml version="1.0" encoding="utf-8"?>
+<?mso-contentType ?>
+<FormTemplates xmlns="http://schemas.microsoft.com/sharepoint/v3/contenttype/forms">
+  <Display>DocumentLibraryForm</Display>
+  <Edit>DocumentLibraryForm</Edit>
+  <New>DocumentLibraryForm</New>
+</FormTemplates>
+</file>
+
 <file path=customXml/itemProps1.xml><?xml version="1.0" encoding="utf-8"?>
 <ds:datastoreItem xmlns:ds="http://schemas.openxmlformats.org/officeDocument/2006/customXml" ds:itemID="{430D1EAC-4B40-4093-B2DA-DF232B1F2BEB}">
   <ds:schemaRefs>
@@ -10644,14 +10342,6 @@
 </file>
 
 <file path=customXml/itemProps2.xml><?xml version="1.0" encoding="utf-8"?>
-<ds:datastoreItem xmlns:ds="http://schemas.openxmlformats.org/officeDocument/2006/customXml" ds:itemID="{3C889E48-FC40-4A9E-AE65-14B743C28FF7}">
-  <ds:schemaRefs>
-    <ds:schemaRef ds:uri="http://schemas.microsoft.com/sharepoint/v3/contenttype/forms"/>
-  </ds:schemaRefs>
-</ds:datastoreItem>
-</file>
-
-<file path=customXml/itemProps3.xml><?xml version="1.0" encoding="utf-8"?>
 <ds:datastoreItem xmlns:ds="http://schemas.openxmlformats.org/officeDocument/2006/customXml" ds:itemID="{04C21879-72D6-412B-A31C-815B925B0559}">
   <ds:schemaRefs>
     <ds:schemaRef ds:uri="http://schemas.microsoft.com/office/2006/metadata/contentType"/>
@@ -10669,4 +10359,12 @@
     <ds:schemaRef ds:uri="http://schemas.microsoft.com/internal/obd"/>
   </ds:schemaRefs>
 </ds:datastoreItem>
+</file>
+
+<file path=customXml/itemProps3.xml><?xml version="1.0" encoding="utf-8"?>
+<ds:datastoreItem xmlns:ds="http://schemas.openxmlformats.org/officeDocument/2006/customXml" ds:itemID="{3C889E48-FC40-4A9E-AE65-14B743C28FF7}">
+  <ds:schemaRefs>
+    <ds:schemaRef ds:uri="http://schemas.microsoft.com/sharepoint/v3/contenttype/forms"/>
+  </ds:schemaRefs>
+</ds:datastoreItem>
 </file>
</xml_diff>